<commit_message>
Add Slides to Presentation #7
</commit_message>
<xml_diff>
--- a/presentation/Misteli_Refactoring_in_Spoofax.pptx
+++ b/presentation/Misteli_Refactoring_in_Spoofax.pptx
@@ -6,10 +6,10 @@
     <p:sldMasterId id="2147483660" r:id="rId2"/>
   </p:sldMasterIdLst>
   <p:notesMasterIdLst>
-    <p:notesMasterId r:id="rId17"/>
+    <p:notesMasterId r:id="rId24"/>
   </p:notesMasterIdLst>
   <p:handoutMasterIdLst>
-    <p:handoutMasterId r:id="rId18"/>
+    <p:handoutMasterId r:id="rId25"/>
   </p:handoutMasterIdLst>
   <p:sldIdLst>
     <p:sldId id="256" r:id="rId3"/>
@@ -24,8 +24,15 @@
     <p:sldId id="280" r:id="rId12"/>
     <p:sldId id="277" r:id="rId13"/>
     <p:sldId id="278" r:id="rId14"/>
-    <p:sldId id="282" r:id="rId15"/>
-    <p:sldId id="281" r:id="rId16"/>
+    <p:sldId id="283" r:id="rId15"/>
+    <p:sldId id="282" r:id="rId16"/>
+    <p:sldId id="284" r:id="rId17"/>
+    <p:sldId id="281" r:id="rId18"/>
+    <p:sldId id="285" r:id="rId19"/>
+    <p:sldId id="286" r:id="rId20"/>
+    <p:sldId id="287" r:id="rId21"/>
+    <p:sldId id="288" r:id="rId22"/>
+    <p:sldId id="289" r:id="rId23"/>
   </p:sldIdLst>
   <p:sldSz cx="9144000" cy="5143500" type="screen16x9"/>
   <p:notesSz cx="6858000" cy="9144000"/>
@@ -2858,7 +2865,7 @@
           <a:p>
             <a:fld id="{DBAE3B3E-782A-9745-8E84-372F7B6771BF}" type="datetimeFigureOut">
               <a:rPr lang="en-US" smtClean="0"/>
-              <a:t>6/12/2019</a:t>
+              <a:t>6/13/2019</a:t>
             </a:fld>
             <a:endParaRPr lang="en-US" dirty="0"/>
           </a:p>
@@ -3023,7 +3030,7 @@
           <a:p>
             <a:fld id="{C726C102-7355-4784-A102-F67F03D4410F}" type="datetimeFigureOut">
               <a:rPr lang="LID4096" smtClean="0"/>
-              <a:t>06/12/2019</a:t>
+              <a:t>06/13/2019</a:t>
             </a:fld>
             <a:endParaRPr lang="LID4096"/>
           </a:p>
@@ -4806,7 +4813,7 @@
           <a:p>
             <a:fld id="{462A2416-1570-3849-86F9-07F78746E1B2}" type="datetimeFigureOut">
               <a:rPr lang="en-US" smtClean="0"/>
-              <a:t>6/12/2019</a:t>
+              <a:t>6/13/2019</a:t>
             </a:fld>
             <a:endParaRPr lang="en-US" dirty="0"/>
           </a:p>
@@ -7193,6 +7200,107 @@
           <p:cNvPr id="2" name="Title 1">
             <a:extLst>
               <a:ext uri="{FF2B5EF4-FFF2-40B4-BE49-F238E27FC236}">
+                <a16:creationId xmlns:a16="http://schemas.microsoft.com/office/drawing/2014/main" id="{07EC6741-6FD8-44DB-9E0C-75AA8E337F93}"/>
+              </a:ext>
+            </a:extLst>
+          </p:cNvPr>
+          <p:cNvSpPr>
+            <a:spLocks noGrp="1"/>
+          </p:cNvSpPr>
+          <p:nvPr>
+            <p:ph type="title"/>
+          </p:nvPr>
+        </p:nvSpPr>
+        <p:spPr/>
+        <p:txBody>
+          <a:bodyPr>
+            <a:normAutofit fontScale="90000"/>
+          </a:bodyPr>
+          <a:lstStyle/>
+          <a:p>
+            <a:r>
+              <a:rPr lang="en-US" sz="2400" dirty="0">
+                <a:solidFill>
+                  <a:srgbClr val="002060"/>
+                </a:solidFill>
+              </a:rPr>
+              <a:t>Renaming</a:t>
+            </a:r>
+            <a:br>
+              <a:rPr lang="en-US" dirty="0"/>
+            </a:br>
+            <a:r>
+              <a:rPr lang="en-US" dirty="0"/>
+              <a:t>The Foo Challenge Demo</a:t>
+            </a:r>
+          </a:p>
+        </p:txBody>
+      </p:sp>
+      <p:pic>
+        <p:nvPicPr>
+          <p:cNvPr id="4" name="Picture 3">
+            <a:extLst>
+              <a:ext uri="{FF2B5EF4-FFF2-40B4-BE49-F238E27FC236}">
+                <a16:creationId xmlns:a16="http://schemas.microsoft.com/office/drawing/2014/main" id="{E6CBCB7B-661D-4B98-B3DC-18A71E7995EC}"/>
+              </a:ext>
+            </a:extLst>
+          </p:cNvPr>
+          <p:cNvPicPr>
+            <a:picLocks noChangeAspect="1"/>
+          </p:cNvPicPr>
+          <p:nvPr/>
+        </p:nvPicPr>
+        <p:blipFill>
+          <a:blip r:embed="rId2"/>
+          <a:stretch>
+            <a:fillRect/>
+          </a:stretch>
+        </p:blipFill>
+        <p:spPr>
+          <a:xfrm>
+            <a:off x="3722622" y="1358987"/>
+            <a:ext cx="3187432" cy="3143163"/>
+          </a:xfrm>
+          <a:prstGeom prst="rect">
+            <a:avLst/>
+          </a:prstGeom>
+        </p:spPr>
+      </p:pic>
+    </p:spTree>
+    <p:extLst>
+      <p:ext uri="{BB962C8B-B14F-4D97-AF65-F5344CB8AC3E}">
+        <p14:creationId xmlns:p14="http://schemas.microsoft.com/office/powerpoint/2010/main" val="3360125998"/>
+      </p:ext>
+    </p:extLst>
+  </p:cSld>
+  <p:clrMapOvr>
+    <a:masterClrMapping/>
+  </p:clrMapOvr>
+</p:sld>
+</file>
+
+<file path=ppt/slides/slide14.xml><?xml version="1.0" encoding="utf-8"?>
+<p:sld xmlns:a="http://schemas.openxmlformats.org/drawingml/2006/main" xmlns:r="http://schemas.openxmlformats.org/officeDocument/2006/relationships" xmlns:p="http://schemas.openxmlformats.org/presentationml/2006/main">
+  <p:cSld>
+    <p:spTree>
+      <p:nvGrpSpPr>
+        <p:cNvPr id="1" name=""/>
+        <p:cNvGrpSpPr/>
+        <p:nvPr/>
+      </p:nvGrpSpPr>
+      <p:grpSpPr>
+        <a:xfrm>
+          <a:off x="0" y="0"/>
+          <a:ext cx="0" cy="0"/>
+          <a:chOff x="0" y="0"/>
+          <a:chExt cx="0" cy="0"/>
+        </a:xfrm>
+      </p:grpSpPr>
+      <p:sp>
+        <p:nvSpPr>
+          <p:cNvPr id="2" name="Title 1">
+            <a:extLst>
+              <a:ext uri="{FF2B5EF4-FFF2-40B4-BE49-F238E27FC236}">
                 <a16:creationId xmlns:a16="http://schemas.microsoft.com/office/drawing/2014/main" id="{D909F41F-2DB6-48DF-BE2F-2FF7F1198D8D}"/>
               </a:ext>
             </a:extLst>
@@ -7207,12 +7315,12 @@
         <p:spPr/>
         <p:txBody>
           <a:bodyPr>
-            <a:normAutofit/>
+            <a:normAutofit fontScale="90000"/>
           </a:bodyPr>
           <a:lstStyle/>
           <a:p>
             <a:r>
-              <a:rPr lang="en-US" sz="1600" dirty="0">
+              <a:rPr lang="en-US" sz="2400" dirty="0">
                 <a:solidFill>
                   <a:srgbClr val="002060"/>
                 </a:solidFill>
@@ -7220,43 +7328,116 @@
               <a:t>Renaming</a:t>
             </a:r>
             <a:br>
-              <a:rPr lang="en-US" sz="2400" dirty="0"/>
+              <a:rPr lang="en-US" dirty="0"/>
             </a:br>
             <a:r>
-              <a:rPr lang="en-US" sz="2400" dirty="0"/>
+              <a:rPr lang="en-US" dirty="0"/>
               <a:t>Problem: Capture</a:t>
             </a:r>
-            <a:endParaRPr lang="en-US" dirty="0"/>
           </a:p>
         </p:txBody>
       </p:sp>
-      <p:sp>
-        <p:nvSpPr>
-          <p:cNvPr id="3" name="Content Placeholder 2">
+      <p:pic>
+        <p:nvPicPr>
+          <p:cNvPr id="4" name="Picture 3">
             <a:extLst>
               <a:ext uri="{FF2B5EF4-FFF2-40B4-BE49-F238E27FC236}">
-                <a16:creationId xmlns:a16="http://schemas.microsoft.com/office/drawing/2014/main" id="{65F69779-7AB7-48C5-BB22-8B50DFE9D825}"/>
+                <a16:creationId xmlns:a16="http://schemas.microsoft.com/office/drawing/2014/main" id="{7D721E03-F7E6-4599-8233-6BD1E28E0ABA}"/>
               </a:ext>
             </a:extLst>
           </p:cNvPr>
-          <p:cNvSpPr>
-            <a:spLocks noGrp="1"/>
-          </p:cNvSpPr>
-          <p:nvPr>
-            <p:ph idx="1"/>
-          </p:nvPr>
+          <p:cNvPicPr>
+            <a:picLocks noChangeAspect="1"/>
+          </p:cNvPicPr>
+          <p:nvPr/>
+        </p:nvPicPr>
+        <p:blipFill>
+          <a:blip r:embed="rId2"/>
+          <a:stretch>
+            <a:fillRect/>
+          </a:stretch>
+        </p:blipFill>
+        <p:spPr>
+          <a:xfrm>
+            <a:off x="1763106" y="1431398"/>
+            <a:ext cx="2512490" cy="2722895"/>
+          </a:xfrm>
+          <a:prstGeom prst="rect">
+            <a:avLst/>
+          </a:prstGeom>
+        </p:spPr>
+      </p:pic>
+      <p:pic>
+        <p:nvPicPr>
+          <p:cNvPr id="5" name="Picture 4">
+            <a:extLst>
+              <a:ext uri="{FF2B5EF4-FFF2-40B4-BE49-F238E27FC236}">
+                <a16:creationId xmlns:a16="http://schemas.microsoft.com/office/drawing/2014/main" id="{D6F212CD-5194-428A-929B-0E2E558C0596}"/>
+              </a:ext>
+            </a:extLst>
+          </p:cNvPr>
+          <p:cNvPicPr>
+            <a:picLocks noChangeAspect="1"/>
+          </p:cNvPicPr>
+          <p:nvPr/>
+        </p:nvPicPr>
+        <p:blipFill>
+          <a:blip r:embed="rId3"/>
+          <a:stretch>
+            <a:fillRect/>
+          </a:stretch>
+        </p:blipFill>
+        <p:spPr>
+          <a:xfrm>
+            <a:off x="5743776" y="1431398"/>
+            <a:ext cx="2512490" cy="2722894"/>
+          </a:xfrm>
+          <a:prstGeom prst="rect">
+            <a:avLst/>
+          </a:prstGeom>
+        </p:spPr>
+      </p:pic>
+      <p:sp>
+        <p:nvSpPr>
+          <p:cNvPr id="6" name="Arrow: Right 5">
+            <a:extLst>
+              <a:ext uri="{FF2B5EF4-FFF2-40B4-BE49-F238E27FC236}">
+                <a16:creationId xmlns:a16="http://schemas.microsoft.com/office/drawing/2014/main" id="{2931FEA3-A857-41AF-9DAB-9589D7B5B324}"/>
+              </a:ext>
+            </a:extLst>
+          </p:cNvPr>
+          <p:cNvSpPr/>
+          <p:nvPr/>
         </p:nvSpPr>
         <p:spPr>
           <a:xfrm>
-            <a:off x="1763106" y="1200150"/>
-            <a:ext cx="7106464" cy="3486122"/>
+            <a:off x="4704016" y="2498930"/>
+            <a:ext cx="612322" cy="587829"/>
           </a:xfrm>
+          <a:prstGeom prst="rightArrow">
+            <a:avLst/>
+          </a:prstGeom>
         </p:spPr>
+        <p:style>
+          <a:lnRef idx="1">
+            <a:schemeClr val="accent4"/>
+          </a:lnRef>
+          <a:fillRef idx="3">
+            <a:schemeClr val="accent4"/>
+          </a:fillRef>
+          <a:effectRef idx="2">
+            <a:schemeClr val="accent4"/>
+          </a:effectRef>
+          <a:fontRef idx="minor">
+            <a:schemeClr val="lt1"/>
+          </a:fontRef>
+        </p:style>
         <p:txBody>
-          <a:bodyPr/>
+          <a:bodyPr rtlCol="0" anchor="ctr"/>
           <a:lstStyle/>
           <a:p>
-            <a:endParaRPr lang="en-US" dirty="0"/>
+            <a:pPr algn="ctr"/>
+            <a:endParaRPr lang="en-US"/>
           </a:p>
         </p:txBody>
       </p:sp>
@@ -7273,7 +7454,103 @@
 </p:sld>
 </file>
 
-<file path=ppt/slides/slide14.xml><?xml version="1.0" encoding="utf-8"?>
+<file path=ppt/slides/slide15.xml><?xml version="1.0" encoding="utf-8"?>
+<p:sld xmlns:a="http://schemas.openxmlformats.org/drawingml/2006/main" xmlns:r="http://schemas.openxmlformats.org/officeDocument/2006/relationships" xmlns:p="http://schemas.openxmlformats.org/presentationml/2006/main">
+  <p:cSld>
+    <p:spTree>
+      <p:nvGrpSpPr>
+        <p:cNvPr id="1" name=""/>
+        <p:cNvGrpSpPr/>
+        <p:nvPr/>
+      </p:nvGrpSpPr>
+      <p:grpSpPr>
+        <a:xfrm>
+          <a:off x="0" y="0"/>
+          <a:ext cx="0" cy="0"/>
+          <a:chOff x="0" y="0"/>
+          <a:chExt cx="0" cy="0"/>
+        </a:xfrm>
+      </p:grpSpPr>
+      <p:sp>
+        <p:nvSpPr>
+          <p:cNvPr id="2" name="Title 1">
+            <a:extLst>
+              <a:ext uri="{FF2B5EF4-FFF2-40B4-BE49-F238E27FC236}">
+                <a16:creationId xmlns:a16="http://schemas.microsoft.com/office/drawing/2014/main" id="{ECD5D206-1B52-4E07-B3DD-E6500A5F14FE}"/>
+              </a:ext>
+            </a:extLst>
+          </p:cNvPr>
+          <p:cNvSpPr>
+            <a:spLocks noGrp="1"/>
+          </p:cNvSpPr>
+          <p:nvPr>
+            <p:ph type="title"/>
+          </p:nvPr>
+        </p:nvSpPr>
+        <p:spPr/>
+        <p:txBody>
+          <a:bodyPr>
+            <a:normAutofit fontScale="90000"/>
+          </a:bodyPr>
+          <a:lstStyle/>
+          <a:p>
+            <a:r>
+              <a:rPr lang="en-US" sz="2400" dirty="0">
+                <a:solidFill>
+                  <a:srgbClr val="002060"/>
+                </a:solidFill>
+              </a:rPr>
+              <a:t>Renaming</a:t>
+            </a:r>
+            <a:br>
+              <a:rPr lang="en-US" dirty="0"/>
+            </a:br>
+            <a:r>
+              <a:rPr lang="en-US" dirty="0"/>
+              <a:t>Solution: Capture</a:t>
+            </a:r>
+          </a:p>
+        </p:txBody>
+      </p:sp>
+      <p:sp>
+        <p:nvSpPr>
+          <p:cNvPr id="3" name="Content Placeholder 2">
+            <a:extLst>
+              <a:ext uri="{FF2B5EF4-FFF2-40B4-BE49-F238E27FC236}">
+                <a16:creationId xmlns:a16="http://schemas.microsoft.com/office/drawing/2014/main" id="{08959BD0-8110-425A-B068-D71BBF3B229D}"/>
+              </a:ext>
+            </a:extLst>
+          </p:cNvPr>
+          <p:cNvSpPr>
+            <a:spLocks noGrp="1"/>
+          </p:cNvSpPr>
+          <p:nvPr>
+            <p:ph idx="1"/>
+          </p:nvPr>
+        </p:nvSpPr>
+        <p:spPr/>
+        <p:txBody>
+          <a:bodyPr/>
+          <a:lstStyle/>
+          <a:p>
+            <a:endParaRPr lang="en-US"/>
+          </a:p>
+        </p:txBody>
+      </p:sp>
+    </p:spTree>
+    <p:extLst>
+      <p:ext uri="{BB962C8B-B14F-4D97-AF65-F5344CB8AC3E}">
+        <p14:creationId xmlns:p14="http://schemas.microsoft.com/office/powerpoint/2010/main" val="4003891620"/>
+      </p:ext>
+    </p:extLst>
+  </p:cSld>
+  <p:clrMapOvr>
+    <a:masterClrMapping/>
+  </p:clrMapOvr>
+</p:sld>
+</file>
+
+<file path=ppt/slides/slide16.xml><?xml version="1.0" encoding="utf-8"?>
 <p:sld xmlns:a="http://schemas.openxmlformats.org/drawingml/2006/main" xmlns:r="http://schemas.openxmlformats.org/officeDocument/2006/relationships" xmlns:p="http://schemas.openxmlformats.org/presentationml/2006/main">
   <p:cSld>
     <p:spTree>
@@ -7360,6 +7637,294 @@
     <p:extLst>
       <p:ext uri="{BB962C8B-B14F-4D97-AF65-F5344CB8AC3E}">
         <p14:creationId xmlns:p14="http://schemas.microsoft.com/office/powerpoint/2010/main" val="649359674"/>
+      </p:ext>
+    </p:extLst>
+  </p:cSld>
+  <p:clrMapOvr>
+    <a:masterClrMapping/>
+  </p:clrMapOvr>
+</p:sld>
+</file>
+
+<file path=ppt/slides/slide17.xml><?xml version="1.0" encoding="utf-8"?>
+<p:sld xmlns:a="http://schemas.openxmlformats.org/drawingml/2006/main" xmlns:r="http://schemas.openxmlformats.org/officeDocument/2006/relationships" xmlns:p="http://schemas.openxmlformats.org/presentationml/2006/main">
+  <p:cSld>
+    <p:spTree>
+      <p:nvGrpSpPr>
+        <p:cNvPr id="1" name=""/>
+        <p:cNvGrpSpPr/>
+        <p:nvPr/>
+      </p:nvGrpSpPr>
+      <p:grpSpPr>
+        <a:xfrm>
+          <a:off x="0" y="0"/>
+          <a:ext cx="0" cy="0"/>
+          <a:chOff x="0" y="0"/>
+          <a:chExt cx="0" cy="0"/>
+        </a:xfrm>
+      </p:grpSpPr>
+      <p:sp>
+        <p:nvSpPr>
+          <p:cNvPr id="2" name="Title 1">
+            <a:extLst>
+              <a:ext uri="{FF2B5EF4-FFF2-40B4-BE49-F238E27FC236}">
+                <a16:creationId xmlns:a16="http://schemas.microsoft.com/office/drawing/2014/main" id="{DA980ABF-8158-4458-B148-CDA7476D6D5B}"/>
+              </a:ext>
+            </a:extLst>
+          </p:cNvPr>
+          <p:cNvSpPr>
+            <a:spLocks noGrp="1"/>
+          </p:cNvSpPr>
+          <p:nvPr>
+            <p:ph type="title"/>
+          </p:nvPr>
+        </p:nvSpPr>
+        <p:spPr/>
+        <p:txBody>
+          <a:bodyPr>
+            <a:normAutofit fontScale="90000"/>
+          </a:bodyPr>
+          <a:lstStyle/>
+          <a:p>
+            <a:r>
+              <a:rPr lang="en-US" sz="2200" dirty="0">
+                <a:solidFill>
+                  <a:srgbClr val="002060"/>
+                </a:solidFill>
+              </a:rPr>
+              <a:t>Inline</a:t>
+            </a:r>
+            <a:br>
+              <a:rPr lang="en-US" dirty="0"/>
+            </a:br>
+            <a:r>
+              <a:rPr lang="en-US" dirty="0"/>
+              <a:t>Step 2: Replace Call</a:t>
+            </a:r>
+          </a:p>
+        </p:txBody>
+      </p:sp>
+      <p:sp>
+        <p:nvSpPr>
+          <p:cNvPr id="3" name="Content Placeholder 2">
+            <a:extLst>
+              <a:ext uri="{FF2B5EF4-FFF2-40B4-BE49-F238E27FC236}">
+                <a16:creationId xmlns:a16="http://schemas.microsoft.com/office/drawing/2014/main" id="{ADDFD673-5B6F-4B6F-B6AD-69444052CE36}"/>
+              </a:ext>
+            </a:extLst>
+          </p:cNvPr>
+          <p:cNvSpPr>
+            <a:spLocks noGrp="1"/>
+          </p:cNvSpPr>
+          <p:nvPr>
+            <p:ph idx="1"/>
+          </p:nvPr>
+        </p:nvSpPr>
+        <p:spPr/>
+        <p:txBody>
+          <a:bodyPr/>
+          <a:lstStyle/>
+          <a:p>
+            <a:endParaRPr lang="en-US"/>
+          </a:p>
+        </p:txBody>
+      </p:sp>
+    </p:spTree>
+    <p:extLst>
+      <p:ext uri="{BB962C8B-B14F-4D97-AF65-F5344CB8AC3E}">
+        <p14:creationId xmlns:p14="http://schemas.microsoft.com/office/powerpoint/2010/main" val="2385298871"/>
+      </p:ext>
+    </p:extLst>
+  </p:cSld>
+  <p:clrMapOvr>
+    <a:masterClrMapping/>
+  </p:clrMapOvr>
+</p:sld>
+</file>
+
+<file path=ppt/slides/slide18.xml><?xml version="1.0" encoding="utf-8"?>
+<p:sld xmlns:a="http://schemas.openxmlformats.org/drawingml/2006/main" xmlns:r="http://schemas.openxmlformats.org/officeDocument/2006/relationships" xmlns:p="http://schemas.openxmlformats.org/presentationml/2006/main">
+  <p:cSld>
+    <p:spTree>
+      <p:nvGrpSpPr>
+        <p:cNvPr id="1" name=""/>
+        <p:cNvGrpSpPr/>
+        <p:nvPr/>
+      </p:nvGrpSpPr>
+      <p:grpSpPr>
+        <a:xfrm>
+          <a:off x="0" y="0"/>
+          <a:ext cx="0" cy="0"/>
+          <a:chOff x="0" y="0"/>
+          <a:chExt cx="0" cy="0"/>
+        </a:xfrm>
+      </p:grpSpPr>
+      <p:sp>
+        <p:nvSpPr>
+          <p:cNvPr id="2" name="Title 1">
+            <a:extLst>
+              <a:ext uri="{FF2B5EF4-FFF2-40B4-BE49-F238E27FC236}">
+                <a16:creationId xmlns:a16="http://schemas.microsoft.com/office/drawing/2014/main" id="{A3F3E1CF-733D-4EAA-A4A4-EFE33F6F4D1E}"/>
+              </a:ext>
+            </a:extLst>
+          </p:cNvPr>
+          <p:cNvSpPr>
+            <a:spLocks noGrp="1"/>
+          </p:cNvSpPr>
+          <p:nvPr>
+            <p:ph type="title"/>
+          </p:nvPr>
+        </p:nvSpPr>
+        <p:spPr/>
+        <p:txBody>
+          <a:bodyPr>
+            <a:normAutofit fontScale="90000"/>
+          </a:bodyPr>
+          <a:lstStyle/>
+          <a:p>
+            <a:r>
+              <a:rPr lang="en-US" sz="2200" dirty="0">
+                <a:solidFill>
+                  <a:srgbClr val="002060"/>
+                </a:solidFill>
+              </a:rPr>
+              <a:t>Inline</a:t>
+            </a:r>
+            <a:br>
+              <a:rPr lang="en-US" dirty="0"/>
+            </a:br>
+            <a:r>
+              <a:rPr lang="en-US" dirty="0"/>
+              <a:t>Step 3: Delete Declaration</a:t>
+            </a:r>
+          </a:p>
+        </p:txBody>
+      </p:sp>
+      <p:sp>
+        <p:nvSpPr>
+          <p:cNvPr id="3" name="Content Placeholder 2">
+            <a:extLst>
+              <a:ext uri="{FF2B5EF4-FFF2-40B4-BE49-F238E27FC236}">
+                <a16:creationId xmlns:a16="http://schemas.microsoft.com/office/drawing/2014/main" id="{4C47954A-2906-4D59-8585-23E7BB9A1A3B}"/>
+              </a:ext>
+            </a:extLst>
+          </p:cNvPr>
+          <p:cNvSpPr>
+            <a:spLocks noGrp="1"/>
+          </p:cNvSpPr>
+          <p:nvPr>
+            <p:ph idx="1"/>
+          </p:nvPr>
+        </p:nvSpPr>
+        <p:spPr/>
+        <p:txBody>
+          <a:bodyPr/>
+          <a:lstStyle/>
+          <a:p>
+            <a:endParaRPr lang="en-US"/>
+          </a:p>
+        </p:txBody>
+      </p:sp>
+    </p:spTree>
+    <p:extLst>
+      <p:ext uri="{BB962C8B-B14F-4D97-AF65-F5344CB8AC3E}">
+        <p14:creationId xmlns:p14="http://schemas.microsoft.com/office/powerpoint/2010/main" val="554729800"/>
+      </p:ext>
+    </p:extLst>
+  </p:cSld>
+  <p:clrMapOvr>
+    <a:masterClrMapping/>
+  </p:clrMapOvr>
+</p:sld>
+</file>
+
+<file path=ppt/slides/slide19.xml><?xml version="1.0" encoding="utf-8"?>
+<p:sld xmlns:a="http://schemas.openxmlformats.org/drawingml/2006/main" xmlns:r="http://schemas.openxmlformats.org/officeDocument/2006/relationships" xmlns:p="http://schemas.openxmlformats.org/presentationml/2006/main">
+  <p:cSld>
+    <p:spTree>
+      <p:nvGrpSpPr>
+        <p:cNvPr id="1" name=""/>
+        <p:cNvGrpSpPr/>
+        <p:nvPr/>
+      </p:nvGrpSpPr>
+      <p:grpSpPr>
+        <a:xfrm>
+          <a:off x="0" y="0"/>
+          <a:ext cx="0" cy="0"/>
+          <a:chOff x="0" y="0"/>
+          <a:chExt cx="0" cy="0"/>
+        </a:xfrm>
+      </p:grpSpPr>
+      <p:sp>
+        <p:nvSpPr>
+          <p:cNvPr id="2" name="Title 1">
+            <a:extLst>
+              <a:ext uri="{FF2B5EF4-FFF2-40B4-BE49-F238E27FC236}">
+                <a16:creationId xmlns:a16="http://schemas.microsoft.com/office/drawing/2014/main" id="{3D4EAE92-26B5-43BA-BF3C-B8A35C8C41C0}"/>
+              </a:ext>
+            </a:extLst>
+          </p:cNvPr>
+          <p:cNvSpPr>
+            <a:spLocks noGrp="1"/>
+          </p:cNvSpPr>
+          <p:nvPr>
+            <p:ph type="title"/>
+          </p:nvPr>
+        </p:nvSpPr>
+        <p:spPr/>
+        <p:txBody>
+          <a:bodyPr>
+            <a:normAutofit fontScale="90000"/>
+          </a:bodyPr>
+          <a:lstStyle/>
+          <a:p>
+            <a:r>
+              <a:rPr lang="en-US" sz="2200" dirty="0">
+                <a:solidFill>
+                  <a:srgbClr val="002060"/>
+                </a:solidFill>
+              </a:rPr>
+              <a:t>Inline</a:t>
+            </a:r>
+            <a:br>
+              <a:rPr lang="en-US" dirty="0"/>
+            </a:br>
+            <a:r>
+              <a:rPr lang="en-US" dirty="0"/>
+              <a:t>Problem: Recursive Calls</a:t>
+            </a:r>
+          </a:p>
+        </p:txBody>
+      </p:sp>
+      <p:sp>
+        <p:nvSpPr>
+          <p:cNvPr id="3" name="Content Placeholder 2">
+            <a:extLst>
+              <a:ext uri="{FF2B5EF4-FFF2-40B4-BE49-F238E27FC236}">
+                <a16:creationId xmlns:a16="http://schemas.microsoft.com/office/drawing/2014/main" id="{F244BE0B-79E0-4B2E-9ED3-06BC7CAB1F21}"/>
+              </a:ext>
+            </a:extLst>
+          </p:cNvPr>
+          <p:cNvSpPr>
+            <a:spLocks noGrp="1"/>
+          </p:cNvSpPr>
+          <p:nvPr>
+            <p:ph idx="1"/>
+          </p:nvPr>
+        </p:nvSpPr>
+        <p:spPr/>
+        <p:txBody>
+          <a:bodyPr/>
+          <a:lstStyle/>
+          <a:p>
+            <a:endParaRPr lang="en-US"/>
+          </a:p>
+        </p:txBody>
+      </p:sp>
+    </p:spTree>
+    <p:extLst>
+      <p:ext uri="{BB962C8B-B14F-4D97-AF65-F5344CB8AC3E}">
+        <p14:creationId xmlns:p14="http://schemas.microsoft.com/office/powerpoint/2010/main" val="1860405798"/>
       </p:ext>
     </p:extLst>
   </p:cSld>
@@ -7419,6 +7984,185 @@
     <p:extLst>
       <p:ext uri="{BB962C8B-B14F-4D97-AF65-F5344CB8AC3E}">
         <p14:creationId xmlns:p14="http://schemas.microsoft.com/office/powerpoint/2010/main" val="1387998412"/>
+      </p:ext>
+    </p:extLst>
+  </p:cSld>
+  <p:clrMapOvr>
+    <a:masterClrMapping/>
+  </p:clrMapOvr>
+</p:sld>
+</file>
+
+<file path=ppt/slides/slide20.xml><?xml version="1.0" encoding="utf-8"?>
+<p:sld xmlns:a="http://schemas.openxmlformats.org/drawingml/2006/main" xmlns:r="http://schemas.openxmlformats.org/officeDocument/2006/relationships" xmlns:p="http://schemas.openxmlformats.org/presentationml/2006/main">
+  <p:cSld>
+    <p:spTree>
+      <p:nvGrpSpPr>
+        <p:cNvPr id="1" name=""/>
+        <p:cNvGrpSpPr/>
+        <p:nvPr/>
+      </p:nvGrpSpPr>
+      <p:grpSpPr>
+        <a:xfrm>
+          <a:off x="0" y="0"/>
+          <a:ext cx="0" cy="0"/>
+          <a:chOff x="0" y="0"/>
+          <a:chExt cx="0" cy="0"/>
+        </a:xfrm>
+      </p:grpSpPr>
+      <p:sp>
+        <p:nvSpPr>
+          <p:cNvPr id="2" name="Title 1">
+            <a:extLst>
+              <a:ext uri="{FF2B5EF4-FFF2-40B4-BE49-F238E27FC236}">
+                <a16:creationId xmlns:a16="http://schemas.microsoft.com/office/drawing/2014/main" id="{8FA142CC-32CA-4044-A89D-077BE90F9827}"/>
+              </a:ext>
+            </a:extLst>
+          </p:cNvPr>
+          <p:cNvSpPr>
+            <a:spLocks noGrp="1"/>
+          </p:cNvSpPr>
+          <p:nvPr>
+            <p:ph type="title"/>
+          </p:nvPr>
+        </p:nvSpPr>
+        <p:spPr/>
+        <p:txBody>
+          <a:bodyPr>
+            <a:normAutofit fontScale="90000"/>
+          </a:bodyPr>
+          <a:lstStyle/>
+          <a:p>
+            <a:r>
+              <a:rPr lang="en-US" sz="2200" dirty="0">
+                <a:solidFill>
+                  <a:srgbClr val="002060"/>
+                </a:solidFill>
+              </a:rPr>
+              <a:t>Inline</a:t>
+            </a:r>
+            <a:br>
+              <a:rPr lang="en-US" dirty="0"/>
+            </a:br>
+            <a:r>
+              <a:rPr lang="en-US" dirty="0"/>
+              <a:t>Solution: Recursive Calls</a:t>
+            </a:r>
+          </a:p>
+        </p:txBody>
+      </p:sp>
+      <p:sp>
+        <p:nvSpPr>
+          <p:cNvPr id="3" name="Content Placeholder 2">
+            <a:extLst>
+              <a:ext uri="{FF2B5EF4-FFF2-40B4-BE49-F238E27FC236}">
+                <a16:creationId xmlns:a16="http://schemas.microsoft.com/office/drawing/2014/main" id="{70D8C59A-7D39-4580-A868-756D617C4AD3}"/>
+              </a:ext>
+            </a:extLst>
+          </p:cNvPr>
+          <p:cNvSpPr>
+            <a:spLocks noGrp="1"/>
+          </p:cNvSpPr>
+          <p:nvPr>
+            <p:ph idx="1"/>
+          </p:nvPr>
+        </p:nvSpPr>
+        <p:spPr/>
+        <p:txBody>
+          <a:bodyPr/>
+          <a:lstStyle/>
+          <a:p>
+            <a:endParaRPr lang="en-US"/>
+          </a:p>
+        </p:txBody>
+      </p:sp>
+    </p:spTree>
+    <p:extLst>
+      <p:ext uri="{BB962C8B-B14F-4D97-AF65-F5344CB8AC3E}">
+        <p14:creationId xmlns:p14="http://schemas.microsoft.com/office/powerpoint/2010/main" val="28210673"/>
+      </p:ext>
+    </p:extLst>
+  </p:cSld>
+  <p:clrMapOvr>
+    <a:masterClrMapping/>
+  </p:clrMapOvr>
+</p:sld>
+</file>
+
+<file path=ppt/slides/slide21.xml><?xml version="1.0" encoding="utf-8"?>
+<p:sld xmlns:a="http://schemas.openxmlformats.org/drawingml/2006/main" xmlns:r="http://schemas.openxmlformats.org/officeDocument/2006/relationships" xmlns:p="http://schemas.openxmlformats.org/presentationml/2006/main">
+  <p:cSld>
+    <p:spTree>
+      <p:nvGrpSpPr>
+        <p:cNvPr id="1" name=""/>
+        <p:cNvGrpSpPr/>
+        <p:nvPr/>
+      </p:nvGrpSpPr>
+      <p:grpSpPr>
+        <a:xfrm>
+          <a:off x="0" y="0"/>
+          <a:ext cx="0" cy="0"/>
+          <a:chOff x="0" y="0"/>
+          <a:chExt cx="0" cy="0"/>
+        </a:xfrm>
+      </p:grpSpPr>
+      <p:sp>
+        <p:nvSpPr>
+          <p:cNvPr id="2" name="Title 1">
+            <a:extLst>
+              <a:ext uri="{FF2B5EF4-FFF2-40B4-BE49-F238E27FC236}">
+                <a16:creationId xmlns:a16="http://schemas.microsoft.com/office/drawing/2014/main" id="{795A6E4F-00C5-4C1D-BA8D-FEB9CF1BB993}"/>
+              </a:ext>
+            </a:extLst>
+          </p:cNvPr>
+          <p:cNvSpPr>
+            <a:spLocks noGrp="1"/>
+          </p:cNvSpPr>
+          <p:nvPr>
+            <p:ph type="title"/>
+          </p:nvPr>
+        </p:nvSpPr>
+        <p:spPr/>
+        <p:txBody>
+          <a:bodyPr/>
+          <a:lstStyle/>
+          <a:p>
+            <a:r>
+              <a:rPr lang="en-US" dirty="0"/>
+              <a:t>Conclusion</a:t>
+            </a:r>
+          </a:p>
+        </p:txBody>
+      </p:sp>
+      <p:sp>
+        <p:nvSpPr>
+          <p:cNvPr id="3" name="Content Placeholder 2">
+            <a:extLst>
+              <a:ext uri="{FF2B5EF4-FFF2-40B4-BE49-F238E27FC236}">
+                <a16:creationId xmlns:a16="http://schemas.microsoft.com/office/drawing/2014/main" id="{F2C291AE-9DAB-4A55-88EB-F6FC1A3ACAE3}"/>
+              </a:ext>
+            </a:extLst>
+          </p:cNvPr>
+          <p:cNvSpPr>
+            <a:spLocks noGrp="1"/>
+          </p:cNvSpPr>
+          <p:nvPr>
+            <p:ph idx="1"/>
+          </p:nvPr>
+        </p:nvSpPr>
+        <p:spPr/>
+        <p:txBody>
+          <a:bodyPr/>
+          <a:lstStyle/>
+          <a:p>
+            <a:endParaRPr lang="en-US"/>
+          </a:p>
+        </p:txBody>
+      </p:sp>
+    </p:spTree>
+    <p:extLst>
+      <p:ext uri="{BB962C8B-B14F-4D97-AF65-F5344CB8AC3E}">
+        <p14:creationId xmlns:p14="http://schemas.microsoft.com/office/powerpoint/2010/main" val="1803745701"/>
       </p:ext>
     </p:extLst>
   </p:cSld>

</xml_diff>

<commit_message>
Add refactoring slides to the presentation #7
Added .dot files to gitignore
</commit_message>
<xml_diff>
--- a/presentation/Misteli_Refactoring_in_Spoofax.pptx
+++ b/presentation/Misteli_Refactoring_in_Spoofax.pptx
@@ -6,10 +6,10 @@
     <p:sldMasterId id="2147483660" r:id="rId2"/>
   </p:sldMasterIdLst>
   <p:notesMasterIdLst>
-    <p:notesMasterId r:id="rId24"/>
+    <p:notesMasterId r:id="rId28"/>
   </p:notesMasterIdLst>
   <p:handoutMasterIdLst>
-    <p:handoutMasterId r:id="rId25"/>
+    <p:handoutMasterId r:id="rId29"/>
   </p:handoutMasterIdLst>
   <p:sldIdLst>
     <p:sldId id="256" r:id="rId3"/>
@@ -22,17 +22,21 @@
     <p:sldId id="279" r:id="rId10"/>
     <p:sldId id="276" r:id="rId11"/>
     <p:sldId id="280" r:id="rId12"/>
-    <p:sldId id="277" r:id="rId13"/>
-    <p:sldId id="278" r:id="rId14"/>
-    <p:sldId id="283" r:id="rId15"/>
-    <p:sldId id="282" r:id="rId16"/>
-    <p:sldId id="284" r:id="rId17"/>
-    <p:sldId id="281" r:id="rId18"/>
-    <p:sldId id="285" r:id="rId19"/>
-    <p:sldId id="286" r:id="rId20"/>
-    <p:sldId id="287" r:id="rId21"/>
-    <p:sldId id="288" r:id="rId22"/>
-    <p:sldId id="289" r:id="rId23"/>
+    <p:sldId id="290" r:id="rId13"/>
+    <p:sldId id="277" r:id="rId14"/>
+    <p:sldId id="291" r:id="rId15"/>
+    <p:sldId id="292" r:id="rId16"/>
+    <p:sldId id="283" r:id="rId17"/>
+    <p:sldId id="282" r:id="rId18"/>
+    <p:sldId id="284" r:id="rId19"/>
+    <p:sldId id="293" r:id="rId20"/>
+    <p:sldId id="294" r:id="rId21"/>
+    <p:sldId id="281" r:id="rId22"/>
+    <p:sldId id="285" r:id="rId23"/>
+    <p:sldId id="286" r:id="rId24"/>
+    <p:sldId id="287" r:id="rId25"/>
+    <p:sldId id="288" r:id="rId26"/>
+    <p:sldId id="289" r:id="rId27"/>
   </p:sldIdLst>
   <p:sldSz cx="9144000" cy="5143500" type="screen16x9"/>
   <p:notesSz cx="6858000" cy="9144000"/>
@@ -2865,7 +2869,7 @@
           <a:p>
             <a:fld id="{DBAE3B3E-782A-9745-8E84-372F7B6771BF}" type="datetimeFigureOut">
               <a:rPr lang="en-US" smtClean="0"/>
-              <a:t>6/13/2019</a:t>
+              <a:t>6/22/2019</a:t>
             </a:fld>
             <a:endParaRPr lang="en-US" dirty="0"/>
           </a:p>
@@ -3030,7 +3034,7 @@
           <a:p>
             <a:fld id="{C726C102-7355-4784-A102-F67F03D4410F}" type="datetimeFigureOut">
               <a:rPr lang="LID4096" smtClean="0"/>
-              <a:t>06/13/2019</a:t>
+              <a:t>06/22/2019</a:t>
             </a:fld>
             <a:endParaRPr lang="LID4096"/>
           </a:p>
@@ -4137,7 +4141,7 @@
           <a:p>
             <a:fld id="{57469752-A353-4215-9498-7371F7601A20}" type="slidenum">
               <a:rPr lang="LID4096" smtClean="0"/>
-              <a:t>11</a:t>
+              <a:t>12</a:t>
             </a:fld>
             <a:endParaRPr lang="LID4096"/>
           </a:p>
@@ -4147,6 +4151,188 @@
     <p:extLst>
       <p:ext uri="{BB962C8B-B14F-4D97-AF65-F5344CB8AC3E}">
         <p14:creationId xmlns:p14="http://schemas.microsoft.com/office/powerpoint/2010/main" val="1634490456"/>
+      </p:ext>
+    </p:extLst>
+  </p:cSld>
+  <p:clrMapOvr>
+    <a:masterClrMapping/>
+  </p:clrMapOvr>
+</p:notes>
+</file>
+
+<file path=ppt/notesSlides/notesSlide8.xml><?xml version="1.0" encoding="utf-8"?>
+<p:notes xmlns:a="http://schemas.openxmlformats.org/drawingml/2006/main" xmlns:r="http://schemas.openxmlformats.org/officeDocument/2006/relationships" xmlns:p="http://schemas.openxmlformats.org/presentationml/2006/main">
+  <p:cSld>
+    <p:spTree>
+      <p:nvGrpSpPr>
+        <p:cNvPr id="1" name=""/>
+        <p:cNvGrpSpPr/>
+        <p:nvPr/>
+      </p:nvGrpSpPr>
+      <p:grpSpPr>
+        <a:xfrm>
+          <a:off x="0" y="0"/>
+          <a:ext cx="0" cy="0"/>
+          <a:chOff x="0" y="0"/>
+          <a:chExt cx="0" cy="0"/>
+        </a:xfrm>
+      </p:grpSpPr>
+      <p:sp>
+        <p:nvSpPr>
+          <p:cNvPr id="2" name="Slide Image Placeholder 1"/>
+          <p:cNvSpPr>
+            <a:spLocks noGrp="1" noRot="1" noChangeAspect="1"/>
+          </p:cNvSpPr>
+          <p:nvPr>
+            <p:ph type="sldImg"/>
+          </p:nvPr>
+        </p:nvSpPr>
+        <p:spPr/>
+      </p:sp>
+      <p:sp>
+        <p:nvSpPr>
+          <p:cNvPr id="3" name="Notes Placeholder 2"/>
+          <p:cNvSpPr>
+            <a:spLocks noGrp="1"/>
+          </p:cNvSpPr>
+          <p:nvPr>
+            <p:ph type="body" idx="1"/>
+          </p:nvPr>
+        </p:nvSpPr>
+        <p:spPr/>
+        <p:txBody>
+          <a:bodyPr/>
+          <a:lstStyle/>
+          <a:p>
+            <a:pPr marL="171450" indent="-171450">
+              <a:buFont typeface="Arial" panose="020B0604020202020204" pitchFamily="34" charset="0"/>
+              <a:buChar char="•"/>
+            </a:pPr>
+            <a:r>
+              <a:rPr lang="en-US" dirty="0"/>
+              <a:t>Collect-One strategy</a:t>
+            </a:r>
+          </a:p>
+        </p:txBody>
+      </p:sp>
+      <p:sp>
+        <p:nvSpPr>
+          <p:cNvPr id="4" name="Slide Number Placeholder 3"/>
+          <p:cNvSpPr>
+            <a:spLocks noGrp="1"/>
+          </p:cNvSpPr>
+          <p:nvPr>
+            <p:ph type="sldNum" sz="quarter" idx="5"/>
+          </p:nvPr>
+        </p:nvSpPr>
+        <p:spPr/>
+        <p:txBody>
+          <a:bodyPr/>
+          <a:lstStyle/>
+          <a:p>
+            <a:fld id="{57469752-A353-4215-9498-7371F7601A20}" type="slidenum">
+              <a:rPr lang="LID4096" smtClean="0"/>
+              <a:t>13</a:t>
+            </a:fld>
+            <a:endParaRPr lang="LID4096"/>
+          </a:p>
+        </p:txBody>
+      </p:sp>
+    </p:spTree>
+    <p:extLst>
+      <p:ext uri="{BB962C8B-B14F-4D97-AF65-F5344CB8AC3E}">
+        <p14:creationId xmlns:p14="http://schemas.microsoft.com/office/powerpoint/2010/main" val="2280943118"/>
+      </p:ext>
+    </p:extLst>
+  </p:cSld>
+  <p:clrMapOvr>
+    <a:masterClrMapping/>
+  </p:clrMapOvr>
+</p:notes>
+</file>
+
+<file path=ppt/notesSlides/notesSlide9.xml><?xml version="1.0" encoding="utf-8"?>
+<p:notes xmlns:a="http://schemas.openxmlformats.org/drawingml/2006/main" xmlns:r="http://schemas.openxmlformats.org/officeDocument/2006/relationships" xmlns:p="http://schemas.openxmlformats.org/presentationml/2006/main">
+  <p:cSld>
+    <p:spTree>
+      <p:nvGrpSpPr>
+        <p:cNvPr id="1" name=""/>
+        <p:cNvGrpSpPr/>
+        <p:nvPr/>
+      </p:nvGrpSpPr>
+      <p:grpSpPr>
+        <a:xfrm>
+          <a:off x="0" y="0"/>
+          <a:ext cx="0" cy="0"/>
+          <a:chOff x="0" y="0"/>
+          <a:chExt cx="0" cy="0"/>
+        </a:xfrm>
+      </p:grpSpPr>
+      <p:sp>
+        <p:nvSpPr>
+          <p:cNvPr id="2" name="Slide Image Placeholder 1"/>
+          <p:cNvSpPr>
+            <a:spLocks noGrp="1" noRot="1" noChangeAspect="1"/>
+          </p:cNvSpPr>
+          <p:nvPr>
+            <p:ph type="sldImg"/>
+          </p:nvPr>
+        </p:nvSpPr>
+        <p:spPr/>
+      </p:sp>
+      <p:sp>
+        <p:nvSpPr>
+          <p:cNvPr id="3" name="Notes Placeholder 2"/>
+          <p:cNvSpPr>
+            <a:spLocks noGrp="1"/>
+          </p:cNvSpPr>
+          <p:nvPr>
+            <p:ph type="body" idx="1"/>
+          </p:nvPr>
+        </p:nvSpPr>
+        <p:spPr/>
+        <p:txBody>
+          <a:bodyPr/>
+          <a:lstStyle/>
+          <a:p>
+            <a:pPr marL="171450" indent="-171450">
+              <a:buFont typeface="Arial" panose="020B0604020202020204" pitchFamily="34" charset="0"/>
+              <a:buChar char="•"/>
+            </a:pPr>
+            <a:r>
+              <a:rPr lang="en-US" dirty="0"/>
+              <a:t>Collect-One strategy</a:t>
+            </a:r>
+          </a:p>
+        </p:txBody>
+      </p:sp>
+      <p:sp>
+        <p:nvSpPr>
+          <p:cNvPr id="4" name="Slide Number Placeholder 3"/>
+          <p:cNvSpPr>
+            <a:spLocks noGrp="1"/>
+          </p:cNvSpPr>
+          <p:nvPr>
+            <p:ph type="sldNum" sz="quarter" idx="5"/>
+          </p:nvPr>
+        </p:nvSpPr>
+        <p:spPr/>
+        <p:txBody>
+          <a:bodyPr/>
+          <a:lstStyle/>
+          <a:p>
+            <a:fld id="{57469752-A353-4215-9498-7371F7601A20}" type="slidenum">
+              <a:rPr lang="LID4096" smtClean="0"/>
+              <a:t>14</a:t>
+            </a:fld>
+            <a:endParaRPr lang="LID4096"/>
+          </a:p>
+        </p:txBody>
+      </p:sp>
+    </p:spTree>
+    <p:extLst>
+      <p:ext uri="{BB962C8B-B14F-4D97-AF65-F5344CB8AC3E}">
+        <p14:creationId xmlns:p14="http://schemas.microsoft.com/office/powerpoint/2010/main" val="2376697861"/>
       </p:ext>
     </p:extLst>
   </p:cSld>
@@ -4813,7 +4999,7 @@
           <a:p>
             <a:fld id="{462A2416-1570-3849-86F9-07F78746E1B2}" type="datetimeFigureOut">
               <a:rPr lang="en-US" smtClean="0"/>
-              <a:t>6/13/2019</a:t>
+              <a:t>6/22/2019</a:t>
             </a:fld>
             <a:endParaRPr lang="en-US" dirty="0"/>
           </a:p>
@@ -6355,7 +6541,7 @@
           <p:cNvPr id="2" name="Title 1">
             <a:extLst>
               <a:ext uri="{FF2B5EF4-FFF2-40B4-BE49-F238E27FC236}">
-                <a16:creationId xmlns:a16="http://schemas.microsoft.com/office/drawing/2014/main" id="{6336A7E4-483D-4676-A512-DDF962A8B424}"/>
+                <a16:creationId xmlns:a16="http://schemas.microsoft.com/office/drawing/2014/main" id="{07EC6741-6FD8-44DB-9E0C-75AA8E337F93}"/>
               </a:ext>
             </a:extLst>
           </p:cNvPr>
@@ -6386,7 +6572,7 @@
             </a:br>
             <a:r>
               <a:rPr lang="en-US" dirty="0"/>
-              <a:t>Step 1: Find Target Declaration</a:t>
+              <a:t>The Foo Challenge</a:t>
             </a:r>
           </a:p>
         </p:txBody>
@@ -6396,7 +6582,7 @@
           <p:cNvPr id="5" name="Picture 4">
             <a:extLst>
               <a:ext uri="{FF2B5EF4-FFF2-40B4-BE49-F238E27FC236}">
-                <a16:creationId xmlns:a16="http://schemas.microsoft.com/office/drawing/2014/main" id="{79B6316B-D9D9-43F2-A2AD-69A47AD30934}"/>
+                <a16:creationId xmlns:a16="http://schemas.microsoft.com/office/drawing/2014/main" id="{187F0D93-9DAC-4582-B641-0D620D822BF8}"/>
               </a:ext>
             </a:extLst>
           </p:cNvPr>
@@ -6406,341 +6592,25 @@
           <p:nvPr/>
         </p:nvPicPr>
         <p:blipFill>
-          <a:blip r:embed="rId3"/>
+          <a:blip r:embed="rId2"/>
           <a:stretch>
             <a:fillRect/>
           </a:stretch>
         </p:blipFill>
         <p:spPr>
           <a:xfrm>
-            <a:off x="1763106" y="2104765"/>
-            <a:ext cx="2513053" cy="933970"/>
+            <a:off x="2847458" y="1063229"/>
+            <a:ext cx="4937760" cy="3943711"/>
           </a:xfrm>
           <a:prstGeom prst="rect">
             <a:avLst/>
           </a:prstGeom>
         </p:spPr>
       </p:pic>
-      <p:sp>
-        <p:nvSpPr>
-          <p:cNvPr id="6" name="Oval 5">
-            <a:extLst>
-              <a:ext uri="{FF2B5EF4-FFF2-40B4-BE49-F238E27FC236}">
-                <a16:creationId xmlns:a16="http://schemas.microsoft.com/office/drawing/2014/main" id="{C650F7E7-E845-45CF-A568-459E649BC525}"/>
-              </a:ext>
-            </a:extLst>
-          </p:cNvPr>
-          <p:cNvSpPr/>
-          <p:nvPr/>
-        </p:nvSpPr>
-        <p:spPr>
-          <a:xfrm>
-            <a:off x="6204857" y="1779814"/>
-            <a:ext cx="595993" cy="530679"/>
-          </a:xfrm>
-          <a:prstGeom prst="ellipse">
-            <a:avLst/>
-          </a:prstGeom>
-        </p:spPr>
-        <p:style>
-          <a:lnRef idx="2">
-            <a:schemeClr val="dk1"/>
-          </a:lnRef>
-          <a:fillRef idx="1">
-            <a:schemeClr val="lt1"/>
-          </a:fillRef>
-          <a:effectRef idx="0">
-            <a:schemeClr val="dk1"/>
-          </a:effectRef>
-          <a:fontRef idx="minor">
-            <a:schemeClr val="dk1"/>
-          </a:fontRef>
-        </p:style>
-        <p:txBody>
-          <a:bodyPr rtlCol="0" anchor="ctr"/>
-          <a:lstStyle/>
-          <a:p>
-            <a:pPr algn="ctr"/>
-            <a:r>
-              <a:rPr lang="en-US" dirty="0"/>
-              <a:t>0</a:t>
-            </a:r>
-          </a:p>
-        </p:txBody>
-      </p:sp>
-      <p:sp>
-        <p:nvSpPr>
-          <p:cNvPr id="7" name="Oval 6">
-            <a:extLst>
-              <a:ext uri="{FF2B5EF4-FFF2-40B4-BE49-F238E27FC236}">
-                <a16:creationId xmlns:a16="http://schemas.microsoft.com/office/drawing/2014/main" id="{A56C4AEE-8DDB-4A18-AD45-8EBD68BD32AC}"/>
-              </a:ext>
-            </a:extLst>
-          </p:cNvPr>
-          <p:cNvSpPr/>
-          <p:nvPr/>
-        </p:nvSpPr>
-        <p:spPr>
-          <a:xfrm>
-            <a:off x="6204856" y="3189514"/>
-            <a:ext cx="595993" cy="530679"/>
-          </a:xfrm>
-          <a:prstGeom prst="ellipse">
-            <a:avLst/>
-          </a:prstGeom>
-        </p:spPr>
-        <p:style>
-          <a:lnRef idx="2">
-            <a:schemeClr val="dk1"/>
-          </a:lnRef>
-          <a:fillRef idx="1">
-            <a:schemeClr val="lt1"/>
-          </a:fillRef>
-          <a:effectRef idx="0">
-            <a:schemeClr val="dk1"/>
-          </a:effectRef>
-          <a:fontRef idx="minor">
-            <a:schemeClr val="dk1"/>
-          </a:fontRef>
-        </p:style>
-        <p:txBody>
-          <a:bodyPr rtlCol="0" anchor="ctr"/>
-          <a:lstStyle/>
-          <a:p>
-            <a:pPr algn="ctr"/>
-            <a:r>
-              <a:rPr lang="en-US" dirty="0"/>
-              <a:t>1</a:t>
-            </a:r>
-          </a:p>
-        </p:txBody>
-      </p:sp>
-      <p:sp>
-        <p:nvSpPr>
-          <p:cNvPr id="8" name="Rectangle 7">
-            <a:extLst>
-              <a:ext uri="{FF2B5EF4-FFF2-40B4-BE49-F238E27FC236}">
-                <a16:creationId xmlns:a16="http://schemas.microsoft.com/office/drawing/2014/main" id="{D2715158-6D12-4061-8B9B-58A76EDE2333}"/>
-              </a:ext>
-            </a:extLst>
-          </p:cNvPr>
-          <p:cNvSpPr/>
-          <p:nvPr/>
-        </p:nvSpPr>
-        <p:spPr>
-          <a:xfrm>
-            <a:off x="5018342" y="3189514"/>
-            <a:ext cx="595992" cy="530679"/>
-          </a:xfrm>
-          <a:prstGeom prst="rect">
-            <a:avLst/>
-          </a:prstGeom>
-        </p:spPr>
-        <p:style>
-          <a:lnRef idx="2">
-            <a:schemeClr val="accent4"/>
-          </a:lnRef>
-          <a:fillRef idx="1">
-            <a:schemeClr val="lt1"/>
-          </a:fillRef>
-          <a:effectRef idx="0">
-            <a:schemeClr val="accent4"/>
-          </a:effectRef>
-          <a:fontRef idx="minor">
-            <a:schemeClr val="dk1"/>
-          </a:fontRef>
-        </p:style>
-        <p:txBody>
-          <a:bodyPr rtlCol="0" anchor="ctr"/>
-          <a:lstStyle/>
-          <a:p>
-            <a:pPr algn="ctr"/>
-            <a:r>
-              <a:rPr lang="en-US" sz="1600" dirty="0"/>
-              <a:t>msg</a:t>
-            </a:r>
-          </a:p>
-        </p:txBody>
-      </p:sp>
-      <p:cxnSp>
-        <p:nvCxnSpPr>
-          <p:cNvPr id="10" name="Straight Arrow Connector 9">
-            <a:extLst>
-              <a:ext uri="{FF2B5EF4-FFF2-40B4-BE49-F238E27FC236}">
-                <a16:creationId xmlns:a16="http://schemas.microsoft.com/office/drawing/2014/main" id="{BEA1BE00-E4B8-4535-B6EB-43A2BFE0F0CB}"/>
-              </a:ext>
-            </a:extLst>
-          </p:cNvPr>
-          <p:cNvCxnSpPr>
-            <a:stCxn id="7" idx="0"/>
-            <a:endCxn id="6" idx="4"/>
-          </p:cNvCxnSpPr>
-          <p:nvPr/>
-        </p:nvCxnSpPr>
-        <p:spPr>
-          <a:xfrm flipV="1">
-            <a:off x="6502853" y="2310493"/>
-            <a:ext cx="1" cy="879021"/>
-          </a:xfrm>
-          <a:prstGeom prst="straightConnector1">
-            <a:avLst/>
-          </a:prstGeom>
-          <a:ln>
-            <a:tailEnd type="triangle"/>
-          </a:ln>
-        </p:spPr>
-        <p:style>
-          <a:lnRef idx="2">
-            <a:schemeClr val="dk1"/>
-          </a:lnRef>
-          <a:fillRef idx="0">
-            <a:schemeClr val="dk1"/>
-          </a:fillRef>
-          <a:effectRef idx="1">
-            <a:schemeClr val="dk1"/>
-          </a:effectRef>
-          <a:fontRef idx="minor">
-            <a:schemeClr val="tx1"/>
-          </a:fontRef>
-        </p:style>
-      </p:cxnSp>
-      <p:cxnSp>
-        <p:nvCxnSpPr>
-          <p:cNvPr id="12" name="Straight Arrow Connector 11">
-            <a:extLst>
-              <a:ext uri="{FF2B5EF4-FFF2-40B4-BE49-F238E27FC236}">
-                <a16:creationId xmlns:a16="http://schemas.microsoft.com/office/drawing/2014/main" id="{6A737AF1-688B-4A43-8155-1E00625A6BD9}"/>
-              </a:ext>
-            </a:extLst>
-          </p:cNvPr>
-          <p:cNvCxnSpPr>
-            <a:stCxn id="7" idx="2"/>
-            <a:endCxn id="8" idx="3"/>
-          </p:cNvCxnSpPr>
-          <p:nvPr/>
-        </p:nvCxnSpPr>
-        <p:spPr>
-          <a:xfrm flipH="1">
-            <a:off x="5614334" y="3454854"/>
-            <a:ext cx="590522" cy="0"/>
-          </a:xfrm>
-          <a:prstGeom prst="straightConnector1">
-            <a:avLst/>
-          </a:prstGeom>
-          <a:ln>
-            <a:tailEnd type="triangle"/>
-          </a:ln>
-        </p:spPr>
-        <p:style>
-          <a:lnRef idx="2">
-            <a:schemeClr val="dk1"/>
-          </a:lnRef>
-          <a:fillRef idx="0">
-            <a:schemeClr val="dk1"/>
-          </a:fillRef>
-          <a:effectRef idx="1">
-            <a:schemeClr val="dk1"/>
-          </a:effectRef>
-          <a:fontRef idx="minor">
-            <a:schemeClr val="tx1"/>
-          </a:fontRef>
-        </p:style>
-      </p:cxnSp>
-      <p:sp>
-        <p:nvSpPr>
-          <p:cNvPr id="14" name="Rectangle 13">
-            <a:extLst>
-              <a:ext uri="{FF2B5EF4-FFF2-40B4-BE49-F238E27FC236}">
-                <a16:creationId xmlns:a16="http://schemas.microsoft.com/office/drawing/2014/main" id="{E13D23E0-5115-4875-9A70-0CEC52AA547A}"/>
-              </a:ext>
-            </a:extLst>
-          </p:cNvPr>
-          <p:cNvSpPr/>
-          <p:nvPr/>
-        </p:nvSpPr>
-        <p:spPr>
-          <a:xfrm>
-            <a:off x="7554714" y="1785257"/>
-            <a:ext cx="595992" cy="530679"/>
-          </a:xfrm>
-          <a:prstGeom prst="rect">
-            <a:avLst/>
-          </a:prstGeom>
-        </p:spPr>
-        <p:style>
-          <a:lnRef idx="2">
-            <a:schemeClr val="accent4">
-              <a:shade val="50000"/>
-            </a:schemeClr>
-          </a:lnRef>
-          <a:fillRef idx="1">
-            <a:schemeClr val="accent4"/>
-          </a:fillRef>
-          <a:effectRef idx="0">
-            <a:schemeClr val="accent4"/>
-          </a:effectRef>
-          <a:fontRef idx="minor">
-            <a:schemeClr val="lt1"/>
-          </a:fontRef>
-        </p:style>
-        <p:txBody>
-          <a:bodyPr rtlCol="0" anchor="ctr"/>
-          <a:lstStyle/>
-          <a:p>
-            <a:pPr algn="ctr"/>
-            <a:r>
-              <a:rPr lang="en-US" sz="1600" dirty="0"/>
-              <a:t>msg</a:t>
-            </a:r>
-          </a:p>
-        </p:txBody>
-      </p:sp>
-      <p:cxnSp>
-        <p:nvCxnSpPr>
-          <p:cNvPr id="16" name="Straight Arrow Connector 15">
-            <a:extLst>
-              <a:ext uri="{FF2B5EF4-FFF2-40B4-BE49-F238E27FC236}">
-                <a16:creationId xmlns:a16="http://schemas.microsoft.com/office/drawing/2014/main" id="{C537E16C-DA83-457E-AC4D-F272D58683FF}"/>
-              </a:ext>
-            </a:extLst>
-          </p:cNvPr>
-          <p:cNvCxnSpPr>
-            <a:stCxn id="6" idx="6"/>
-            <a:endCxn id="14" idx="1"/>
-          </p:cNvCxnSpPr>
-          <p:nvPr/>
-        </p:nvCxnSpPr>
-        <p:spPr>
-          <a:xfrm>
-            <a:off x="6800850" y="2045154"/>
-            <a:ext cx="753864" cy="5443"/>
-          </a:xfrm>
-          <a:prstGeom prst="straightConnector1">
-            <a:avLst/>
-          </a:prstGeom>
-          <a:ln>
-            <a:tailEnd type="triangle"/>
-          </a:ln>
-        </p:spPr>
-        <p:style>
-          <a:lnRef idx="2">
-            <a:schemeClr val="dk1"/>
-          </a:lnRef>
-          <a:fillRef idx="0">
-            <a:schemeClr val="dk1"/>
-          </a:fillRef>
-          <a:effectRef idx="1">
-            <a:schemeClr val="dk1"/>
-          </a:effectRef>
-          <a:fontRef idx="minor">
-            <a:schemeClr val="tx1"/>
-          </a:fontRef>
-        </p:style>
-      </p:cxnSp>
     </p:spTree>
     <p:extLst>
       <p:ext uri="{BB962C8B-B14F-4D97-AF65-F5344CB8AC3E}">
-        <p14:creationId xmlns:p14="http://schemas.microsoft.com/office/powerpoint/2010/main" val="3896276527"/>
+        <p14:creationId xmlns:p14="http://schemas.microsoft.com/office/powerpoint/2010/main" val="2322508802"/>
       </p:ext>
     </p:extLst>
   </p:cSld>
@@ -6772,7 +6642,7 @@
           <p:cNvPr id="2" name="Title 1">
             <a:extLst>
               <a:ext uri="{FF2B5EF4-FFF2-40B4-BE49-F238E27FC236}">
-                <a16:creationId xmlns:a16="http://schemas.microsoft.com/office/drawing/2014/main" id="{F9793D32-27AD-46D2-BD8C-4FBF315BCCAF}"/>
+                <a16:creationId xmlns:a16="http://schemas.microsoft.com/office/drawing/2014/main" id="{6336A7E4-483D-4676-A512-DDF962A8B424}"/>
               </a:ext>
             </a:extLst>
           </p:cNvPr>
@@ -6786,12 +6656,12 @@
         <p:spPr/>
         <p:txBody>
           <a:bodyPr>
-            <a:normAutofit/>
+            <a:normAutofit fontScale="90000"/>
           </a:bodyPr>
           <a:lstStyle/>
           <a:p>
             <a:r>
-              <a:rPr lang="en-US" sz="1600" dirty="0">
+              <a:rPr lang="en-US" sz="2200" dirty="0">
                 <a:solidFill>
                   <a:srgbClr val="002060"/>
                 </a:solidFill>
@@ -6799,17 +6669,12 @@
               <a:t>Renaming</a:t>
             </a:r>
             <a:br>
-              <a:rPr lang="en-US" sz="2400" dirty="0"/>
+              <a:rPr lang="en-US" dirty="0"/>
             </a:br>
             <a:r>
-              <a:rPr lang="en-US" sz="2400" dirty="0"/>
-              <a:t>Step 2: Replace Identifiers of </a:t>
-            </a:r>
-            <a:r>
-              <a:rPr lang="en-US" sz="2400" dirty="0" err="1"/>
-              <a:t>Occurences</a:t>
-            </a:r>
-            <a:endParaRPr lang="en-US" dirty="0"/>
+              <a:rPr lang="en-US" dirty="0"/>
+              <a:t>Step 1: Select Occurrence</a:t>
+            </a:r>
           </a:p>
         </p:txBody>
       </p:sp>
@@ -6818,7 +6683,7 @@
           <p:cNvPr id="4" name="Picture 3">
             <a:extLst>
               <a:ext uri="{FF2B5EF4-FFF2-40B4-BE49-F238E27FC236}">
-                <a16:creationId xmlns:a16="http://schemas.microsoft.com/office/drawing/2014/main" id="{B0C1F266-EA05-4D3E-B7E8-136DAE477B98}"/>
+                <a16:creationId xmlns:a16="http://schemas.microsoft.com/office/drawing/2014/main" id="{D3E95A44-8B2F-4218-A71B-51E82AFCC9A5}"/>
               </a:ext>
             </a:extLst>
           </p:cNvPr>
@@ -6828,347 +6693,25 @@
           <p:nvPr/>
         </p:nvPicPr>
         <p:blipFill>
-          <a:blip r:embed="rId2"/>
+          <a:blip r:embed="rId3"/>
           <a:stretch>
             <a:fillRect/>
           </a:stretch>
         </p:blipFill>
         <p:spPr>
           <a:xfrm>
-            <a:off x="1763106" y="2143044"/>
-            <a:ext cx="2194974" cy="857412"/>
+            <a:off x="2847458" y="1063229"/>
+            <a:ext cx="4937760" cy="3943712"/>
           </a:xfrm>
           <a:prstGeom prst="rect">
             <a:avLst/>
           </a:prstGeom>
         </p:spPr>
       </p:pic>
-      <p:sp>
-        <p:nvSpPr>
-          <p:cNvPr id="5" name="Oval 4">
-            <a:extLst>
-              <a:ext uri="{FF2B5EF4-FFF2-40B4-BE49-F238E27FC236}">
-                <a16:creationId xmlns:a16="http://schemas.microsoft.com/office/drawing/2014/main" id="{0000CFB4-6C42-47CB-92B7-F3DD6B01CAB9}"/>
-              </a:ext>
-            </a:extLst>
-          </p:cNvPr>
-          <p:cNvSpPr/>
-          <p:nvPr/>
-        </p:nvSpPr>
-        <p:spPr>
-          <a:xfrm>
-            <a:off x="6204857" y="1779814"/>
-            <a:ext cx="595993" cy="530679"/>
-          </a:xfrm>
-          <a:prstGeom prst="ellipse">
-            <a:avLst/>
-          </a:prstGeom>
-        </p:spPr>
-        <p:style>
-          <a:lnRef idx="2">
-            <a:schemeClr val="dk1"/>
-          </a:lnRef>
-          <a:fillRef idx="1">
-            <a:schemeClr val="lt1"/>
-          </a:fillRef>
-          <a:effectRef idx="0">
-            <a:schemeClr val="dk1"/>
-          </a:effectRef>
-          <a:fontRef idx="minor">
-            <a:schemeClr val="dk1"/>
-          </a:fontRef>
-        </p:style>
-        <p:txBody>
-          <a:bodyPr rtlCol="0" anchor="ctr"/>
-          <a:lstStyle/>
-          <a:p>
-            <a:pPr algn="ctr"/>
-            <a:r>
-              <a:rPr lang="en-US" dirty="0"/>
-              <a:t>0</a:t>
-            </a:r>
-          </a:p>
-        </p:txBody>
-      </p:sp>
-      <p:sp>
-        <p:nvSpPr>
-          <p:cNvPr id="6" name="Oval 5">
-            <a:extLst>
-              <a:ext uri="{FF2B5EF4-FFF2-40B4-BE49-F238E27FC236}">
-                <a16:creationId xmlns:a16="http://schemas.microsoft.com/office/drawing/2014/main" id="{8E4A37EB-1F66-4D2F-887F-565128CAC9D0}"/>
-              </a:ext>
-            </a:extLst>
-          </p:cNvPr>
-          <p:cNvSpPr/>
-          <p:nvPr/>
-        </p:nvSpPr>
-        <p:spPr>
-          <a:xfrm>
-            <a:off x="6204856" y="3189514"/>
-            <a:ext cx="595993" cy="530679"/>
-          </a:xfrm>
-          <a:prstGeom prst="ellipse">
-            <a:avLst/>
-          </a:prstGeom>
-        </p:spPr>
-        <p:style>
-          <a:lnRef idx="2">
-            <a:schemeClr val="dk1"/>
-          </a:lnRef>
-          <a:fillRef idx="1">
-            <a:schemeClr val="lt1"/>
-          </a:fillRef>
-          <a:effectRef idx="0">
-            <a:schemeClr val="dk1"/>
-          </a:effectRef>
-          <a:fontRef idx="minor">
-            <a:schemeClr val="dk1"/>
-          </a:fontRef>
-        </p:style>
-        <p:txBody>
-          <a:bodyPr rtlCol="0" anchor="ctr"/>
-          <a:lstStyle/>
-          <a:p>
-            <a:pPr algn="ctr"/>
-            <a:r>
-              <a:rPr lang="en-US" dirty="0"/>
-              <a:t>1</a:t>
-            </a:r>
-          </a:p>
-        </p:txBody>
-      </p:sp>
-      <p:sp>
-        <p:nvSpPr>
-          <p:cNvPr id="7" name="Rectangle 6">
-            <a:extLst>
-              <a:ext uri="{FF2B5EF4-FFF2-40B4-BE49-F238E27FC236}">
-                <a16:creationId xmlns:a16="http://schemas.microsoft.com/office/drawing/2014/main" id="{4CBA913C-A2D3-4133-B57C-9C99AB6EEC18}"/>
-              </a:ext>
-            </a:extLst>
-          </p:cNvPr>
-          <p:cNvSpPr/>
-          <p:nvPr/>
-        </p:nvSpPr>
-        <p:spPr>
-          <a:xfrm>
-            <a:off x="5018342" y="3189514"/>
-            <a:ext cx="595992" cy="530679"/>
-          </a:xfrm>
-          <a:prstGeom prst="rect">
-            <a:avLst/>
-          </a:prstGeom>
-        </p:spPr>
-        <p:style>
-          <a:lnRef idx="2">
-            <a:schemeClr val="dk1"/>
-          </a:lnRef>
-          <a:fillRef idx="1">
-            <a:schemeClr val="lt1"/>
-          </a:fillRef>
-          <a:effectRef idx="0">
-            <a:schemeClr val="dk1"/>
-          </a:effectRef>
-          <a:fontRef idx="minor">
-            <a:schemeClr val="dk1"/>
-          </a:fontRef>
-        </p:style>
-        <p:txBody>
-          <a:bodyPr rtlCol="0" anchor="ctr"/>
-          <a:lstStyle/>
-          <a:p>
-            <a:pPr algn="ctr"/>
-            <a:r>
-              <a:rPr lang="en-US" sz="1600" dirty="0">
-                <a:solidFill>
-                  <a:srgbClr val="FF0000"/>
-                </a:solidFill>
-              </a:rPr>
-              <a:t>txt</a:t>
-            </a:r>
-          </a:p>
-        </p:txBody>
-      </p:sp>
-      <p:cxnSp>
-        <p:nvCxnSpPr>
-          <p:cNvPr id="8" name="Straight Arrow Connector 7">
-            <a:extLst>
-              <a:ext uri="{FF2B5EF4-FFF2-40B4-BE49-F238E27FC236}">
-                <a16:creationId xmlns:a16="http://schemas.microsoft.com/office/drawing/2014/main" id="{B75364D8-F9E6-4F9B-9E9C-86BD4B172BB3}"/>
-              </a:ext>
-            </a:extLst>
-          </p:cNvPr>
-          <p:cNvCxnSpPr>
-            <a:stCxn id="6" idx="0"/>
-            <a:endCxn id="5" idx="4"/>
-          </p:cNvCxnSpPr>
-          <p:nvPr/>
-        </p:nvCxnSpPr>
-        <p:spPr>
-          <a:xfrm flipV="1">
-            <a:off x="6502853" y="2310493"/>
-            <a:ext cx="1" cy="879021"/>
-          </a:xfrm>
-          <a:prstGeom prst="straightConnector1">
-            <a:avLst/>
-          </a:prstGeom>
-          <a:ln>
-            <a:tailEnd type="triangle"/>
-          </a:ln>
-        </p:spPr>
-        <p:style>
-          <a:lnRef idx="2">
-            <a:schemeClr val="dk1"/>
-          </a:lnRef>
-          <a:fillRef idx="0">
-            <a:schemeClr val="dk1"/>
-          </a:fillRef>
-          <a:effectRef idx="1">
-            <a:schemeClr val="dk1"/>
-          </a:effectRef>
-          <a:fontRef idx="minor">
-            <a:schemeClr val="tx1"/>
-          </a:fontRef>
-        </p:style>
-      </p:cxnSp>
-      <p:cxnSp>
-        <p:nvCxnSpPr>
-          <p:cNvPr id="9" name="Straight Arrow Connector 8">
-            <a:extLst>
-              <a:ext uri="{FF2B5EF4-FFF2-40B4-BE49-F238E27FC236}">
-                <a16:creationId xmlns:a16="http://schemas.microsoft.com/office/drawing/2014/main" id="{F36FC5D1-DD90-45A5-894F-83102108B6B1}"/>
-              </a:ext>
-            </a:extLst>
-          </p:cNvPr>
-          <p:cNvCxnSpPr>
-            <a:stCxn id="6" idx="2"/>
-            <a:endCxn id="7" idx="3"/>
-          </p:cNvCxnSpPr>
-          <p:nvPr/>
-        </p:nvCxnSpPr>
-        <p:spPr>
-          <a:xfrm flipH="1">
-            <a:off x="5614334" y="3454854"/>
-            <a:ext cx="590522" cy="0"/>
-          </a:xfrm>
-          <a:prstGeom prst="straightConnector1">
-            <a:avLst/>
-          </a:prstGeom>
-          <a:ln>
-            <a:tailEnd type="triangle"/>
-          </a:ln>
-        </p:spPr>
-        <p:style>
-          <a:lnRef idx="2">
-            <a:schemeClr val="dk1"/>
-          </a:lnRef>
-          <a:fillRef idx="0">
-            <a:schemeClr val="dk1"/>
-          </a:fillRef>
-          <a:effectRef idx="1">
-            <a:schemeClr val="dk1"/>
-          </a:effectRef>
-          <a:fontRef idx="minor">
-            <a:schemeClr val="tx1"/>
-          </a:fontRef>
-        </p:style>
-      </p:cxnSp>
-      <p:sp>
-        <p:nvSpPr>
-          <p:cNvPr id="10" name="Rectangle 9">
-            <a:extLst>
-              <a:ext uri="{FF2B5EF4-FFF2-40B4-BE49-F238E27FC236}">
-                <a16:creationId xmlns:a16="http://schemas.microsoft.com/office/drawing/2014/main" id="{D9F1633E-ADA0-42C8-96D8-B9D81F9A4375}"/>
-              </a:ext>
-            </a:extLst>
-          </p:cNvPr>
-          <p:cNvSpPr/>
-          <p:nvPr/>
-        </p:nvSpPr>
-        <p:spPr>
-          <a:xfrm>
-            <a:off x="7554714" y="1785257"/>
-            <a:ext cx="595992" cy="530679"/>
-          </a:xfrm>
-          <a:prstGeom prst="rect">
-            <a:avLst/>
-          </a:prstGeom>
-        </p:spPr>
-        <p:style>
-          <a:lnRef idx="2">
-            <a:schemeClr val="dk1"/>
-          </a:lnRef>
-          <a:fillRef idx="1">
-            <a:schemeClr val="lt1"/>
-          </a:fillRef>
-          <a:effectRef idx="0">
-            <a:schemeClr val="dk1"/>
-          </a:effectRef>
-          <a:fontRef idx="minor">
-            <a:schemeClr val="dk1"/>
-          </a:fontRef>
-        </p:style>
-        <p:txBody>
-          <a:bodyPr rtlCol="0" anchor="ctr"/>
-          <a:lstStyle/>
-          <a:p>
-            <a:pPr algn="ctr"/>
-            <a:r>
-              <a:rPr lang="en-US" sz="1600" dirty="0">
-                <a:solidFill>
-                  <a:srgbClr val="FF0000"/>
-                </a:solidFill>
-              </a:rPr>
-              <a:t>txt</a:t>
-            </a:r>
-          </a:p>
-        </p:txBody>
-      </p:sp>
-      <p:cxnSp>
-        <p:nvCxnSpPr>
-          <p:cNvPr id="11" name="Straight Arrow Connector 10">
-            <a:extLst>
-              <a:ext uri="{FF2B5EF4-FFF2-40B4-BE49-F238E27FC236}">
-                <a16:creationId xmlns:a16="http://schemas.microsoft.com/office/drawing/2014/main" id="{5BBC203B-495B-42F0-830A-B8D324382B2B}"/>
-              </a:ext>
-            </a:extLst>
-          </p:cNvPr>
-          <p:cNvCxnSpPr>
-            <a:stCxn id="5" idx="6"/>
-            <a:endCxn id="10" idx="1"/>
-          </p:cNvCxnSpPr>
-          <p:nvPr/>
-        </p:nvCxnSpPr>
-        <p:spPr>
-          <a:xfrm>
-            <a:off x="6800850" y="2045154"/>
-            <a:ext cx="753864" cy="5443"/>
-          </a:xfrm>
-          <a:prstGeom prst="straightConnector1">
-            <a:avLst/>
-          </a:prstGeom>
-          <a:ln>
-            <a:tailEnd type="triangle"/>
-          </a:ln>
-        </p:spPr>
-        <p:style>
-          <a:lnRef idx="2">
-            <a:schemeClr val="dk1"/>
-          </a:lnRef>
-          <a:fillRef idx="0">
-            <a:schemeClr val="dk1"/>
-          </a:fillRef>
-          <a:effectRef idx="1">
-            <a:schemeClr val="dk1"/>
-          </a:effectRef>
-          <a:fontRef idx="minor">
-            <a:schemeClr val="tx1"/>
-          </a:fontRef>
-        </p:style>
-      </p:cxnSp>
     </p:spTree>
     <p:extLst>
       <p:ext uri="{BB962C8B-B14F-4D97-AF65-F5344CB8AC3E}">
-        <p14:creationId xmlns:p14="http://schemas.microsoft.com/office/powerpoint/2010/main" val="3024732461"/>
+        <p14:creationId xmlns:p14="http://schemas.microsoft.com/office/powerpoint/2010/main" val="3896276527"/>
       </p:ext>
     </p:extLst>
   </p:cSld>
@@ -7179,6 +6722,208 @@
 </file>
 
 <file path=ppt/slides/slide13.xml><?xml version="1.0" encoding="utf-8"?>
+<p:sld xmlns:a="http://schemas.openxmlformats.org/drawingml/2006/main" xmlns:r="http://schemas.openxmlformats.org/officeDocument/2006/relationships" xmlns:p="http://schemas.openxmlformats.org/presentationml/2006/main">
+  <p:cSld>
+    <p:spTree>
+      <p:nvGrpSpPr>
+        <p:cNvPr id="1" name=""/>
+        <p:cNvGrpSpPr/>
+        <p:nvPr/>
+      </p:nvGrpSpPr>
+      <p:grpSpPr>
+        <a:xfrm>
+          <a:off x="0" y="0"/>
+          <a:ext cx="0" cy="0"/>
+          <a:chOff x="0" y="0"/>
+          <a:chExt cx="0" cy="0"/>
+        </a:xfrm>
+      </p:grpSpPr>
+      <p:sp>
+        <p:nvSpPr>
+          <p:cNvPr id="2" name="Title 1">
+            <a:extLst>
+              <a:ext uri="{FF2B5EF4-FFF2-40B4-BE49-F238E27FC236}">
+                <a16:creationId xmlns:a16="http://schemas.microsoft.com/office/drawing/2014/main" id="{6336A7E4-483D-4676-A512-DDF962A8B424}"/>
+              </a:ext>
+            </a:extLst>
+          </p:cNvPr>
+          <p:cNvSpPr>
+            <a:spLocks noGrp="1"/>
+          </p:cNvSpPr>
+          <p:nvPr>
+            <p:ph type="title"/>
+          </p:nvPr>
+        </p:nvSpPr>
+        <p:spPr/>
+        <p:txBody>
+          <a:bodyPr>
+            <a:normAutofit fontScale="90000"/>
+          </a:bodyPr>
+          <a:lstStyle/>
+          <a:p>
+            <a:r>
+              <a:rPr lang="en-US" sz="2200" dirty="0">
+                <a:solidFill>
+                  <a:srgbClr val="002060"/>
+                </a:solidFill>
+              </a:rPr>
+              <a:t>Renaming</a:t>
+            </a:r>
+            <a:br>
+              <a:rPr lang="en-US" dirty="0"/>
+            </a:br>
+            <a:r>
+              <a:rPr lang="en-US" dirty="0"/>
+              <a:t>Step 2: Find Declaration</a:t>
+            </a:r>
+          </a:p>
+        </p:txBody>
+      </p:sp>
+      <p:pic>
+        <p:nvPicPr>
+          <p:cNvPr id="5" name="Picture 4">
+            <a:extLst>
+              <a:ext uri="{FF2B5EF4-FFF2-40B4-BE49-F238E27FC236}">
+                <a16:creationId xmlns:a16="http://schemas.microsoft.com/office/drawing/2014/main" id="{ADB6104F-8423-4E7E-B75C-E731A5643EBC}"/>
+              </a:ext>
+            </a:extLst>
+          </p:cNvPr>
+          <p:cNvPicPr>
+            <a:picLocks noChangeAspect="1"/>
+          </p:cNvPicPr>
+          <p:nvPr/>
+        </p:nvPicPr>
+        <p:blipFill>
+          <a:blip r:embed="rId3"/>
+          <a:stretch>
+            <a:fillRect/>
+          </a:stretch>
+        </p:blipFill>
+        <p:spPr>
+          <a:xfrm>
+            <a:off x="2847458" y="1063229"/>
+            <a:ext cx="4937760" cy="3943711"/>
+          </a:xfrm>
+          <a:prstGeom prst="rect">
+            <a:avLst/>
+          </a:prstGeom>
+        </p:spPr>
+      </p:pic>
+    </p:spTree>
+    <p:extLst>
+      <p:ext uri="{BB962C8B-B14F-4D97-AF65-F5344CB8AC3E}">
+        <p14:creationId xmlns:p14="http://schemas.microsoft.com/office/powerpoint/2010/main" val="194090044"/>
+      </p:ext>
+    </p:extLst>
+  </p:cSld>
+  <p:clrMapOvr>
+    <a:masterClrMapping/>
+  </p:clrMapOvr>
+</p:sld>
+</file>
+
+<file path=ppt/slides/slide14.xml><?xml version="1.0" encoding="utf-8"?>
+<p:sld xmlns:a="http://schemas.openxmlformats.org/drawingml/2006/main" xmlns:r="http://schemas.openxmlformats.org/officeDocument/2006/relationships" xmlns:p="http://schemas.openxmlformats.org/presentationml/2006/main">
+  <p:cSld>
+    <p:spTree>
+      <p:nvGrpSpPr>
+        <p:cNvPr id="1" name=""/>
+        <p:cNvGrpSpPr/>
+        <p:nvPr/>
+      </p:nvGrpSpPr>
+      <p:grpSpPr>
+        <a:xfrm>
+          <a:off x="0" y="0"/>
+          <a:ext cx="0" cy="0"/>
+          <a:chOff x="0" y="0"/>
+          <a:chExt cx="0" cy="0"/>
+        </a:xfrm>
+      </p:grpSpPr>
+      <p:sp>
+        <p:nvSpPr>
+          <p:cNvPr id="2" name="Title 1">
+            <a:extLst>
+              <a:ext uri="{FF2B5EF4-FFF2-40B4-BE49-F238E27FC236}">
+                <a16:creationId xmlns:a16="http://schemas.microsoft.com/office/drawing/2014/main" id="{6336A7E4-483D-4676-A512-DDF962A8B424}"/>
+              </a:ext>
+            </a:extLst>
+          </p:cNvPr>
+          <p:cNvSpPr>
+            <a:spLocks noGrp="1"/>
+          </p:cNvSpPr>
+          <p:nvPr>
+            <p:ph type="title"/>
+          </p:nvPr>
+        </p:nvSpPr>
+        <p:spPr/>
+        <p:txBody>
+          <a:bodyPr>
+            <a:normAutofit fontScale="90000"/>
+          </a:bodyPr>
+          <a:lstStyle/>
+          <a:p>
+            <a:r>
+              <a:rPr lang="en-US" sz="2200" dirty="0">
+                <a:solidFill>
+                  <a:srgbClr val="002060"/>
+                </a:solidFill>
+              </a:rPr>
+              <a:t>Renaming</a:t>
+            </a:r>
+            <a:br>
+              <a:rPr lang="en-US" dirty="0"/>
+            </a:br>
+            <a:r>
+              <a:rPr lang="en-US" dirty="0"/>
+              <a:t>Step 3: Rename Occurrences</a:t>
+            </a:r>
+          </a:p>
+        </p:txBody>
+      </p:sp>
+      <p:pic>
+        <p:nvPicPr>
+          <p:cNvPr id="4" name="Picture 3">
+            <a:extLst>
+              <a:ext uri="{FF2B5EF4-FFF2-40B4-BE49-F238E27FC236}">
+                <a16:creationId xmlns:a16="http://schemas.microsoft.com/office/drawing/2014/main" id="{D3E95A44-8B2F-4218-A71B-51E82AFCC9A5}"/>
+              </a:ext>
+            </a:extLst>
+          </p:cNvPr>
+          <p:cNvPicPr>
+            <a:picLocks noChangeAspect="1"/>
+          </p:cNvPicPr>
+          <p:nvPr/>
+        </p:nvPicPr>
+        <p:blipFill>
+          <a:blip r:embed="rId3"/>
+          <a:stretch>
+            <a:fillRect/>
+          </a:stretch>
+        </p:blipFill>
+        <p:spPr>
+          <a:xfrm>
+            <a:off x="2847458" y="1063229"/>
+            <a:ext cx="4937760" cy="3943712"/>
+          </a:xfrm>
+          <a:prstGeom prst="rect">
+            <a:avLst/>
+          </a:prstGeom>
+        </p:spPr>
+      </p:pic>
+    </p:spTree>
+    <p:extLst>
+      <p:ext uri="{BB962C8B-B14F-4D97-AF65-F5344CB8AC3E}">
+        <p14:creationId xmlns:p14="http://schemas.microsoft.com/office/powerpoint/2010/main" val="544537504"/>
+      </p:ext>
+    </p:extLst>
+  </p:cSld>
+  <p:clrMapOvr>
+    <a:masterClrMapping/>
+  </p:clrMapOvr>
+</p:sld>
+</file>
+
+<file path=ppt/slides/slide15.xml><?xml version="1.0" encoding="utf-8"?>
 <p:sld xmlns:a="http://schemas.openxmlformats.org/drawingml/2006/main" xmlns:r="http://schemas.openxmlformats.org/officeDocument/2006/relationships" xmlns:p="http://schemas.openxmlformats.org/presentationml/2006/main">
   <p:cSld>
     <p:spTree>
@@ -7231,7 +6976,7 @@
             </a:br>
             <a:r>
               <a:rPr lang="en-US" dirty="0"/>
-              <a:t>The Foo Challenge Demo</a:t>
+              <a:t>The Foo Challenge DEMO</a:t>
             </a:r>
           </a:p>
         </p:txBody>
@@ -7279,7 +7024,7 @@
 </p:sld>
 </file>
 
-<file path=ppt/slides/slide14.xml><?xml version="1.0" encoding="utf-8"?>
+<file path=ppt/slides/slide16.xml><?xml version="1.0" encoding="utf-8"?>
 <p:sld xmlns:a="http://schemas.openxmlformats.org/drawingml/2006/main" xmlns:r="http://schemas.openxmlformats.org/officeDocument/2006/relationships" xmlns:p="http://schemas.openxmlformats.org/presentationml/2006/main">
   <p:cSld>
     <p:spTree>
@@ -7454,7 +7199,7 @@
 </p:sld>
 </file>
 
-<file path=ppt/slides/slide15.xml><?xml version="1.0" encoding="utf-8"?>
+<file path=ppt/slides/slide17.xml><?xml version="1.0" encoding="utf-8"?>
 <p:sld xmlns:a="http://schemas.openxmlformats.org/drawingml/2006/main" xmlns:r="http://schemas.openxmlformats.org/officeDocument/2006/relationships" xmlns:p="http://schemas.openxmlformats.org/presentationml/2006/main">
   <p:cSld>
     <p:spTree>
@@ -7512,227 +7257,39 @@
           </a:p>
         </p:txBody>
       </p:sp>
-      <p:sp>
-        <p:nvSpPr>
-          <p:cNvPr id="3" name="Content Placeholder 2">
+      <p:pic>
+        <p:nvPicPr>
+          <p:cNvPr id="5" name="Content Placeholder 4">
             <a:extLst>
               <a:ext uri="{FF2B5EF4-FFF2-40B4-BE49-F238E27FC236}">
-                <a16:creationId xmlns:a16="http://schemas.microsoft.com/office/drawing/2014/main" id="{08959BD0-8110-425A-B068-D71BBF3B229D}"/>
+                <a16:creationId xmlns:a16="http://schemas.microsoft.com/office/drawing/2014/main" id="{0206DDF9-AC12-4617-9534-F6243793B3CC}"/>
               </a:ext>
             </a:extLst>
           </p:cNvPr>
-          <p:cNvSpPr>
-            <a:spLocks noGrp="1"/>
-          </p:cNvSpPr>
+          <p:cNvPicPr>
+            <a:picLocks noGrp="1" noChangeAspect="1"/>
+          </p:cNvPicPr>
           <p:nvPr>
             <p:ph idx="1"/>
           </p:nvPr>
-        </p:nvSpPr>
-        <p:spPr/>
-        <p:txBody>
-          <a:bodyPr/>
-          <a:lstStyle/>
-          <a:p>
-            <a:endParaRPr lang="en-US"/>
-          </a:p>
-        </p:txBody>
-      </p:sp>
+        </p:nvPicPr>
+        <p:blipFill>
+          <a:blip r:embed="rId2"/>
+          <a:stretch>
+            <a:fillRect/>
+          </a:stretch>
+        </p:blipFill>
+        <p:spPr>
+          <a:xfrm>
+            <a:off x="2822854" y="1063230"/>
+            <a:ext cx="4986968" cy="3080186"/>
+          </a:xfrm>
+        </p:spPr>
+      </p:pic>
     </p:spTree>
     <p:extLst>
       <p:ext uri="{BB962C8B-B14F-4D97-AF65-F5344CB8AC3E}">
         <p14:creationId xmlns:p14="http://schemas.microsoft.com/office/powerpoint/2010/main" val="4003891620"/>
-      </p:ext>
-    </p:extLst>
-  </p:cSld>
-  <p:clrMapOvr>
-    <a:masterClrMapping/>
-  </p:clrMapOvr>
-</p:sld>
-</file>
-
-<file path=ppt/slides/slide16.xml><?xml version="1.0" encoding="utf-8"?>
-<p:sld xmlns:a="http://schemas.openxmlformats.org/drawingml/2006/main" xmlns:r="http://schemas.openxmlformats.org/officeDocument/2006/relationships" xmlns:p="http://schemas.openxmlformats.org/presentationml/2006/main">
-  <p:cSld>
-    <p:spTree>
-      <p:nvGrpSpPr>
-        <p:cNvPr id="1" name=""/>
-        <p:cNvGrpSpPr/>
-        <p:nvPr/>
-      </p:nvGrpSpPr>
-      <p:grpSpPr>
-        <a:xfrm>
-          <a:off x="0" y="0"/>
-          <a:ext cx="0" cy="0"/>
-          <a:chOff x="0" y="0"/>
-          <a:chExt cx="0" cy="0"/>
-        </a:xfrm>
-      </p:grpSpPr>
-      <p:sp>
-        <p:nvSpPr>
-          <p:cNvPr id="2" name="Title 1">
-            <a:extLst>
-              <a:ext uri="{FF2B5EF4-FFF2-40B4-BE49-F238E27FC236}">
-                <a16:creationId xmlns:a16="http://schemas.microsoft.com/office/drawing/2014/main" id="{75242ED9-550F-4CFB-9C3E-FC559B6FDFB2}"/>
-              </a:ext>
-            </a:extLst>
-          </p:cNvPr>
-          <p:cNvSpPr>
-            <a:spLocks noGrp="1"/>
-          </p:cNvSpPr>
-          <p:nvPr>
-            <p:ph type="title"/>
-          </p:nvPr>
-        </p:nvSpPr>
-        <p:spPr/>
-        <p:txBody>
-          <a:bodyPr>
-            <a:normAutofit fontScale="90000"/>
-          </a:bodyPr>
-          <a:lstStyle/>
-          <a:p>
-            <a:r>
-              <a:rPr lang="en-US" sz="2200" dirty="0">
-                <a:solidFill>
-                  <a:srgbClr val="002060"/>
-                </a:solidFill>
-              </a:rPr>
-              <a:t>Inline</a:t>
-            </a:r>
-            <a:br>
-              <a:rPr lang="en-US" dirty="0"/>
-            </a:br>
-            <a:r>
-              <a:rPr lang="en-US" dirty="0"/>
-              <a:t>Step 1: Find Function Declaration</a:t>
-            </a:r>
-          </a:p>
-        </p:txBody>
-      </p:sp>
-      <p:sp>
-        <p:nvSpPr>
-          <p:cNvPr id="3" name="Content Placeholder 2">
-            <a:extLst>
-              <a:ext uri="{FF2B5EF4-FFF2-40B4-BE49-F238E27FC236}">
-                <a16:creationId xmlns:a16="http://schemas.microsoft.com/office/drawing/2014/main" id="{DC80C796-6D02-42F5-9E01-05B2D8DD6D36}"/>
-              </a:ext>
-            </a:extLst>
-          </p:cNvPr>
-          <p:cNvSpPr>
-            <a:spLocks noGrp="1"/>
-          </p:cNvSpPr>
-          <p:nvPr>
-            <p:ph idx="1"/>
-          </p:nvPr>
-        </p:nvSpPr>
-        <p:spPr/>
-        <p:txBody>
-          <a:bodyPr/>
-          <a:lstStyle/>
-          <a:p>
-            <a:endParaRPr lang="en-US"/>
-          </a:p>
-        </p:txBody>
-      </p:sp>
-    </p:spTree>
-    <p:extLst>
-      <p:ext uri="{BB962C8B-B14F-4D97-AF65-F5344CB8AC3E}">
-        <p14:creationId xmlns:p14="http://schemas.microsoft.com/office/powerpoint/2010/main" val="649359674"/>
-      </p:ext>
-    </p:extLst>
-  </p:cSld>
-  <p:clrMapOvr>
-    <a:masterClrMapping/>
-  </p:clrMapOvr>
-</p:sld>
-</file>
-
-<file path=ppt/slides/slide17.xml><?xml version="1.0" encoding="utf-8"?>
-<p:sld xmlns:a="http://schemas.openxmlformats.org/drawingml/2006/main" xmlns:r="http://schemas.openxmlformats.org/officeDocument/2006/relationships" xmlns:p="http://schemas.openxmlformats.org/presentationml/2006/main">
-  <p:cSld>
-    <p:spTree>
-      <p:nvGrpSpPr>
-        <p:cNvPr id="1" name=""/>
-        <p:cNvGrpSpPr/>
-        <p:nvPr/>
-      </p:nvGrpSpPr>
-      <p:grpSpPr>
-        <a:xfrm>
-          <a:off x="0" y="0"/>
-          <a:ext cx="0" cy="0"/>
-          <a:chOff x="0" y="0"/>
-          <a:chExt cx="0" cy="0"/>
-        </a:xfrm>
-      </p:grpSpPr>
-      <p:sp>
-        <p:nvSpPr>
-          <p:cNvPr id="2" name="Title 1">
-            <a:extLst>
-              <a:ext uri="{FF2B5EF4-FFF2-40B4-BE49-F238E27FC236}">
-                <a16:creationId xmlns:a16="http://schemas.microsoft.com/office/drawing/2014/main" id="{DA980ABF-8158-4458-B148-CDA7476D6D5B}"/>
-              </a:ext>
-            </a:extLst>
-          </p:cNvPr>
-          <p:cNvSpPr>
-            <a:spLocks noGrp="1"/>
-          </p:cNvSpPr>
-          <p:nvPr>
-            <p:ph type="title"/>
-          </p:nvPr>
-        </p:nvSpPr>
-        <p:spPr/>
-        <p:txBody>
-          <a:bodyPr>
-            <a:normAutofit fontScale="90000"/>
-          </a:bodyPr>
-          <a:lstStyle/>
-          <a:p>
-            <a:r>
-              <a:rPr lang="en-US" sz="2200" dirty="0">
-                <a:solidFill>
-                  <a:srgbClr val="002060"/>
-                </a:solidFill>
-              </a:rPr>
-              <a:t>Inline</a:t>
-            </a:r>
-            <a:br>
-              <a:rPr lang="en-US" dirty="0"/>
-            </a:br>
-            <a:r>
-              <a:rPr lang="en-US" dirty="0"/>
-              <a:t>Step 2: Replace Call</a:t>
-            </a:r>
-          </a:p>
-        </p:txBody>
-      </p:sp>
-      <p:sp>
-        <p:nvSpPr>
-          <p:cNvPr id="3" name="Content Placeholder 2">
-            <a:extLst>
-              <a:ext uri="{FF2B5EF4-FFF2-40B4-BE49-F238E27FC236}">
-                <a16:creationId xmlns:a16="http://schemas.microsoft.com/office/drawing/2014/main" id="{ADDFD673-5B6F-4B6F-B6AD-69444052CE36}"/>
-              </a:ext>
-            </a:extLst>
-          </p:cNvPr>
-          <p:cNvSpPr>
-            <a:spLocks noGrp="1"/>
-          </p:cNvSpPr>
-          <p:nvPr>
-            <p:ph idx="1"/>
-          </p:nvPr>
-        </p:nvSpPr>
-        <p:spPr/>
-        <p:txBody>
-          <a:bodyPr/>
-          <a:lstStyle/>
-          <a:p>
-            <a:endParaRPr lang="en-US"/>
-          </a:p>
-        </p:txBody>
-      </p:sp>
-    </p:spTree>
-    <p:extLst>
-      <p:ext uri="{BB962C8B-B14F-4D97-AF65-F5344CB8AC3E}">
-        <p14:creationId xmlns:p14="http://schemas.microsoft.com/office/powerpoint/2010/main" val="2385298871"/>
       </p:ext>
     </p:extLst>
   </p:cSld>
@@ -7764,7 +7321,7 @@
           <p:cNvPr id="2" name="Title 1">
             <a:extLst>
               <a:ext uri="{FF2B5EF4-FFF2-40B4-BE49-F238E27FC236}">
-                <a16:creationId xmlns:a16="http://schemas.microsoft.com/office/drawing/2014/main" id="{A3F3E1CF-733D-4EAA-A4A4-EFE33F6F4D1E}"/>
+                <a16:creationId xmlns:a16="http://schemas.microsoft.com/office/drawing/2014/main" id="{ECD5D206-1B52-4E07-B3DD-E6500A5F14FE}"/>
               </a:ext>
             </a:extLst>
           </p:cNvPr>
@@ -7783,52 +7340,56 @@
           <a:lstStyle/>
           <a:p>
             <a:r>
-              <a:rPr lang="en-US" sz="2200" dirty="0">
+              <a:rPr lang="en-US" sz="2400" dirty="0">
                 <a:solidFill>
                   <a:srgbClr val="002060"/>
                 </a:solidFill>
               </a:rPr>
-              <a:t>Inline</a:t>
+              <a:t>Renaming</a:t>
             </a:r>
             <a:br>
               <a:rPr lang="en-US" dirty="0"/>
             </a:br>
             <a:r>
               <a:rPr lang="en-US" dirty="0"/>
-              <a:t>Step 3: Delete Declaration</a:t>
+              <a:t>Solution: Capture</a:t>
             </a:r>
           </a:p>
         </p:txBody>
       </p:sp>
-      <p:sp>
-        <p:nvSpPr>
-          <p:cNvPr id="3" name="Content Placeholder 2">
+      <p:pic>
+        <p:nvPicPr>
+          <p:cNvPr id="7" name="Content Placeholder 6">
             <a:extLst>
               <a:ext uri="{FF2B5EF4-FFF2-40B4-BE49-F238E27FC236}">
-                <a16:creationId xmlns:a16="http://schemas.microsoft.com/office/drawing/2014/main" id="{4C47954A-2906-4D59-8585-23E7BB9A1A3B}"/>
+                <a16:creationId xmlns:a16="http://schemas.microsoft.com/office/drawing/2014/main" id="{1C840A38-DF82-42E8-A313-7FDA5C2BC25E}"/>
               </a:ext>
             </a:extLst>
           </p:cNvPr>
-          <p:cNvSpPr>
-            <a:spLocks noGrp="1"/>
-          </p:cNvSpPr>
+          <p:cNvPicPr>
+            <a:picLocks noGrp="1" noChangeAspect="1"/>
+          </p:cNvPicPr>
           <p:nvPr>
             <p:ph idx="1"/>
           </p:nvPr>
-        </p:nvSpPr>
-        <p:spPr/>
-        <p:txBody>
-          <a:bodyPr/>
-          <a:lstStyle/>
-          <a:p>
-            <a:endParaRPr lang="en-US"/>
-          </a:p>
-        </p:txBody>
-      </p:sp>
+        </p:nvPicPr>
+        <p:blipFill>
+          <a:blip r:embed="rId2"/>
+          <a:stretch>
+            <a:fillRect/>
+          </a:stretch>
+        </p:blipFill>
+        <p:spPr>
+          <a:xfrm>
+            <a:off x="2824598" y="1063229"/>
+            <a:ext cx="4983480" cy="3078032"/>
+          </a:xfrm>
+        </p:spPr>
+      </p:pic>
     </p:spTree>
     <p:extLst>
       <p:ext uri="{BB962C8B-B14F-4D97-AF65-F5344CB8AC3E}">
-        <p14:creationId xmlns:p14="http://schemas.microsoft.com/office/powerpoint/2010/main" val="554729800"/>
+        <p14:creationId xmlns:p14="http://schemas.microsoft.com/office/powerpoint/2010/main" val="4077251998"/>
       </p:ext>
     </p:extLst>
   </p:cSld>
@@ -7860,7 +7421,7 @@
           <p:cNvPr id="2" name="Title 1">
             <a:extLst>
               <a:ext uri="{FF2B5EF4-FFF2-40B4-BE49-F238E27FC236}">
-                <a16:creationId xmlns:a16="http://schemas.microsoft.com/office/drawing/2014/main" id="{3D4EAE92-26B5-43BA-BF3C-B8A35C8C41C0}"/>
+                <a16:creationId xmlns:a16="http://schemas.microsoft.com/office/drawing/2014/main" id="{D909F41F-2DB6-48DF-BE2F-2FF7F1198D8D}"/>
               </a:ext>
             </a:extLst>
           </p:cNvPr>
@@ -7879,44 +7440,123 @@
           <a:lstStyle/>
           <a:p>
             <a:r>
-              <a:rPr lang="en-US" sz="2200" dirty="0">
+              <a:rPr lang="en-US" sz="2400" dirty="0">
                 <a:solidFill>
                   <a:srgbClr val="002060"/>
                 </a:solidFill>
               </a:rPr>
-              <a:t>Inline</a:t>
+              <a:t>Renaming</a:t>
             </a:r>
             <a:br>
               <a:rPr lang="en-US" dirty="0"/>
             </a:br>
             <a:r>
               <a:rPr lang="en-US" dirty="0"/>
-              <a:t>Problem: Recursive Calls</a:t>
+              <a:t>Problem: Capture DEMO</a:t>
             </a:r>
           </a:p>
         </p:txBody>
       </p:sp>
-      <p:sp>
-        <p:nvSpPr>
-          <p:cNvPr id="3" name="Content Placeholder 2">
+      <p:pic>
+        <p:nvPicPr>
+          <p:cNvPr id="4" name="Picture 3">
             <a:extLst>
               <a:ext uri="{FF2B5EF4-FFF2-40B4-BE49-F238E27FC236}">
-                <a16:creationId xmlns:a16="http://schemas.microsoft.com/office/drawing/2014/main" id="{F244BE0B-79E0-4B2E-9ED3-06BC7CAB1F21}"/>
+                <a16:creationId xmlns:a16="http://schemas.microsoft.com/office/drawing/2014/main" id="{7D721E03-F7E6-4599-8233-6BD1E28E0ABA}"/>
               </a:ext>
             </a:extLst>
           </p:cNvPr>
-          <p:cNvSpPr>
-            <a:spLocks noGrp="1"/>
-          </p:cNvSpPr>
-          <p:nvPr>
-            <p:ph idx="1"/>
-          </p:nvPr>
+          <p:cNvPicPr>
+            <a:picLocks noChangeAspect="1"/>
+          </p:cNvPicPr>
+          <p:nvPr/>
+        </p:nvPicPr>
+        <p:blipFill>
+          <a:blip r:embed="rId2"/>
+          <a:stretch>
+            <a:fillRect/>
+          </a:stretch>
+        </p:blipFill>
+        <p:spPr>
+          <a:xfrm>
+            <a:off x="1763106" y="1431398"/>
+            <a:ext cx="2512490" cy="2722895"/>
+          </a:xfrm>
+          <a:prstGeom prst="rect">
+            <a:avLst/>
+          </a:prstGeom>
+        </p:spPr>
+      </p:pic>
+      <p:pic>
+        <p:nvPicPr>
+          <p:cNvPr id="5" name="Picture 4">
+            <a:extLst>
+              <a:ext uri="{FF2B5EF4-FFF2-40B4-BE49-F238E27FC236}">
+                <a16:creationId xmlns:a16="http://schemas.microsoft.com/office/drawing/2014/main" id="{D6F212CD-5194-428A-929B-0E2E558C0596}"/>
+              </a:ext>
+            </a:extLst>
+          </p:cNvPr>
+          <p:cNvPicPr>
+            <a:picLocks noChangeAspect="1"/>
+          </p:cNvPicPr>
+          <p:nvPr/>
+        </p:nvPicPr>
+        <p:blipFill>
+          <a:blip r:embed="rId3"/>
+          <a:stretch>
+            <a:fillRect/>
+          </a:stretch>
+        </p:blipFill>
+        <p:spPr>
+          <a:xfrm>
+            <a:off x="5743776" y="1431398"/>
+            <a:ext cx="2512490" cy="2722894"/>
+          </a:xfrm>
+          <a:prstGeom prst="rect">
+            <a:avLst/>
+          </a:prstGeom>
+        </p:spPr>
+      </p:pic>
+      <p:sp>
+        <p:nvSpPr>
+          <p:cNvPr id="6" name="Arrow: Right 5">
+            <a:extLst>
+              <a:ext uri="{FF2B5EF4-FFF2-40B4-BE49-F238E27FC236}">
+                <a16:creationId xmlns:a16="http://schemas.microsoft.com/office/drawing/2014/main" id="{2931FEA3-A857-41AF-9DAB-9589D7B5B324}"/>
+              </a:ext>
+            </a:extLst>
+          </p:cNvPr>
+          <p:cNvSpPr/>
+          <p:nvPr/>
         </p:nvSpPr>
-        <p:spPr/>
+        <p:spPr>
+          <a:xfrm>
+            <a:off x="4704016" y="2498930"/>
+            <a:ext cx="612322" cy="587829"/>
+          </a:xfrm>
+          <a:prstGeom prst="rightArrow">
+            <a:avLst/>
+          </a:prstGeom>
+        </p:spPr>
+        <p:style>
+          <a:lnRef idx="1">
+            <a:schemeClr val="accent4"/>
+          </a:lnRef>
+          <a:fillRef idx="3">
+            <a:schemeClr val="accent4"/>
+          </a:fillRef>
+          <a:effectRef idx="2">
+            <a:schemeClr val="accent4"/>
+          </a:effectRef>
+          <a:fontRef idx="minor">
+            <a:schemeClr val="lt1"/>
+          </a:fontRef>
+        </p:style>
         <p:txBody>
-          <a:bodyPr/>
+          <a:bodyPr rtlCol="0" anchor="ctr"/>
           <a:lstStyle/>
           <a:p>
+            <a:pPr algn="ctr"/>
             <a:endParaRPr lang="en-US"/>
           </a:p>
         </p:txBody>
@@ -7924,7 +7564,7 @@
     </p:spTree>
     <p:extLst>
       <p:ext uri="{BB962C8B-B14F-4D97-AF65-F5344CB8AC3E}">
-        <p14:creationId xmlns:p14="http://schemas.microsoft.com/office/powerpoint/2010/main" val="1860405798"/>
+        <p14:creationId xmlns:p14="http://schemas.microsoft.com/office/powerpoint/2010/main" val="3396610640"/>
       </p:ext>
     </p:extLst>
   </p:cSld>
@@ -8015,6 +7655,390 @@
           <p:cNvPr id="2" name="Title 1">
             <a:extLst>
               <a:ext uri="{FF2B5EF4-FFF2-40B4-BE49-F238E27FC236}">
+                <a16:creationId xmlns:a16="http://schemas.microsoft.com/office/drawing/2014/main" id="{75242ED9-550F-4CFB-9C3E-FC559B6FDFB2}"/>
+              </a:ext>
+            </a:extLst>
+          </p:cNvPr>
+          <p:cNvSpPr>
+            <a:spLocks noGrp="1"/>
+          </p:cNvSpPr>
+          <p:nvPr>
+            <p:ph type="title"/>
+          </p:nvPr>
+        </p:nvSpPr>
+        <p:spPr/>
+        <p:txBody>
+          <a:bodyPr>
+            <a:normAutofit fontScale="90000"/>
+          </a:bodyPr>
+          <a:lstStyle/>
+          <a:p>
+            <a:r>
+              <a:rPr lang="en-US" sz="2200" dirty="0">
+                <a:solidFill>
+                  <a:srgbClr val="002060"/>
+                </a:solidFill>
+              </a:rPr>
+              <a:t>Inline</a:t>
+            </a:r>
+            <a:br>
+              <a:rPr lang="en-US" dirty="0"/>
+            </a:br>
+            <a:r>
+              <a:rPr lang="en-US" dirty="0"/>
+              <a:t>Step 1: Find Function Declaration</a:t>
+            </a:r>
+          </a:p>
+        </p:txBody>
+      </p:sp>
+      <p:sp>
+        <p:nvSpPr>
+          <p:cNvPr id="3" name="Content Placeholder 2">
+            <a:extLst>
+              <a:ext uri="{FF2B5EF4-FFF2-40B4-BE49-F238E27FC236}">
+                <a16:creationId xmlns:a16="http://schemas.microsoft.com/office/drawing/2014/main" id="{DC80C796-6D02-42F5-9E01-05B2D8DD6D36}"/>
+              </a:ext>
+            </a:extLst>
+          </p:cNvPr>
+          <p:cNvSpPr>
+            <a:spLocks noGrp="1"/>
+          </p:cNvSpPr>
+          <p:nvPr>
+            <p:ph idx="1"/>
+          </p:nvPr>
+        </p:nvSpPr>
+        <p:spPr/>
+        <p:txBody>
+          <a:bodyPr/>
+          <a:lstStyle/>
+          <a:p>
+            <a:endParaRPr lang="en-US"/>
+          </a:p>
+        </p:txBody>
+      </p:sp>
+    </p:spTree>
+    <p:extLst>
+      <p:ext uri="{BB962C8B-B14F-4D97-AF65-F5344CB8AC3E}">
+        <p14:creationId xmlns:p14="http://schemas.microsoft.com/office/powerpoint/2010/main" val="649359674"/>
+      </p:ext>
+    </p:extLst>
+  </p:cSld>
+  <p:clrMapOvr>
+    <a:masterClrMapping/>
+  </p:clrMapOvr>
+</p:sld>
+</file>
+
+<file path=ppt/slides/slide21.xml><?xml version="1.0" encoding="utf-8"?>
+<p:sld xmlns:a="http://schemas.openxmlformats.org/drawingml/2006/main" xmlns:r="http://schemas.openxmlformats.org/officeDocument/2006/relationships" xmlns:p="http://schemas.openxmlformats.org/presentationml/2006/main">
+  <p:cSld>
+    <p:spTree>
+      <p:nvGrpSpPr>
+        <p:cNvPr id="1" name=""/>
+        <p:cNvGrpSpPr/>
+        <p:nvPr/>
+      </p:nvGrpSpPr>
+      <p:grpSpPr>
+        <a:xfrm>
+          <a:off x="0" y="0"/>
+          <a:ext cx="0" cy="0"/>
+          <a:chOff x="0" y="0"/>
+          <a:chExt cx="0" cy="0"/>
+        </a:xfrm>
+      </p:grpSpPr>
+      <p:sp>
+        <p:nvSpPr>
+          <p:cNvPr id="2" name="Title 1">
+            <a:extLst>
+              <a:ext uri="{FF2B5EF4-FFF2-40B4-BE49-F238E27FC236}">
+                <a16:creationId xmlns:a16="http://schemas.microsoft.com/office/drawing/2014/main" id="{DA980ABF-8158-4458-B148-CDA7476D6D5B}"/>
+              </a:ext>
+            </a:extLst>
+          </p:cNvPr>
+          <p:cNvSpPr>
+            <a:spLocks noGrp="1"/>
+          </p:cNvSpPr>
+          <p:nvPr>
+            <p:ph type="title"/>
+          </p:nvPr>
+        </p:nvSpPr>
+        <p:spPr/>
+        <p:txBody>
+          <a:bodyPr>
+            <a:normAutofit fontScale="90000"/>
+          </a:bodyPr>
+          <a:lstStyle/>
+          <a:p>
+            <a:r>
+              <a:rPr lang="en-US" sz="2200" dirty="0">
+                <a:solidFill>
+                  <a:srgbClr val="002060"/>
+                </a:solidFill>
+              </a:rPr>
+              <a:t>Inline</a:t>
+            </a:r>
+            <a:br>
+              <a:rPr lang="en-US" dirty="0"/>
+            </a:br>
+            <a:r>
+              <a:rPr lang="en-US" dirty="0"/>
+              <a:t>Step 2: Replace Call</a:t>
+            </a:r>
+          </a:p>
+        </p:txBody>
+      </p:sp>
+      <p:sp>
+        <p:nvSpPr>
+          <p:cNvPr id="3" name="Content Placeholder 2">
+            <a:extLst>
+              <a:ext uri="{FF2B5EF4-FFF2-40B4-BE49-F238E27FC236}">
+                <a16:creationId xmlns:a16="http://schemas.microsoft.com/office/drawing/2014/main" id="{ADDFD673-5B6F-4B6F-B6AD-69444052CE36}"/>
+              </a:ext>
+            </a:extLst>
+          </p:cNvPr>
+          <p:cNvSpPr>
+            <a:spLocks noGrp="1"/>
+          </p:cNvSpPr>
+          <p:nvPr>
+            <p:ph idx="1"/>
+          </p:nvPr>
+        </p:nvSpPr>
+        <p:spPr/>
+        <p:txBody>
+          <a:bodyPr/>
+          <a:lstStyle/>
+          <a:p>
+            <a:endParaRPr lang="en-US"/>
+          </a:p>
+        </p:txBody>
+      </p:sp>
+    </p:spTree>
+    <p:extLst>
+      <p:ext uri="{BB962C8B-B14F-4D97-AF65-F5344CB8AC3E}">
+        <p14:creationId xmlns:p14="http://schemas.microsoft.com/office/powerpoint/2010/main" val="2385298871"/>
+      </p:ext>
+    </p:extLst>
+  </p:cSld>
+  <p:clrMapOvr>
+    <a:masterClrMapping/>
+  </p:clrMapOvr>
+</p:sld>
+</file>
+
+<file path=ppt/slides/slide22.xml><?xml version="1.0" encoding="utf-8"?>
+<p:sld xmlns:a="http://schemas.openxmlformats.org/drawingml/2006/main" xmlns:r="http://schemas.openxmlformats.org/officeDocument/2006/relationships" xmlns:p="http://schemas.openxmlformats.org/presentationml/2006/main">
+  <p:cSld>
+    <p:spTree>
+      <p:nvGrpSpPr>
+        <p:cNvPr id="1" name=""/>
+        <p:cNvGrpSpPr/>
+        <p:nvPr/>
+      </p:nvGrpSpPr>
+      <p:grpSpPr>
+        <a:xfrm>
+          <a:off x="0" y="0"/>
+          <a:ext cx="0" cy="0"/>
+          <a:chOff x="0" y="0"/>
+          <a:chExt cx="0" cy="0"/>
+        </a:xfrm>
+      </p:grpSpPr>
+      <p:sp>
+        <p:nvSpPr>
+          <p:cNvPr id="2" name="Title 1">
+            <a:extLst>
+              <a:ext uri="{FF2B5EF4-FFF2-40B4-BE49-F238E27FC236}">
+                <a16:creationId xmlns:a16="http://schemas.microsoft.com/office/drawing/2014/main" id="{A3F3E1CF-733D-4EAA-A4A4-EFE33F6F4D1E}"/>
+              </a:ext>
+            </a:extLst>
+          </p:cNvPr>
+          <p:cNvSpPr>
+            <a:spLocks noGrp="1"/>
+          </p:cNvSpPr>
+          <p:nvPr>
+            <p:ph type="title"/>
+          </p:nvPr>
+        </p:nvSpPr>
+        <p:spPr/>
+        <p:txBody>
+          <a:bodyPr>
+            <a:normAutofit fontScale="90000"/>
+          </a:bodyPr>
+          <a:lstStyle/>
+          <a:p>
+            <a:r>
+              <a:rPr lang="en-US" sz="2200" dirty="0">
+                <a:solidFill>
+                  <a:srgbClr val="002060"/>
+                </a:solidFill>
+              </a:rPr>
+              <a:t>Inline</a:t>
+            </a:r>
+            <a:br>
+              <a:rPr lang="en-US" dirty="0"/>
+            </a:br>
+            <a:r>
+              <a:rPr lang="en-US" dirty="0"/>
+              <a:t>Step 3: Delete Declaration</a:t>
+            </a:r>
+          </a:p>
+        </p:txBody>
+      </p:sp>
+      <p:sp>
+        <p:nvSpPr>
+          <p:cNvPr id="3" name="Content Placeholder 2">
+            <a:extLst>
+              <a:ext uri="{FF2B5EF4-FFF2-40B4-BE49-F238E27FC236}">
+                <a16:creationId xmlns:a16="http://schemas.microsoft.com/office/drawing/2014/main" id="{4C47954A-2906-4D59-8585-23E7BB9A1A3B}"/>
+              </a:ext>
+            </a:extLst>
+          </p:cNvPr>
+          <p:cNvSpPr>
+            <a:spLocks noGrp="1"/>
+          </p:cNvSpPr>
+          <p:nvPr>
+            <p:ph idx="1"/>
+          </p:nvPr>
+        </p:nvSpPr>
+        <p:spPr/>
+        <p:txBody>
+          <a:bodyPr/>
+          <a:lstStyle/>
+          <a:p>
+            <a:endParaRPr lang="en-US"/>
+          </a:p>
+        </p:txBody>
+      </p:sp>
+    </p:spTree>
+    <p:extLst>
+      <p:ext uri="{BB962C8B-B14F-4D97-AF65-F5344CB8AC3E}">
+        <p14:creationId xmlns:p14="http://schemas.microsoft.com/office/powerpoint/2010/main" val="554729800"/>
+      </p:ext>
+    </p:extLst>
+  </p:cSld>
+  <p:clrMapOvr>
+    <a:masterClrMapping/>
+  </p:clrMapOvr>
+</p:sld>
+</file>
+
+<file path=ppt/slides/slide23.xml><?xml version="1.0" encoding="utf-8"?>
+<p:sld xmlns:a="http://schemas.openxmlformats.org/drawingml/2006/main" xmlns:r="http://schemas.openxmlformats.org/officeDocument/2006/relationships" xmlns:p="http://schemas.openxmlformats.org/presentationml/2006/main">
+  <p:cSld>
+    <p:spTree>
+      <p:nvGrpSpPr>
+        <p:cNvPr id="1" name=""/>
+        <p:cNvGrpSpPr/>
+        <p:nvPr/>
+      </p:nvGrpSpPr>
+      <p:grpSpPr>
+        <a:xfrm>
+          <a:off x="0" y="0"/>
+          <a:ext cx="0" cy="0"/>
+          <a:chOff x="0" y="0"/>
+          <a:chExt cx="0" cy="0"/>
+        </a:xfrm>
+      </p:grpSpPr>
+      <p:sp>
+        <p:nvSpPr>
+          <p:cNvPr id="2" name="Title 1">
+            <a:extLst>
+              <a:ext uri="{FF2B5EF4-FFF2-40B4-BE49-F238E27FC236}">
+                <a16:creationId xmlns:a16="http://schemas.microsoft.com/office/drawing/2014/main" id="{3D4EAE92-26B5-43BA-BF3C-B8A35C8C41C0}"/>
+              </a:ext>
+            </a:extLst>
+          </p:cNvPr>
+          <p:cNvSpPr>
+            <a:spLocks noGrp="1"/>
+          </p:cNvSpPr>
+          <p:nvPr>
+            <p:ph type="title"/>
+          </p:nvPr>
+        </p:nvSpPr>
+        <p:spPr/>
+        <p:txBody>
+          <a:bodyPr>
+            <a:normAutofit fontScale="90000"/>
+          </a:bodyPr>
+          <a:lstStyle/>
+          <a:p>
+            <a:r>
+              <a:rPr lang="en-US" sz="2200" dirty="0">
+                <a:solidFill>
+                  <a:srgbClr val="002060"/>
+                </a:solidFill>
+              </a:rPr>
+              <a:t>Inline</a:t>
+            </a:r>
+            <a:br>
+              <a:rPr lang="en-US" dirty="0"/>
+            </a:br>
+            <a:r>
+              <a:rPr lang="en-US" dirty="0"/>
+              <a:t>Problem: Recursive Calls</a:t>
+            </a:r>
+          </a:p>
+        </p:txBody>
+      </p:sp>
+      <p:sp>
+        <p:nvSpPr>
+          <p:cNvPr id="3" name="Content Placeholder 2">
+            <a:extLst>
+              <a:ext uri="{FF2B5EF4-FFF2-40B4-BE49-F238E27FC236}">
+                <a16:creationId xmlns:a16="http://schemas.microsoft.com/office/drawing/2014/main" id="{F244BE0B-79E0-4B2E-9ED3-06BC7CAB1F21}"/>
+              </a:ext>
+            </a:extLst>
+          </p:cNvPr>
+          <p:cNvSpPr>
+            <a:spLocks noGrp="1"/>
+          </p:cNvSpPr>
+          <p:nvPr>
+            <p:ph idx="1"/>
+          </p:nvPr>
+        </p:nvSpPr>
+        <p:spPr/>
+        <p:txBody>
+          <a:bodyPr/>
+          <a:lstStyle/>
+          <a:p>
+            <a:endParaRPr lang="en-US"/>
+          </a:p>
+        </p:txBody>
+      </p:sp>
+    </p:spTree>
+    <p:extLst>
+      <p:ext uri="{BB962C8B-B14F-4D97-AF65-F5344CB8AC3E}">
+        <p14:creationId xmlns:p14="http://schemas.microsoft.com/office/powerpoint/2010/main" val="1860405798"/>
+      </p:ext>
+    </p:extLst>
+  </p:cSld>
+  <p:clrMapOvr>
+    <a:masterClrMapping/>
+  </p:clrMapOvr>
+</p:sld>
+</file>
+
+<file path=ppt/slides/slide24.xml><?xml version="1.0" encoding="utf-8"?>
+<p:sld xmlns:a="http://schemas.openxmlformats.org/drawingml/2006/main" xmlns:r="http://schemas.openxmlformats.org/officeDocument/2006/relationships" xmlns:p="http://schemas.openxmlformats.org/presentationml/2006/main">
+  <p:cSld>
+    <p:spTree>
+      <p:nvGrpSpPr>
+        <p:cNvPr id="1" name=""/>
+        <p:cNvGrpSpPr/>
+        <p:nvPr/>
+      </p:nvGrpSpPr>
+      <p:grpSpPr>
+        <a:xfrm>
+          <a:off x="0" y="0"/>
+          <a:ext cx="0" cy="0"/>
+          <a:chOff x="0" y="0"/>
+          <a:chExt cx="0" cy="0"/>
+        </a:xfrm>
+      </p:grpSpPr>
+      <p:sp>
+        <p:nvSpPr>
+          <p:cNvPr id="2" name="Title 1">
+            <a:extLst>
+              <a:ext uri="{FF2B5EF4-FFF2-40B4-BE49-F238E27FC236}">
                 <a16:creationId xmlns:a16="http://schemas.microsoft.com/office/drawing/2014/main" id="{8FA142CC-32CA-4044-A89D-077BE90F9827}"/>
               </a:ext>
             </a:extLst>
@@ -8089,7 +8113,7 @@
 </p:sld>
 </file>
 
-<file path=ppt/slides/slide21.xml><?xml version="1.0" encoding="utf-8"?>
+<file path=ppt/slides/slide25.xml><?xml version="1.0" encoding="utf-8"?>
 <p:sld xmlns:a="http://schemas.openxmlformats.org/drawingml/2006/main" xmlns:r="http://schemas.openxmlformats.org/officeDocument/2006/relationships" xmlns:p="http://schemas.openxmlformats.org/presentationml/2006/main">
   <p:cSld>
     <p:spTree>

</xml_diff>

<commit_message>
Add conclusion slide	#7
</commit_message>
<xml_diff>
--- a/presentation/Misteli_Refactoring_in_Spoofax.pptx
+++ b/presentation/Misteli_Refactoring_in_Spoofax.pptx
@@ -2869,7 +2869,7 @@
           <a:p>
             <a:fld id="{DBAE3B3E-782A-9745-8E84-372F7B6771BF}" type="datetimeFigureOut">
               <a:rPr lang="en-US" smtClean="0"/>
-              <a:t>6/22/2019</a:t>
+              <a:t>6/23/2019</a:t>
             </a:fld>
             <a:endParaRPr lang="en-US" dirty="0"/>
           </a:p>
@@ -3034,7 +3034,7 @@
           <a:p>
             <a:fld id="{C726C102-7355-4784-A102-F67F03D4410F}" type="datetimeFigureOut">
               <a:rPr lang="LID4096" smtClean="0"/>
-              <a:t>06/22/2019</a:t>
+              <a:t>06/23/2019</a:t>
             </a:fld>
             <a:endParaRPr lang="LID4096"/>
           </a:p>
@@ -4999,7 +4999,7 @@
           <a:p>
             <a:fld id="{462A2416-1570-3849-86F9-07F78746E1B2}" type="datetimeFigureOut">
               <a:rPr lang="en-US" smtClean="0"/>
-              <a:t>6/22/2019</a:t>
+              <a:t>6/23/2019</a:t>
             </a:fld>
             <a:endParaRPr lang="en-US" dirty="0"/>
           </a:p>
@@ -7979,31 +7979,36 @@
           </a:p>
         </p:txBody>
       </p:sp>
-      <p:sp>
-        <p:nvSpPr>
-          <p:cNvPr id="3" name="Content Placeholder 2">
+      <p:pic>
+        <p:nvPicPr>
+          <p:cNvPr id="4" name="Picture 3">
             <a:extLst>
               <a:ext uri="{FF2B5EF4-FFF2-40B4-BE49-F238E27FC236}">
-                <a16:creationId xmlns:a16="http://schemas.microsoft.com/office/drawing/2014/main" id="{F244BE0B-79E0-4B2E-9ED3-06BC7CAB1F21}"/>
+                <a16:creationId xmlns:a16="http://schemas.microsoft.com/office/drawing/2014/main" id="{DF2D767D-C1D3-43AF-915F-DEC3887BB706}"/>
               </a:ext>
             </a:extLst>
           </p:cNvPr>
-          <p:cNvSpPr>
-            <a:spLocks noGrp="1"/>
-          </p:cNvSpPr>
-          <p:nvPr>
-            <p:ph idx="1"/>
-          </p:nvPr>
-        </p:nvSpPr>
-        <p:spPr/>
-        <p:txBody>
-          <a:bodyPr/>
-          <a:lstStyle/>
-          <a:p>
-            <a:endParaRPr lang="en-US"/>
-          </a:p>
-        </p:txBody>
-      </p:sp>
+          <p:cNvPicPr>
+            <a:picLocks noChangeAspect="1"/>
+          </p:cNvPicPr>
+          <p:nvPr/>
+        </p:nvPicPr>
+        <p:blipFill>
+          <a:blip r:embed="rId2"/>
+          <a:stretch>
+            <a:fillRect/>
+          </a:stretch>
+        </p:blipFill>
+        <p:spPr>
+          <a:xfrm>
+            <a:off x="3708462" y="1063229"/>
+            <a:ext cx="3215751" cy="3283146"/>
+          </a:xfrm>
+          <a:prstGeom prst="rect">
+            <a:avLst/>
+          </a:prstGeom>
+        </p:spPr>
+      </p:pic>
     </p:spTree>
     <p:extLst>
       <p:ext uri="{BB962C8B-B14F-4D97-AF65-F5344CB8AC3E}">
@@ -8075,31 +8080,35 @@
           </a:p>
         </p:txBody>
       </p:sp>
-      <p:sp>
-        <p:nvSpPr>
-          <p:cNvPr id="3" name="Content Placeholder 2">
+      <p:pic>
+        <p:nvPicPr>
+          <p:cNvPr id="5" name="Content Placeholder 4">
             <a:extLst>
               <a:ext uri="{FF2B5EF4-FFF2-40B4-BE49-F238E27FC236}">
-                <a16:creationId xmlns:a16="http://schemas.microsoft.com/office/drawing/2014/main" id="{70D8C59A-7D39-4580-A868-756D617C4AD3}"/>
+                <a16:creationId xmlns:a16="http://schemas.microsoft.com/office/drawing/2014/main" id="{898FC600-5783-4D61-9213-F129C316EFD4}"/>
               </a:ext>
             </a:extLst>
           </p:cNvPr>
-          <p:cNvSpPr>
-            <a:spLocks noGrp="1"/>
-          </p:cNvSpPr>
+          <p:cNvPicPr>
+            <a:picLocks noGrp="1" noChangeAspect="1"/>
+          </p:cNvPicPr>
           <p:nvPr>
             <p:ph idx="1"/>
           </p:nvPr>
-        </p:nvSpPr>
-        <p:spPr/>
-        <p:txBody>
-          <a:bodyPr/>
-          <a:lstStyle/>
-          <a:p>
-            <a:endParaRPr lang="en-US"/>
-          </a:p>
-        </p:txBody>
-      </p:sp>
+        </p:nvPicPr>
+        <p:blipFill>
+          <a:blip r:embed="rId2"/>
+          <a:stretch>
+            <a:fillRect/>
+          </a:stretch>
+        </p:blipFill>
+        <p:spPr>
+          <a:xfrm>
+            <a:off x="3017866" y="1063378"/>
+            <a:ext cx="4596943" cy="3016744"/>
+          </a:xfrm>
+        </p:spPr>
+      </p:pic>
     </p:spTree>
     <p:extLst>
       <p:ext uri="{BB962C8B-B14F-4D97-AF65-F5344CB8AC3E}">
@@ -8160,26 +8169,256 @@
       </p:sp>
       <p:sp>
         <p:nvSpPr>
-          <p:cNvPr id="3" name="Content Placeholder 2">
+          <p:cNvPr id="5" name="Rectangle: Rounded Corners 4">
             <a:extLst>
               <a:ext uri="{FF2B5EF4-FFF2-40B4-BE49-F238E27FC236}">
-                <a16:creationId xmlns:a16="http://schemas.microsoft.com/office/drawing/2014/main" id="{F2C291AE-9DAB-4A55-88EB-F6FC1A3ACAE3}"/>
+                <a16:creationId xmlns:a16="http://schemas.microsoft.com/office/drawing/2014/main" id="{74522C98-12A9-46CA-8BD9-A5CD6FB86AA9}"/>
               </a:ext>
             </a:extLst>
           </p:cNvPr>
-          <p:cNvSpPr>
-            <a:spLocks noGrp="1"/>
-          </p:cNvSpPr>
-          <p:nvPr>
-            <p:ph idx="1"/>
-          </p:nvPr>
+          <p:cNvSpPr/>
+          <p:nvPr/>
         </p:nvSpPr>
-        <p:spPr/>
+        <p:spPr>
+          <a:xfrm>
+            <a:off x="1763104" y="2571749"/>
+            <a:ext cx="3078315" cy="980185"/>
+          </a:xfrm>
+          <a:prstGeom prst="roundRect">
+            <a:avLst/>
+          </a:prstGeom>
+          <a:solidFill>
+            <a:srgbClr val="00B050"/>
+          </a:solidFill>
+          <a:effectLst/>
+        </p:spPr>
+        <p:style>
+          <a:lnRef idx="1">
+            <a:schemeClr val="accent1"/>
+          </a:lnRef>
+          <a:fillRef idx="3">
+            <a:schemeClr val="accent1"/>
+          </a:fillRef>
+          <a:effectRef idx="2">
+            <a:schemeClr val="accent1"/>
+          </a:effectRef>
+          <a:fontRef idx="minor">
+            <a:schemeClr val="lt1"/>
+          </a:fontRef>
+        </p:style>
         <p:txBody>
-          <a:bodyPr/>
+          <a:bodyPr rtlCol="0" anchor="ctr"/>
           <a:lstStyle/>
           <a:p>
-            <a:endParaRPr lang="en-US"/>
+            <a:pPr algn="ctr"/>
+            <a:r>
+              <a:rPr lang="en-US" sz="2400" dirty="0"/>
+              <a:t>Scope Graph</a:t>
+            </a:r>
+          </a:p>
+        </p:txBody>
+      </p:sp>
+      <p:sp>
+        <p:nvSpPr>
+          <p:cNvPr id="6" name="Rectangle: Rounded Corners 5">
+            <a:extLst>
+              <a:ext uri="{FF2B5EF4-FFF2-40B4-BE49-F238E27FC236}">
+                <a16:creationId xmlns:a16="http://schemas.microsoft.com/office/drawing/2014/main" id="{AE36B88C-19CA-4B3E-81B8-CB63057D4782}"/>
+              </a:ext>
+            </a:extLst>
+          </p:cNvPr>
+          <p:cNvSpPr/>
+          <p:nvPr/>
+        </p:nvSpPr>
+        <p:spPr>
+          <a:xfrm>
+            <a:off x="1763106" y="1195743"/>
+            <a:ext cx="3078315" cy="980185"/>
+          </a:xfrm>
+          <a:prstGeom prst="roundRect">
+            <a:avLst/>
+          </a:prstGeom>
+          <a:solidFill>
+            <a:srgbClr val="00B050"/>
+          </a:solidFill>
+        </p:spPr>
+        <p:style>
+          <a:lnRef idx="1">
+            <a:schemeClr val="accent1"/>
+          </a:lnRef>
+          <a:fillRef idx="3">
+            <a:schemeClr val="accent1"/>
+          </a:fillRef>
+          <a:effectRef idx="2">
+            <a:schemeClr val="accent1"/>
+          </a:effectRef>
+          <a:fontRef idx="minor">
+            <a:schemeClr val="lt1"/>
+          </a:fontRef>
+        </p:style>
+        <p:txBody>
+          <a:bodyPr rtlCol="0" anchor="ctr"/>
+          <a:lstStyle/>
+          <a:p>
+            <a:pPr algn="ctr"/>
+            <a:r>
+              <a:rPr lang="en-US" sz="2400" dirty="0" err="1"/>
+              <a:t>Stratego</a:t>
+            </a:r>
+            <a:r>
+              <a:rPr lang="en-US" sz="2400" dirty="0"/>
+              <a:t> Transformations</a:t>
+            </a:r>
+          </a:p>
+        </p:txBody>
+      </p:sp>
+      <p:sp>
+        <p:nvSpPr>
+          <p:cNvPr id="7" name="Rectangle: Rounded Corners 6">
+            <a:extLst>
+              <a:ext uri="{FF2B5EF4-FFF2-40B4-BE49-F238E27FC236}">
+                <a16:creationId xmlns:a16="http://schemas.microsoft.com/office/drawing/2014/main" id="{C6DE87A5-1A59-47A6-9042-E20849C2FA8D}"/>
+              </a:ext>
+            </a:extLst>
+          </p:cNvPr>
+          <p:cNvSpPr/>
+          <p:nvPr/>
+        </p:nvSpPr>
+        <p:spPr>
+          <a:xfrm>
+            <a:off x="5401656" y="1220236"/>
+            <a:ext cx="3078315" cy="980185"/>
+          </a:xfrm>
+          <a:prstGeom prst="roundRect">
+            <a:avLst/>
+          </a:prstGeom>
+          <a:solidFill>
+            <a:srgbClr val="FF0000"/>
+          </a:solidFill>
+        </p:spPr>
+        <p:style>
+          <a:lnRef idx="1">
+            <a:schemeClr val="accent4"/>
+          </a:lnRef>
+          <a:fillRef idx="3">
+            <a:schemeClr val="accent4"/>
+          </a:fillRef>
+          <a:effectRef idx="2">
+            <a:schemeClr val="accent4"/>
+          </a:effectRef>
+          <a:fontRef idx="minor">
+            <a:schemeClr val="lt1"/>
+          </a:fontRef>
+        </p:style>
+        <p:txBody>
+          <a:bodyPr rtlCol="0" anchor="ctr"/>
+          <a:lstStyle/>
+          <a:p>
+            <a:pPr algn="ctr"/>
+            <a:r>
+              <a:rPr lang="en-US" sz="2400" dirty="0"/>
+              <a:t>Nabl2 API</a:t>
+            </a:r>
+          </a:p>
+        </p:txBody>
+      </p:sp>
+      <p:sp>
+        <p:nvSpPr>
+          <p:cNvPr id="8" name="Rectangle: Rounded Corners 7">
+            <a:extLst>
+              <a:ext uri="{FF2B5EF4-FFF2-40B4-BE49-F238E27FC236}">
+                <a16:creationId xmlns:a16="http://schemas.microsoft.com/office/drawing/2014/main" id="{9702475F-C731-411E-A1AF-769623E3C8B7}"/>
+              </a:ext>
+            </a:extLst>
+          </p:cNvPr>
+          <p:cNvSpPr/>
+          <p:nvPr/>
+        </p:nvSpPr>
+        <p:spPr>
+          <a:xfrm>
+            <a:off x="5401655" y="2571750"/>
+            <a:ext cx="3078315" cy="980185"/>
+          </a:xfrm>
+          <a:prstGeom prst="roundRect">
+            <a:avLst/>
+          </a:prstGeom>
+          <a:solidFill>
+            <a:srgbClr val="FF0000"/>
+          </a:solidFill>
+        </p:spPr>
+        <p:style>
+          <a:lnRef idx="1">
+            <a:schemeClr val="accent4"/>
+          </a:lnRef>
+          <a:fillRef idx="3">
+            <a:schemeClr val="accent4"/>
+          </a:fillRef>
+          <a:effectRef idx="2">
+            <a:schemeClr val="accent4"/>
+          </a:effectRef>
+          <a:fontRef idx="minor">
+            <a:schemeClr val="lt1"/>
+          </a:fontRef>
+        </p:style>
+        <p:txBody>
+          <a:bodyPr rtlCol="0" anchor="ctr"/>
+          <a:lstStyle/>
+          <a:p>
+            <a:pPr algn="ctr"/>
+            <a:r>
+              <a:rPr lang="en-US" sz="2400" dirty="0"/>
+              <a:t>Eclipse UI Integration</a:t>
+            </a:r>
+          </a:p>
+        </p:txBody>
+      </p:sp>
+      <p:sp>
+        <p:nvSpPr>
+          <p:cNvPr id="9" name="Rectangle: Rounded Corners 8">
+            <a:extLst>
+              <a:ext uri="{FF2B5EF4-FFF2-40B4-BE49-F238E27FC236}">
+                <a16:creationId xmlns:a16="http://schemas.microsoft.com/office/drawing/2014/main" id="{82E51E27-B576-4E0F-9A80-D9938E13E4D5}"/>
+              </a:ext>
+            </a:extLst>
+          </p:cNvPr>
+          <p:cNvSpPr/>
+          <p:nvPr/>
+        </p:nvSpPr>
+        <p:spPr>
+          <a:xfrm>
+            <a:off x="5401654" y="3923264"/>
+            <a:ext cx="3078315" cy="980185"/>
+          </a:xfrm>
+          <a:prstGeom prst="roundRect">
+            <a:avLst/>
+          </a:prstGeom>
+          <a:solidFill>
+            <a:srgbClr val="FF0000"/>
+          </a:solidFill>
+        </p:spPr>
+        <p:style>
+          <a:lnRef idx="1">
+            <a:schemeClr val="accent4"/>
+          </a:lnRef>
+          <a:fillRef idx="3">
+            <a:schemeClr val="accent4"/>
+          </a:fillRef>
+          <a:effectRef idx="2">
+            <a:schemeClr val="accent4"/>
+          </a:effectRef>
+          <a:fontRef idx="minor">
+            <a:schemeClr val="lt1"/>
+          </a:fontRef>
+        </p:style>
+        <p:txBody>
+          <a:bodyPr rtlCol="0" anchor="ctr"/>
+          <a:lstStyle/>
+          <a:p>
+            <a:pPr algn="ctr"/>
+            <a:r>
+              <a:rPr lang="en-US" sz="2400" dirty="0"/>
+              <a:t>Transformations in SPT</a:t>
+            </a:r>
           </a:p>
         </p:txBody>
       </p:sp>

</xml_diff>

<commit_message>
Add slides on inline function
</commit_message>
<xml_diff>
--- a/presentation/Misteli_Refactoring_in_Spoofax.pptx
+++ b/presentation/Misteli_Refactoring_in_Spoofax.pptx
@@ -6,10 +6,10 @@
     <p:sldMasterId id="2147483660" r:id="rId2"/>
   </p:sldMasterIdLst>
   <p:notesMasterIdLst>
-    <p:notesMasterId r:id="rId28"/>
+    <p:notesMasterId r:id="rId30"/>
   </p:notesMasterIdLst>
   <p:handoutMasterIdLst>
-    <p:handoutMasterId r:id="rId29"/>
+    <p:handoutMasterId r:id="rId31"/>
   </p:handoutMasterIdLst>
   <p:sldIdLst>
     <p:sldId id="256" r:id="rId3"/>
@@ -32,11 +32,13 @@
     <p:sldId id="293" r:id="rId20"/>
     <p:sldId id="294" r:id="rId21"/>
     <p:sldId id="281" r:id="rId22"/>
-    <p:sldId id="285" r:id="rId23"/>
-    <p:sldId id="286" r:id="rId24"/>
-    <p:sldId id="287" r:id="rId25"/>
-    <p:sldId id="288" r:id="rId26"/>
-    <p:sldId id="289" r:id="rId27"/>
+    <p:sldId id="296" r:id="rId23"/>
+    <p:sldId id="295" r:id="rId24"/>
+    <p:sldId id="285" r:id="rId25"/>
+    <p:sldId id="286" r:id="rId26"/>
+    <p:sldId id="287" r:id="rId27"/>
+    <p:sldId id="288" r:id="rId28"/>
+    <p:sldId id="289" r:id="rId29"/>
   </p:sldIdLst>
   <p:sldSz cx="9144000" cy="5143500" type="screen16x9"/>
   <p:notesSz cx="6858000" cy="9144000"/>
@@ -2869,7 +2871,7 @@
           <a:p>
             <a:fld id="{DBAE3B3E-782A-9745-8E84-372F7B6771BF}" type="datetimeFigureOut">
               <a:rPr lang="en-US" smtClean="0"/>
-              <a:t>6/23/2019</a:t>
+              <a:t>6/27/2019</a:t>
             </a:fld>
             <a:endParaRPr lang="en-US" dirty="0"/>
           </a:p>
@@ -3034,7 +3036,7 @@
           <a:p>
             <a:fld id="{C726C102-7355-4784-A102-F67F03D4410F}" type="datetimeFigureOut">
               <a:rPr lang="LID4096" smtClean="0"/>
-              <a:t>06/23/2019</a:t>
+              <a:t>06/26/2019</a:t>
             </a:fld>
             <a:endParaRPr lang="LID4096"/>
           </a:p>
@@ -4999,7 +5001,7 @@
           <a:p>
             <a:fld id="{462A2416-1570-3849-86F9-07F78746E1B2}" type="datetimeFigureOut">
               <a:rPr lang="en-US" smtClean="0"/>
-              <a:t>6/23/2019</a:t>
+              <a:t>6/26/2019</a:t>
             </a:fld>
             <a:endParaRPr lang="en-US" dirty="0"/>
           </a:p>
@@ -6882,10 +6884,10 @@
       </p:sp>
       <p:pic>
         <p:nvPicPr>
-          <p:cNvPr id="4" name="Picture 3">
+          <p:cNvPr id="5" name="Picture 4">
             <a:extLst>
               <a:ext uri="{FF2B5EF4-FFF2-40B4-BE49-F238E27FC236}">
-                <a16:creationId xmlns:a16="http://schemas.microsoft.com/office/drawing/2014/main" id="{D3E95A44-8B2F-4218-A71B-51E82AFCC9A5}"/>
+                <a16:creationId xmlns:a16="http://schemas.microsoft.com/office/drawing/2014/main" id="{A451C2C5-926F-46F5-BA75-B802CBEBA6A9}"/>
               </a:ext>
             </a:extLst>
           </p:cNvPr>
@@ -6903,7 +6905,7 @@
         <p:spPr>
           <a:xfrm>
             <a:off x="2847458" y="1063229"/>
-            <a:ext cx="4937760" cy="3943712"/>
+            <a:ext cx="4937760" cy="3943710"/>
           </a:xfrm>
           <a:prstGeom prst="rect">
             <a:avLst/>
@@ -7679,6 +7681,356 @@
                   <a:srgbClr val="002060"/>
                 </a:solidFill>
               </a:rPr>
+              <a:t>Inline Function</a:t>
+            </a:r>
+            <a:br>
+              <a:rPr lang="en-US" dirty="0"/>
+            </a:br>
+            <a:r>
+              <a:rPr lang="en-US" dirty="0"/>
+              <a:t>Inline Specific Call</a:t>
+            </a:r>
+          </a:p>
+        </p:txBody>
+      </p:sp>
+      <p:pic>
+        <p:nvPicPr>
+          <p:cNvPr id="4" name="Picture 3">
+            <a:extLst>
+              <a:ext uri="{FF2B5EF4-FFF2-40B4-BE49-F238E27FC236}">
+                <a16:creationId xmlns:a16="http://schemas.microsoft.com/office/drawing/2014/main" id="{70A433BC-1795-428B-AA3C-53DE7D3D47F1}"/>
+              </a:ext>
+            </a:extLst>
+          </p:cNvPr>
+          <p:cNvPicPr>
+            <a:picLocks noChangeAspect="1"/>
+          </p:cNvPicPr>
+          <p:nvPr/>
+        </p:nvPicPr>
+        <p:blipFill>
+          <a:blip r:embed="rId2"/>
+          <a:stretch>
+            <a:fillRect/>
+          </a:stretch>
+        </p:blipFill>
+        <p:spPr>
+          <a:xfrm>
+            <a:off x="1763106" y="1893511"/>
+            <a:ext cx="3040643" cy="1356478"/>
+          </a:xfrm>
+          <a:prstGeom prst="rect">
+            <a:avLst/>
+          </a:prstGeom>
+        </p:spPr>
+      </p:pic>
+      <p:pic>
+        <p:nvPicPr>
+          <p:cNvPr id="5" name="Picture 4">
+            <a:extLst>
+              <a:ext uri="{FF2B5EF4-FFF2-40B4-BE49-F238E27FC236}">
+                <a16:creationId xmlns:a16="http://schemas.microsoft.com/office/drawing/2014/main" id="{64900E0E-437D-4930-A245-F81F71C5AAA8}"/>
+              </a:ext>
+            </a:extLst>
+          </p:cNvPr>
+          <p:cNvPicPr>
+            <a:picLocks noChangeAspect="1"/>
+          </p:cNvPicPr>
+          <p:nvPr/>
+        </p:nvPicPr>
+        <p:blipFill>
+          <a:blip r:embed="rId3"/>
+          <a:stretch>
+            <a:fillRect/>
+          </a:stretch>
+        </p:blipFill>
+        <p:spPr>
+          <a:xfrm>
+            <a:off x="6351196" y="1668701"/>
+            <a:ext cx="1699407" cy="1806097"/>
+          </a:xfrm>
+          <a:prstGeom prst="rect">
+            <a:avLst/>
+          </a:prstGeom>
+        </p:spPr>
+      </p:pic>
+      <p:sp>
+        <p:nvSpPr>
+          <p:cNvPr id="6" name="Arrow: Right 5">
+            <a:extLst>
+              <a:ext uri="{FF2B5EF4-FFF2-40B4-BE49-F238E27FC236}">
+                <a16:creationId xmlns:a16="http://schemas.microsoft.com/office/drawing/2014/main" id="{5419A342-5A6F-4669-BF51-43B61C78C221}"/>
+              </a:ext>
+            </a:extLst>
+          </p:cNvPr>
+          <p:cNvSpPr/>
+          <p:nvPr/>
+        </p:nvSpPr>
+        <p:spPr>
+          <a:xfrm>
+            <a:off x="5271311" y="2205015"/>
+            <a:ext cx="612322" cy="587829"/>
+          </a:xfrm>
+          <a:prstGeom prst="rightArrow">
+            <a:avLst/>
+          </a:prstGeom>
+        </p:spPr>
+        <p:style>
+          <a:lnRef idx="1">
+            <a:schemeClr val="accent4"/>
+          </a:lnRef>
+          <a:fillRef idx="3">
+            <a:schemeClr val="accent4"/>
+          </a:fillRef>
+          <a:effectRef idx="2">
+            <a:schemeClr val="accent4"/>
+          </a:effectRef>
+          <a:fontRef idx="minor">
+            <a:schemeClr val="lt1"/>
+          </a:fontRef>
+        </p:style>
+        <p:txBody>
+          <a:bodyPr rtlCol="0" anchor="ctr"/>
+          <a:lstStyle/>
+          <a:p>
+            <a:pPr algn="ctr"/>
+            <a:endParaRPr lang="en-US"/>
+          </a:p>
+        </p:txBody>
+      </p:sp>
+    </p:spTree>
+    <p:extLst>
+      <p:ext uri="{BB962C8B-B14F-4D97-AF65-F5344CB8AC3E}">
+        <p14:creationId xmlns:p14="http://schemas.microsoft.com/office/powerpoint/2010/main" val="649359674"/>
+      </p:ext>
+    </p:extLst>
+  </p:cSld>
+  <p:clrMapOvr>
+    <a:masterClrMapping/>
+  </p:clrMapOvr>
+</p:sld>
+</file>
+
+<file path=ppt/slides/slide21.xml><?xml version="1.0" encoding="utf-8"?>
+<p:sld xmlns:a="http://schemas.openxmlformats.org/drawingml/2006/main" xmlns:r="http://schemas.openxmlformats.org/officeDocument/2006/relationships" xmlns:p="http://schemas.openxmlformats.org/presentationml/2006/main">
+  <p:cSld>
+    <p:spTree>
+      <p:nvGrpSpPr>
+        <p:cNvPr id="1" name=""/>
+        <p:cNvGrpSpPr/>
+        <p:nvPr/>
+      </p:nvGrpSpPr>
+      <p:grpSpPr>
+        <a:xfrm>
+          <a:off x="0" y="0"/>
+          <a:ext cx="0" cy="0"/>
+          <a:chOff x="0" y="0"/>
+          <a:chExt cx="0" cy="0"/>
+        </a:xfrm>
+      </p:grpSpPr>
+      <p:sp>
+        <p:nvSpPr>
+          <p:cNvPr id="2" name="Title 1">
+            <a:extLst>
+              <a:ext uri="{FF2B5EF4-FFF2-40B4-BE49-F238E27FC236}">
+                <a16:creationId xmlns:a16="http://schemas.microsoft.com/office/drawing/2014/main" id="{75242ED9-550F-4CFB-9C3E-FC559B6FDFB2}"/>
+              </a:ext>
+            </a:extLst>
+          </p:cNvPr>
+          <p:cNvSpPr>
+            <a:spLocks noGrp="1"/>
+          </p:cNvSpPr>
+          <p:nvPr>
+            <p:ph type="title"/>
+          </p:nvPr>
+        </p:nvSpPr>
+        <p:spPr/>
+        <p:txBody>
+          <a:bodyPr>
+            <a:normAutofit fontScale="90000"/>
+          </a:bodyPr>
+          <a:lstStyle/>
+          <a:p>
+            <a:r>
+              <a:rPr lang="en-US" sz="2200" dirty="0">
+                <a:solidFill>
+                  <a:srgbClr val="002060"/>
+                </a:solidFill>
+              </a:rPr>
+              <a:t>Inline Function</a:t>
+            </a:r>
+            <a:br>
+              <a:rPr lang="en-US" dirty="0"/>
+            </a:br>
+            <a:r>
+              <a:rPr lang="en-US" dirty="0"/>
+              <a:t>Inline Call and Delete Declaration</a:t>
+            </a:r>
+          </a:p>
+        </p:txBody>
+      </p:sp>
+      <p:pic>
+        <p:nvPicPr>
+          <p:cNvPr id="4" name="Picture 3">
+            <a:extLst>
+              <a:ext uri="{FF2B5EF4-FFF2-40B4-BE49-F238E27FC236}">
+                <a16:creationId xmlns:a16="http://schemas.microsoft.com/office/drawing/2014/main" id="{70A433BC-1795-428B-AA3C-53DE7D3D47F1}"/>
+              </a:ext>
+            </a:extLst>
+          </p:cNvPr>
+          <p:cNvPicPr>
+            <a:picLocks noChangeAspect="1"/>
+          </p:cNvPicPr>
+          <p:nvPr/>
+        </p:nvPicPr>
+        <p:blipFill>
+          <a:blip r:embed="rId2"/>
+          <a:stretch>
+            <a:fillRect/>
+          </a:stretch>
+        </p:blipFill>
+        <p:spPr>
+          <a:xfrm>
+            <a:off x="1763105" y="1893510"/>
+            <a:ext cx="3040643" cy="1356478"/>
+          </a:xfrm>
+          <a:prstGeom prst="rect">
+            <a:avLst/>
+          </a:prstGeom>
+        </p:spPr>
+      </p:pic>
+      <p:sp>
+        <p:nvSpPr>
+          <p:cNvPr id="6" name="Arrow: Right 5">
+            <a:extLst>
+              <a:ext uri="{FF2B5EF4-FFF2-40B4-BE49-F238E27FC236}">
+                <a16:creationId xmlns:a16="http://schemas.microsoft.com/office/drawing/2014/main" id="{5419A342-5A6F-4669-BF51-43B61C78C221}"/>
+              </a:ext>
+            </a:extLst>
+          </p:cNvPr>
+          <p:cNvSpPr/>
+          <p:nvPr/>
+        </p:nvSpPr>
+        <p:spPr>
+          <a:xfrm>
+            <a:off x="5271311" y="2205015"/>
+            <a:ext cx="612322" cy="587829"/>
+          </a:xfrm>
+          <a:prstGeom prst="rightArrow">
+            <a:avLst/>
+          </a:prstGeom>
+        </p:spPr>
+        <p:style>
+          <a:lnRef idx="1">
+            <a:schemeClr val="accent4"/>
+          </a:lnRef>
+          <a:fillRef idx="3">
+            <a:schemeClr val="accent4"/>
+          </a:fillRef>
+          <a:effectRef idx="2">
+            <a:schemeClr val="accent4"/>
+          </a:effectRef>
+          <a:fontRef idx="minor">
+            <a:schemeClr val="lt1"/>
+          </a:fontRef>
+        </p:style>
+        <p:txBody>
+          <a:bodyPr rtlCol="0" anchor="ctr"/>
+          <a:lstStyle/>
+          <a:p>
+            <a:pPr algn="ctr"/>
+            <a:endParaRPr lang="en-US"/>
+          </a:p>
+        </p:txBody>
+      </p:sp>
+      <p:pic>
+        <p:nvPicPr>
+          <p:cNvPr id="3" name="Picture 2">
+            <a:extLst>
+              <a:ext uri="{FF2B5EF4-FFF2-40B4-BE49-F238E27FC236}">
+                <a16:creationId xmlns:a16="http://schemas.microsoft.com/office/drawing/2014/main" id="{02C15AE4-0BBB-40AA-82C2-EA009AB77D47}"/>
+              </a:ext>
+            </a:extLst>
+          </p:cNvPr>
+          <p:cNvPicPr>
+            <a:picLocks noChangeAspect="1"/>
+          </p:cNvPicPr>
+          <p:nvPr/>
+        </p:nvPicPr>
+        <p:blipFill>
+          <a:blip r:embed="rId3"/>
+          <a:stretch>
+            <a:fillRect/>
+          </a:stretch>
+        </p:blipFill>
+        <p:spPr>
+          <a:xfrm>
+            <a:off x="6351196" y="1630598"/>
+            <a:ext cx="1722269" cy="1882303"/>
+          </a:xfrm>
+          <a:prstGeom prst="rect">
+            <a:avLst/>
+          </a:prstGeom>
+        </p:spPr>
+      </p:pic>
+    </p:spTree>
+    <p:extLst>
+      <p:ext uri="{BB962C8B-B14F-4D97-AF65-F5344CB8AC3E}">
+        <p14:creationId xmlns:p14="http://schemas.microsoft.com/office/powerpoint/2010/main" val="1635690435"/>
+      </p:ext>
+    </p:extLst>
+  </p:cSld>
+  <p:clrMapOvr>
+    <a:masterClrMapping/>
+  </p:clrMapOvr>
+</p:sld>
+</file>
+
+<file path=ppt/slides/slide22.xml><?xml version="1.0" encoding="utf-8"?>
+<p:sld xmlns:a="http://schemas.openxmlformats.org/drawingml/2006/main" xmlns:r="http://schemas.openxmlformats.org/officeDocument/2006/relationships" xmlns:p="http://schemas.openxmlformats.org/presentationml/2006/main">
+  <p:cSld>
+    <p:spTree>
+      <p:nvGrpSpPr>
+        <p:cNvPr id="1" name=""/>
+        <p:cNvGrpSpPr/>
+        <p:nvPr/>
+      </p:nvGrpSpPr>
+      <p:grpSpPr>
+        <a:xfrm>
+          <a:off x="0" y="0"/>
+          <a:ext cx="0" cy="0"/>
+          <a:chOff x="0" y="0"/>
+          <a:chExt cx="0" cy="0"/>
+        </a:xfrm>
+      </p:grpSpPr>
+      <p:sp>
+        <p:nvSpPr>
+          <p:cNvPr id="2" name="Title 1">
+            <a:extLst>
+              <a:ext uri="{FF2B5EF4-FFF2-40B4-BE49-F238E27FC236}">
+                <a16:creationId xmlns:a16="http://schemas.microsoft.com/office/drawing/2014/main" id="{75242ED9-550F-4CFB-9C3E-FC559B6FDFB2}"/>
+              </a:ext>
+            </a:extLst>
+          </p:cNvPr>
+          <p:cNvSpPr>
+            <a:spLocks noGrp="1"/>
+          </p:cNvSpPr>
+          <p:nvPr>
+            <p:ph type="title"/>
+          </p:nvPr>
+        </p:nvSpPr>
+        <p:spPr/>
+        <p:txBody>
+          <a:bodyPr>
+            <a:normAutofit fontScale="90000"/>
+          </a:bodyPr>
+          <a:lstStyle/>
+          <a:p>
+            <a:r>
+              <a:rPr lang="en-US" sz="2200" dirty="0">
+                <a:solidFill>
+                  <a:srgbClr val="002060"/>
+                </a:solidFill>
+              </a:rPr>
               <a:t>Inline</a:t>
             </a:r>
             <a:br>
@@ -7719,7 +8071,7 @@
     </p:spTree>
     <p:extLst>
       <p:ext uri="{BB962C8B-B14F-4D97-AF65-F5344CB8AC3E}">
-        <p14:creationId xmlns:p14="http://schemas.microsoft.com/office/powerpoint/2010/main" val="649359674"/>
+        <p14:creationId xmlns:p14="http://schemas.microsoft.com/office/powerpoint/2010/main" val="46152746"/>
       </p:ext>
     </p:extLst>
   </p:cSld>
@@ -7729,7 +8081,7 @@
 </p:sld>
 </file>
 
-<file path=ppt/slides/slide21.xml><?xml version="1.0" encoding="utf-8"?>
+<file path=ppt/slides/slide23.xml><?xml version="1.0" encoding="utf-8"?>
 <p:sld xmlns:a="http://schemas.openxmlformats.org/drawingml/2006/main" xmlns:r="http://schemas.openxmlformats.org/officeDocument/2006/relationships" xmlns:p="http://schemas.openxmlformats.org/presentationml/2006/main">
   <p:cSld>
     <p:spTree>
@@ -7825,7 +8177,7 @@
 </p:sld>
 </file>
 
-<file path=ppt/slides/slide22.xml><?xml version="1.0" encoding="utf-8"?>
+<file path=ppt/slides/slide24.xml><?xml version="1.0" encoding="utf-8"?>
 <p:sld xmlns:a="http://schemas.openxmlformats.org/drawingml/2006/main" xmlns:r="http://schemas.openxmlformats.org/officeDocument/2006/relationships" xmlns:p="http://schemas.openxmlformats.org/presentationml/2006/main">
   <p:cSld>
     <p:spTree>
@@ -7921,7 +8273,7 @@
 </p:sld>
 </file>
 
-<file path=ppt/slides/slide23.xml><?xml version="1.0" encoding="utf-8"?>
+<file path=ppt/slides/slide25.xml><?xml version="1.0" encoding="utf-8"?>
 <p:sld xmlns:a="http://schemas.openxmlformats.org/drawingml/2006/main" xmlns:r="http://schemas.openxmlformats.org/officeDocument/2006/relationships" xmlns:p="http://schemas.openxmlformats.org/presentationml/2006/main">
   <p:cSld>
     <p:spTree>
@@ -8022,7 +8374,7 @@
 </p:sld>
 </file>
 
-<file path=ppt/slides/slide24.xml><?xml version="1.0" encoding="utf-8"?>
+<file path=ppt/slides/slide26.xml><?xml version="1.0" encoding="utf-8"?>
 <p:sld xmlns:a="http://schemas.openxmlformats.org/drawingml/2006/main" xmlns:r="http://schemas.openxmlformats.org/officeDocument/2006/relationships" xmlns:p="http://schemas.openxmlformats.org/presentationml/2006/main">
   <p:cSld>
     <p:spTree>
@@ -8122,7 +8474,7 @@
 </p:sld>
 </file>
 
-<file path=ppt/slides/slide25.xml><?xml version="1.0" encoding="utf-8"?>
+<file path=ppt/slides/slide27.xml><?xml version="1.0" encoding="utf-8"?>
 <p:sld xmlns:a="http://schemas.openxmlformats.org/drawingml/2006/main" xmlns:r="http://schemas.openxmlformats.org/officeDocument/2006/relationships" xmlns:p="http://schemas.openxmlformats.org/presentationml/2006/main">
   <p:cSld>
     <p:spTree>

</xml_diff>

<commit_message>
Add slides for inline function
</commit_message>
<xml_diff>
--- a/presentation/Misteli_Refactoring_in_Spoofax.pptx
+++ b/presentation/Misteli_Refactoring_in_Spoofax.pptx
@@ -26,18 +26,18 @@
     <p:sldId id="277" r:id="rId14"/>
     <p:sldId id="291" r:id="rId15"/>
     <p:sldId id="292" r:id="rId16"/>
-    <p:sldId id="283" r:id="rId17"/>
-    <p:sldId id="282" r:id="rId18"/>
-    <p:sldId id="284" r:id="rId19"/>
-    <p:sldId id="293" r:id="rId20"/>
-    <p:sldId id="294" r:id="rId21"/>
-    <p:sldId id="281" r:id="rId22"/>
-    <p:sldId id="296" r:id="rId23"/>
-    <p:sldId id="295" r:id="rId24"/>
-    <p:sldId id="285" r:id="rId25"/>
-    <p:sldId id="286" r:id="rId26"/>
-    <p:sldId id="287" r:id="rId27"/>
-    <p:sldId id="288" r:id="rId28"/>
+    <p:sldId id="282" r:id="rId17"/>
+    <p:sldId id="284" r:id="rId18"/>
+    <p:sldId id="293" r:id="rId19"/>
+    <p:sldId id="283" r:id="rId20"/>
+    <p:sldId id="281" r:id="rId21"/>
+    <p:sldId id="296" r:id="rId22"/>
+    <p:sldId id="295" r:id="rId23"/>
+    <p:sldId id="285" r:id="rId24"/>
+    <p:sldId id="286" r:id="rId25"/>
+    <p:sldId id="287" r:id="rId26"/>
+    <p:sldId id="288" r:id="rId27"/>
+    <p:sldId id="297" r:id="rId28"/>
     <p:sldId id="289" r:id="rId29"/>
   </p:sldIdLst>
   <p:sldSz cx="9144000" cy="5143500" type="screen16x9"/>
@@ -3036,7 +3036,7 @@
           <a:p>
             <a:fld id="{C726C102-7355-4784-A102-F67F03D4410F}" type="datetimeFigureOut">
               <a:rPr lang="LID4096" smtClean="0"/>
-              <a:t>06/26/2019</a:t>
+              <a:t>06/27/2019</a:t>
             </a:fld>
             <a:endParaRPr lang="LID4096"/>
           </a:p>
@@ -5001,7 +5001,7 @@
           <a:p>
             <a:fld id="{462A2416-1570-3849-86F9-07F78746E1B2}" type="datetimeFigureOut">
               <a:rPr lang="en-US" smtClean="0"/>
-              <a:t>6/26/2019</a:t>
+              <a:t>6/27/2019</a:t>
             </a:fld>
             <a:endParaRPr lang="en-US" dirty="0"/>
           </a:p>
@@ -6947,107 +6947,6 @@
           <p:cNvPr id="2" name="Title 1">
             <a:extLst>
               <a:ext uri="{FF2B5EF4-FFF2-40B4-BE49-F238E27FC236}">
-                <a16:creationId xmlns:a16="http://schemas.microsoft.com/office/drawing/2014/main" id="{07EC6741-6FD8-44DB-9E0C-75AA8E337F93}"/>
-              </a:ext>
-            </a:extLst>
-          </p:cNvPr>
-          <p:cNvSpPr>
-            <a:spLocks noGrp="1"/>
-          </p:cNvSpPr>
-          <p:nvPr>
-            <p:ph type="title"/>
-          </p:nvPr>
-        </p:nvSpPr>
-        <p:spPr/>
-        <p:txBody>
-          <a:bodyPr>
-            <a:normAutofit fontScale="90000"/>
-          </a:bodyPr>
-          <a:lstStyle/>
-          <a:p>
-            <a:r>
-              <a:rPr lang="en-US" sz="2400" dirty="0">
-                <a:solidFill>
-                  <a:srgbClr val="002060"/>
-                </a:solidFill>
-              </a:rPr>
-              <a:t>Renaming</a:t>
-            </a:r>
-            <a:br>
-              <a:rPr lang="en-US" dirty="0"/>
-            </a:br>
-            <a:r>
-              <a:rPr lang="en-US" dirty="0"/>
-              <a:t>The Foo Challenge DEMO</a:t>
-            </a:r>
-          </a:p>
-        </p:txBody>
-      </p:sp>
-      <p:pic>
-        <p:nvPicPr>
-          <p:cNvPr id="4" name="Picture 3">
-            <a:extLst>
-              <a:ext uri="{FF2B5EF4-FFF2-40B4-BE49-F238E27FC236}">
-                <a16:creationId xmlns:a16="http://schemas.microsoft.com/office/drawing/2014/main" id="{E6CBCB7B-661D-4B98-B3DC-18A71E7995EC}"/>
-              </a:ext>
-            </a:extLst>
-          </p:cNvPr>
-          <p:cNvPicPr>
-            <a:picLocks noChangeAspect="1"/>
-          </p:cNvPicPr>
-          <p:nvPr/>
-        </p:nvPicPr>
-        <p:blipFill>
-          <a:blip r:embed="rId2"/>
-          <a:stretch>
-            <a:fillRect/>
-          </a:stretch>
-        </p:blipFill>
-        <p:spPr>
-          <a:xfrm>
-            <a:off x="3722622" y="1358987"/>
-            <a:ext cx="3187432" cy="3143163"/>
-          </a:xfrm>
-          <a:prstGeom prst="rect">
-            <a:avLst/>
-          </a:prstGeom>
-        </p:spPr>
-      </p:pic>
-    </p:spTree>
-    <p:extLst>
-      <p:ext uri="{BB962C8B-B14F-4D97-AF65-F5344CB8AC3E}">
-        <p14:creationId xmlns:p14="http://schemas.microsoft.com/office/powerpoint/2010/main" val="3360125998"/>
-      </p:ext>
-    </p:extLst>
-  </p:cSld>
-  <p:clrMapOvr>
-    <a:masterClrMapping/>
-  </p:clrMapOvr>
-</p:sld>
-</file>
-
-<file path=ppt/slides/slide16.xml><?xml version="1.0" encoding="utf-8"?>
-<p:sld xmlns:a="http://schemas.openxmlformats.org/drawingml/2006/main" xmlns:r="http://schemas.openxmlformats.org/officeDocument/2006/relationships" xmlns:p="http://schemas.openxmlformats.org/presentationml/2006/main">
-  <p:cSld>
-    <p:spTree>
-      <p:nvGrpSpPr>
-        <p:cNvPr id="1" name=""/>
-        <p:cNvGrpSpPr/>
-        <p:nvPr/>
-      </p:nvGrpSpPr>
-      <p:grpSpPr>
-        <a:xfrm>
-          <a:off x="0" y="0"/>
-          <a:ext cx="0" cy="0"/>
-          <a:chOff x="0" y="0"/>
-          <a:chExt cx="0" cy="0"/>
-        </a:xfrm>
-      </p:grpSpPr>
-      <p:sp>
-        <p:nvSpPr>
-          <p:cNvPr id="2" name="Title 1">
-            <a:extLst>
-              <a:ext uri="{FF2B5EF4-FFF2-40B4-BE49-F238E27FC236}">
                 <a16:creationId xmlns:a16="http://schemas.microsoft.com/office/drawing/2014/main" id="{D909F41F-2DB6-48DF-BE2F-2FF7F1198D8D}"/>
               </a:ext>
             </a:extLst>
@@ -7201,7 +7100,7 @@
 </p:sld>
 </file>
 
-<file path=ppt/slides/slide17.xml><?xml version="1.0" encoding="utf-8"?>
+<file path=ppt/slides/slide16.xml><?xml version="1.0" encoding="utf-8"?>
 <p:sld xmlns:a="http://schemas.openxmlformats.org/drawingml/2006/main" xmlns:r="http://schemas.openxmlformats.org/officeDocument/2006/relationships" xmlns:p="http://schemas.openxmlformats.org/presentationml/2006/main">
   <p:cSld>
     <p:spTree>
@@ -7301,7 +7200,7 @@
 </p:sld>
 </file>
 
-<file path=ppt/slides/slide18.xml><?xml version="1.0" encoding="utf-8"?>
+<file path=ppt/slides/slide17.xml><?xml version="1.0" encoding="utf-8"?>
 <p:sld xmlns:a="http://schemas.openxmlformats.org/drawingml/2006/main" xmlns:r="http://schemas.openxmlformats.org/officeDocument/2006/relationships" xmlns:p="http://schemas.openxmlformats.org/presentationml/2006/main">
   <p:cSld>
     <p:spTree>
@@ -7401,6 +7300,107 @@
 </p:sld>
 </file>
 
+<file path=ppt/slides/slide18.xml><?xml version="1.0" encoding="utf-8"?>
+<p:sld xmlns:a="http://schemas.openxmlformats.org/drawingml/2006/main" xmlns:r="http://schemas.openxmlformats.org/officeDocument/2006/relationships" xmlns:p="http://schemas.openxmlformats.org/presentationml/2006/main">
+  <p:cSld>
+    <p:spTree>
+      <p:nvGrpSpPr>
+        <p:cNvPr id="1" name=""/>
+        <p:cNvGrpSpPr/>
+        <p:nvPr/>
+      </p:nvGrpSpPr>
+      <p:grpSpPr>
+        <a:xfrm>
+          <a:off x="0" y="0"/>
+          <a:ext cx="0" cy="0"/>
+          <a:chOff x="0" y="0"/>
+          <a:chExt cx="0" cy="0"/>
+        </a:xfrm>
+      </p:grpSpPr>
+      <p:sp>
+        <p:nvSpPr>
+          <p:cNvPr id="2" name="Title 1">
+            <a:extLst>
+              <a:ext uri="{FF2B5EF4-FFF2-40B4-BE49-F238E27FC236}">
+                <a16:creationId xmlns:a16="http://schemas.microsoft.com/office/drawing/2014/main" id="{07EC6741-6FD8-44DB-9E0C-75AA8E337F93}"/>
+              </a:ext>
+            </a:extLst>
+          </p:cNvPr>
+          <p:cNvSpPr>
+            <a:spLocks noGrp="1"/>
+          </p:cNvSpPr>
+          <p:nvPr>
+            <p:ph type="title"/>
+          </p:nvPr>
+        </p:nvSpPr>
+        <p:spPr/>
+        <p:txBody>
+          <a:bodyPr>
+            <a:normAutofit fontScale="90000"/>
+          </a:bodyPr>
+          <a:lstStyle/>
+          <a:p>
+            <a:r>
+              <a:rPr lang="en-US" sz="2400" dirty="0">
+                <a:solidFill>
+                  <a:srgbClr val="002060"/>
+                </a:solidFill>
+              </a:rPr>
+              <a:t>Renaming</a:t>
+            </a:r>
+            <a:br>
+              <a:rPr lang="en-US" dirty="0"/>
+            </a:br>
+            <a:r>
+              <a:rPr lang="en-US" dirty="0"/>
+              <a:t>DEMO</a:t>
+            </a:r>
+          </a:p>
+        </p:txBody>
+      </p:sp>
+      <p:pic>
+        <p:nvPicPr>
+          <p:cNvPr id="4" name="Picture 3">
+            <a:extLst>
+              <a:ext uri="{FF2B5EF4-FFF2-40B4-BE49-F238E27FC236}">
+                <a16:creationId xmlns:a16="http://schemas.microsoft.com/office/drawing/2014/main" id="{E6CBCB7B-661D-4B98-B3DC-18A71E7995EC}"/>
+              </a:ext>
+            </a:extLst>
+          </p:cNvPr>
+          <p:cNvPicPr>
+            <a:picLocks noChangeAspect="1"/>
+          </p:cNvPicPr>
+          <p:nvPr/>
+        </p:nvPicPr>
+        <p:blipFill>
+          <a:blip r:embed="rId2"/>
+          <a:stretch>
+            <a:fillRect/>
+          </a:stretch>
+        </p:blipFill>
+        <p:spPr>
+          <a:xfrm>
+            <a:off x="3722622" y="1358987"/>
+            <a:ext cx="3187432" cy="3143163"/>
+          </a:xfrm>
+          <a:prstGeom prst="rect">
+            <a:avLst/>
+          </a:prstGeom>
+        </p:spPr>
+      </p:pic>
+    </p:spTree>
+    <p:extLst>
+      <p:ext uri="{BB962C8B-B14F-4D97-AF65-F5344CB8AC3E}">
+        <p14:creationId xmlns:p14="http://schemas.microsoft.com/office/powerpoint/2010/main" val="3360125998"/>
+      </p:ext>
+    </p:extLst>
+  </p:cSld>
+  <p:clrMapOvr>
+    <a:masterClrMapping/>
+  </p:clrMapOvr>
+</p:sld>
+</file>
+
 <file path=ppt/slides/slide19.xml><?xml version="1.0" encoding="utf-8"?>
 <p:sld xmlns:a="http://schemas.openxmlformats.org/drawingml/2006/main" xmlns:r="http://schemas.openxmlformats.org/officeDocument/2006/relationships" xmlns:p="http://schemas.openxmlformats.org/presentationml/2006/main">
   <p:cSld>
@@ -7423,7 +7423,7 @@
           <p:cNvPr id="2" name="Title 1">
             <a:extLst>
               <a:ext uri="{FF2B5EF4-FFF2-40B4-BE49-F238E27FC236}">
-                <a16:creationId xmlns:a16="http://schemas.microsoft.com/office/drawing/2014/main" id="{D909F41F-2DB6-48DF-BE2F-2FF7F1198D8D}"/>
+                <a16:creationId xmlns:a16="http://schemas.microsoft.com/office/drawing/2014/main" id="{75242ED9-550F-4CFB-9C3E-FC559B6FDFB2}"/>
               </a:ext>
             </a:extLst>
           </p:cNvPr>
@@ -7442,19 +7442,19 @@
           <a:lstStyle/>
           <a:p>
             <a:r>
-              <a:rPr lang="en-US" sz="2400" dirty="0">
+              <a:rPr lang="en-US" sz="2200" dirty="0">
                 <a:solidFill>
                   <a:srgbClr val="002060"/>
                 </a:solidFill>
               </a:rPr>
-              <a:t>Renaming</a:t>
+              <a:t>Inline Function</a:t>
             </a:r>
             <a:br>
               <a:rPr lang="en-US" dirty="0"/>
             </a:br>
             <a:r>
               <a:rPr lang="en-US" dirty="0"/>
-              <a:t>Problem: Capture DEMO</a:t>
+              <a:t>Inline Specific Call</a:t>
             </a:r>
           </a:p>
         </p:txBody>
@@ -7464,7 +7464,7 @@
           <p:cNvPr id="4" name="Picture 3">
             <a:extLst>
               <a:ext uri="{FF2B5EF4-FFF2-40B4-BE49-F238E27FC236}">
-                <a16:creationId xmlns:a16="http://schemas.microsoft.com/office/drawing/2014/main" id="{7D721E03-F7E6-4599-8233-6BD1E28E0ABA}"/>
+                <a16:creationId xmlns:a16="http://schemas.microsoft.com/office/drawing/2014/main" id="{70A433BC-1795-428B-AA3C-53DE7D3D47F1}"/>
               </a:ext>
             </a:extLst>
           </p:cNvPr>
@@ -7481,38 +7481,8 @@
         </p:blipFill>
         <p:spPr>
           <a:xfrm>
-            <a:off x="1763106" y="1431398"/>
-            <a:ext cx="2512490" cy="2722895"/>
-          </a:xfrm>
-          <a:prstGeom prst="rect">
-            <a:avLst/>
-          </a:prstGeom>
-        </p:spPr>
-      </p:pic>
-      <p:pic>
-        <p:nvPicPr>
-          <p:cNvPr id="5" name="Picture 4">
-            <a:extLst>
-              <a:ext uri="{FF2B5EF4-FFF2-40B4-BE49-F238E27FC236}">
-                <a16:creationId xmlns:a16="http://schemas.microsoft.com/office/drawing/2014/main" id="{D6F212CD-5194-428A-929B-0E2E558C0596}"/>
-              </a:ext>
-            </a:extLst>
-          </p:cNvPr>
-          <p:cNvPicPr>
-            <a:picLocks noChangeAspect="1"/>
-          </p:cNvPicPr>
-          <p:nvPr/>
-        </p:nvPicPr>
-        <p:blipFill>
-          <a:blip r:embed="rId3"/>
-          <a:stretch>
-            <a:fillRect/>
-          </a:stretch>
-        </p:blipFill>
-        <p:spPr>
-          <a:xfrm>
-            <a:off x="5743776" y="1431398"/>
-            <a:ext cx="2512490" cy="2722894"/>
+            <a:off x="1763106" y="1893511"/>
+            <a:ext cx="3040643" cy="1356478"/>
           </a:xfrm>
           <a:prstGeom prst="rect">
             <a:avLst/>
@@ -7524,7 +7494,7 @@
           <p:cNvPr id="6" name="Arrow: Right 5">
             <a:extLst>
               <a:ext uri="{FF2B5EF4-FFF2-40B4-BE49-F238E27FC236}">
-                <a16:creationId xmlns:a16="http://schemas.microsoft.com/office/drawing/2014/main" id="{2931FEA3-A857-41AF-9DAB-9589D7B5B324}"/>
+                <a16:creationId xmlns:a16="http://schemas.microsoft.com/office/drawing/2014/main" id="{5419A342-5A6F-4669-BF51-43B61C78C221}"/>
               </a:ext>
             </a:extLst>
           </p:cNvPr>
@@ -7533,7 +7503,7 @@
         </p:nvSpPr>
         <p:spPr>
           <a:xfrm>
-            <a:off x="4704016" y="2498930"/>
+            <a:off x="4965150" y="2205015"/>
             <a:ext cx="612322" cy="587829"/>
           </a:xfrm>
           <a:prstGeom prst="rightArrow">
@@ -7563,10 +7533,40 @@
           </a:p>
         </p:txBody>
       </p:sp>
+      <p:pic>
+        <p:nvPicPr>
+          <p:cNvPr id="3" name="Picture 2">
+            <a:extLst>
+              <a:ext uri="{FF2B5EF4-FFF2-40B4-BE49-F238E27FC236}">
+                <a16:creationId xmlns:a16="http://schemas.microsoft.com/office/drawing/2014/main" id="{168B4B13-901F-4C9B-8CD9-4698DDC5C4A7}"/>
+              </a:ext>
+            </a:extLst>
+          </p:cNvPr>
+          <p:cNvPicPr>
+            <a:picLocks noChangeAspect="1"/>
+          </p:cNvPicPr>
+          <p:nvPr/>
+        </p:nvPicPr>
+        <p:blipFill>
+          <a:blip r:embed="rId3"/>
+          <a:stretch>
+            <a:fillRect/>
+          </a:stretch>
+        </p:blipFill>
+        <p:spPr>
+          <a:xfrm>
+            <a:off x="5678876" y="1419883"/>
+            <a:ext cx="2908868" cy="2368345"/>
+          </a:xfrm>
+          <a:prstGeom prst="rect">
+            <a:avLst/>
+          </a:prstGeom>
+        </p:spPr>
+      </p:pic>
     </p:spTree>
     <p:extLst>
       <p:ext uri="{BB962C8B-B14F-4D97-AF65-F5344CB8AC3E}">
-        <p14:creationId xmlns:p14="http://schemas.microsoft.com/office/powerpoint/2010/main" val="3396610640"/>
+        <p14:creationId xmlns:p14="http://schemas.microsoft.com/office/powerpoint/2010/main" val="649359674"/>
       </p:ext>
     </p:extLst>
   </p:cSld>
@@ -7688,181 +7688,6 @@
             </a:br>
             <a:r>
               <a:rPr lang="en-US" dirty="0"/>
-              <a:t>Inline Specific Call</a:t>
-            </a:r>
-          </a:p>
-        </p:txBody>
-      </p:sp>
-      <p:pic>
-        <p:nvPicPr>
-          <p:cNvPr id="4" name="Picture 3">
-            <a:extLst>
-              <a:ext uri="{FF2B5EF4-FFF2-40B4-BE49-F238E27FC236}">
-                <a16:creationId xmlns:a16="http://schemas.microsoft.com/office/drawing/2014/main" id="{70A433BC-1795-428B-AA3C-53DE7D3D47F1}"/>
-              </a:ext>
-            </a:extLst>
-          </p:cNvPr>
-          <p:cNvPicPr>
-            <a:picLocks noChangeAspect="1"/>
-          </p:cNvPicPr>
-          <p:nvPr/>
-        </p:nvPicPr>
-        <p:blipFill>
-          <a:blip r:embed="rId2"/>
-          <a:stretch>
-            <a:fillRect/>
-          </a:stretch>
-        </p:blipFill>
-        <p:spPr>
-          <a:xfrm>
-            <a:off x="1763106" y="1893511"/>
-            <a:ext cx="3040643" cy="1356478"/>
-          </a:xfrm>
-          <a:prstGeom prst="rect">
-            <a:avLst/>
-          </a:prstGeom>
-        </p:spPr>
-      </p:pic>
-      <p:pic>
-        <p:nvPicPr>
-          <p:cNvPr id="5" name="Picture 4">
-            <a:extLst>
-              <a:ext uri="{FF2B5EF4-FFF2-40B4-BE49-F238E27FC236}">
-                <a16:creationId xmlns:a16="http://schemas.microsoft.com/office/drawing/2014/main" id="{64900E0E-437D-4930-A245-F81F71C5AAA8}"/>
-              </a:ext>
-            </a:extLst>
-          </p:cNvPr>
-          <p:cNvPicPr>
-            <a:picLocks noChangeAspect="1"/>
-          </p:cNvPicPr>
-          <p:nvPr/>
-        </p:nvPicPr>
-        <p:blipFill>
-          <a:blip r:embed="rId3"/>
-          <a:stretch>
-            <a:fillRect/>
-          </a:stretch>
-        </p:blipFill>
-        <p:spPr>
-          <a:xfrm>
-            <a:off x="6351196" y="1668701"/>
-            <a:ext cx="1699407" cy="1806097"/>
-          </a:xfrm>
-          <a:prstGeom prst="rect">
-            <a:avLst/>
-          </a:prstGeom>
-        </p:spPr>
-      </p:pic>
-      <p:sp>
-        <p:nvSpPr>
-          <p:cNvPr id="6" name="Arrow: Right 5">
-            <a:extLst>
-              <a:ext uri="{FF2B5EF4-FFF2-40B4-BE49-F238E27FC236}">
-                <a16:creationId xmlns:a16="http://schemas.microsoft.com/office/drawing/2014/main" id="{5419A342-5A6F-4669-BF51-43B61C78C221}"/>
-              </a:ext>
-            </a:extLst>
-          </p:cNvPr>
-          <p:cNvSpPr/>
-          <p:nvPr/>
-        </p:nvSpPr>
-        <p:spPr>
-          <a:xfrm>
-            <a:off x="5271311" y="2205015"/>
-            <a:ext cx="612322" cy="587829"/>
-          </a:xfrm>
-          <a:prstGeom prst="rightArrow">
-            <a:avLst/>
-          </a:prstGeom>
-        </p:spPr>
-        <p:style>
-          <a:lnRef idx="1">
-            <a:schemeClr val="accent4"/>
-          </a:lnRef>
-          <a:fillRef idx="3">
-            <a:schemeClr val="accent4"/>
-          </a:fillRef>
-          <a:effectRef idx="2">
-            <a:schemeClr val="accent4"/>
-          </a:effectRef>
-          <a:fontRef idx="minor">
-            <a:schemeClr val="lt1"/>
-          </a:fontRef>
-        </p:style>
-        <p:txBody>
-          <a:bodyPr rtlCol="0" anchor="ctr"/>
-          <a:lstStyle/>
-          <a:p>
-            <a:pPr algn="ctr"/>
-            <a:endParaRPr lang="en-US"/>
-          </a:p>
-        </p:txBody>
-      </p:sp>
-    </p:spTree>
-    <p:extLst>
-      <p:ext uri="{BB962C8B-B14F-4D97-AF65-F5344CB8AC3E}">
-        <p14:creationId xmlns:p14="http://schemas.microsoft.com/office/powerpoint/2010/main" val="649359674"/>
-      </p:ext>
-    </p:extLst>
-  </p:cSld>
-  <p:clrMapOvr>
-    <a:masterClrMapping/>
-  </p:clrMapOvr>
-</p:sld>
-</file>
-
-<file path=ppt/slides/slide21.xml><?xml version="1.0" encoding="utf-8"?>
-<p:sld xmlns:a="http://schemas.openxmlformats.org/drawingml/2006/main" xmlns:r="http://schemas.openxmlformats.org/officeDocument/2006/relationships" xmlns:p="http://schemas.openxmlformats.org/presentationml/2006/main">
-  <p:cSld>
-    <p:spTree>
-      <p:nvGrpSpPr>
-        <p:cNvPr id="1" name=""/>
-        <p:cNvGrpSpPr/>
-        <p:nvPr/>
-      </p:nvGrpSpPr>
-      <p:grpSpPr>
-        <a:xfrm>
-          <a:off x="0" y="0"/>
-          <a:ext cx="0" cy="0"/>
-          <a:chOff x="0" y="0"/>
-          <a:chExt cx="0" cy="0"/>
-        </a:xfrm>
-      </p:grpSpPr>
-      <p:sp>
-        <p:nvSpPr>
-          <p:cNvPr id="2" name="Title 1">
-            <a:extLst>
-              <a:ext uri="{FF2B5EF4-FFF2-40B4-BE49-F238E27FC236}">
-                <a16:creationId xmlns:a16="http://schemas.microsoft.com/office/drawing/2014/main" id="{75242ED9-550F-4CFB-9C3E-FC559B6FDFB2}"/>
-              </a:ext>
-            </a:extLst>
-          </p:cNvPr>
-          <p:cNvSpPr>
-            <a:spLocks noGrp="1"/>
-          </p:cNvSpPr>
-          <p:nvPr>
-            <p:ph type="title"/>
-          </p:nvPr>
-        </p:nvSpPr>
-        <p:spPr/>
-        <p:txBody>
-          <a:bodyPr>
-            <a:normAutofit fontScale="90000"/>
-          </a:bodyPr>
-          <a:lstStyle/>
-          <a:p>
-            <a:r>
-              <a:rPr lang="en-US" sz="2200" dirty="0">
-                <a:solidFill>
-                  <a:srgbClr val="002060"/>
-                </a:solidFill>
-              </a:rPr>
-              <a:t>Inline Function</a:t>
-            </a:r>
-            <a:br>
-              <a:rPr lang="en-US" dirty="0"/>
-            </a:br>
-            <a:r>
-              <a:rPr lang="en-US" dirty="0"/>
               <a:t>Inline Call and Delete Declaration</a:t>
             </a:r>
           </a:p>
@@ -7985,7 +7810,7 @@
 </p:sld>
 </file>
 
-<file path=ppt/slides/slide22.xml><?xml version="1.0" encoding="utf-8"?>
+<file path=ppt/slides/slide21.xml><?xml version="1.0" encoding="utf-8"?>
 <p:sld xmlns:a="http://schemas.openxmlformats.org/drawingml/2006/main" xmlns:r="http://schemas.openxmlformats.org/officeDocument/2006/relationships" xmlns:p="http://schemas.openxmlformats.org/presentationml/2006/main">
   <p:cSld>
     <p:spTree>
@@ -8043,31 +7868,36 @@
           </a:p>
         </p:txBody>
       </p:sp>
-      <p:sp>
-        <p:nvSpPr>
-          <p:cNvPr id="3" name="Content Placeholder 2">
+      <p:pic>
+        <p:nvPicPr>
+          <p:cNvPr id="7" name="Picture 6">
             <a:extLst>
               <a:ext uri="{FF2B5EF4-FFF2-40B4-BE49-F238E27FC236}">
-                <a16:creationId xmlns:a16="http://schemas.microsoft.com/office/drawing/2014/main" id="{DC80C796-6D02-42F5-9E01-05B2D8DD6D36}"/>
+                <a16:creationId xmlns:a16="http://schemas.microsoft.com/office/drawing/2014/main" id="{36BEDE1C-8837-4A06-92ED-975D8F53A225}"/>
               </a:ext>
             </a:extLst>
           </p:cNvPr>
-          <p:cNvSpPr>
-            <a:spLocks noGrp="1"/>
-          </p:cNvSpPr>
-          <p:nvPr>
-            <p:ph idx="1"/>
-          </p:nvPr>
-        </p:nvSpPr>
-        <p:spPr/>
-        <p:txBody>
-          <a:bodyPr/>
-          <a:lstStyle/>
-          <a:p>
-            <a:endParaRPr lang="en-US"/>
-          </a:p>
-        </p:txBody>
-      </p:sp>
+          <p:cNvPicPr>
+            <a:picLocks noChangeAspect="1"/>
+          </p:cNvPicPr>
+          <p:nvPr/>
+        </p:nvPicPr>
+        <p:blipFill>
+          <a:blip r:embed="rId2"/>
+          <a:stretch>
+            <a:fillRect/>
+          </a:stretch>
+        </p:blipFill>
+        <p:spPr>
+          <a:xfrm>
+            <a:off x="3093605" y="1063229"/>
+            <a:ext cx="4445465" cy="3789759"/>
+          </a:xfrm>
+          <a:prstGeom prst="rect">
+            <a:avLst/>
+          </a:prstGeom>
+        </p:spPr>
+      </p:pic>
     </p:spTree>
     <p:extLst>
       <p:ext uri="{BB962C8B-B14F-4D97-AF65-F5344CB8AC3E}">
@@ -8081,7 +7911,7 @@
 </p:sld>
 </file>
 
-<file path=ppt/slides/slide23.xml><?xml version="1.0" encoding="utf-8"?>
+<file path=ppt/slides/slide22.xml><?xml version="1.0" encoding="utf-8"?>
 <p:sld xmlns:a="http://schemas.openxmlformats.org/drawingml/2006/main" xmlns:r="http://schemas.openxmlformats.org/officeDocument/2006/relationships" xmlns:p="http://schemas.openxmlformats.org/presentationml/2006/main">
   <p:cSld>
     <p:spTree>
@@ -8139,31 +7969,36 @@
           </a:p>
         </p:txBody>
       </p:sp>
-      <p:sp>
-        <p:nvSpPr>
-          <p:cNvPr id="3" name="Content Placeholder 2">
+      <p:pic>
+        <p:nvPicPr>
+          <p:cNvPr id="5" name="Picture 4">
             <a:extLst>
               <a:ext uri="{FF2B5EF4-FFF2-40B4-BE49-F238E27FC236}">
-                <a16:creationId xmlns:a16="http://schemas.microsoft.com/office/drawing/2014/main" id="{ADDFD673-5B6F-4B6F-B6AD-69444052CE36}"/>
+                <a16:creationId xmlns:a16="http://schemas.microsoft.com/office/drawing/2014/main" id="{8601D0C4-6F53-4D3E-9CFA-1F2D1CEFCE04}"/>
               </a:ext>
             </a:extLst>
           </p:cNvPr>
-          <p:cNvSpPr>
-            <a:spLocks noGrp="1"/>
-          </p:cNvSpPr>
-          <p:nvPr>
-            <p:ph idx="1"/>
-          </p:nvPr>
-        </p:nvSpPr>
-        <p:spPr/>
-        <p:txBody>
-          <a:bodyPr/>
-          <a:lstStyle/>
-          <a:p>
-            <a:endParaRPr lang="en-US"/>
-          </a:p>
-        </p:txBody>
-      </p:sp>
+          <p:cNvPicPr>
+            <a:picLocks noChangeAspect="1"/>
+          </p:cNvPicPr>
+          <p:nvPr/>
+        </p:nvPicPr>
+        <p:blipFill>
+          <a:blip r:embed="rId2"/>
+          <a:stretch>
+            <a:fillRect/>
+          </a:stretch>
+        </p:blipFill>
+        <p:spPr>
+          <a:xfrm>
+            <a:off x="2563586" y="877525"/>
+            <a:ext cx="4594404" cy="3841432"/>
+          </a:xfrm>
+          <a:prstGeom prst="rect">
+            <a:avLst/>
+          </a:prstGeom>
+        </p:spPr>
+      </p:pic>
     </p:spTree>
     <p:extLst>
       <p:ext uri="{BB962C8B-B14F-4D97-AF65-F5344CB8AC3E}">
@@ -8177,7 +8012,7 @@
 </p:sld>
 </file>
 
-<file path=ppt/slides/slide24.xml><?xml version="1.0" encoding="utf-8"?>
+<file path=ppt/slides/slide23.xml><?xml version="1.0" encoding="utf-8"?>
 <p:sld xmlns:a="http://schemas.openxmlformats.org/drawingml/2006/main" xmlns:r="http://schemas.openxmlformats.org/officeDocument/2006/relationships" xmlns:p="http://schemas.openxmlformats.org/presentationml/2006/main">
   <p:cSld>
     <p:spTree>
@@ -8235,31 +8070,36 @@
           </a:p>
         </p:txBody>
       </p:sp>
-      <p:sp>
-        <p:nvSpPr>
-          <p:cNvPr id="3" name="Content Placeholder 2">
+      <p:pic>
+        <p:nvPicPr>
+          <p:cNvPr id="5" name="Picture 4">
             <a:extLst>
               <a:ext uri="{FF2B5EF4-FFF2-40B4-BE49-F238E27FC236}">
-                <a16:creationId xmlns:a16="http://schemas.microsoft.com/office/drawing/2014/main" id="{4C47954A-2906-4D59-8585-23E7BB9A1A3B}"/>
+                <a16:creationId xmlns:a16="http://schemas.microsoft.com/office/drawing/2014/main" id="{2D0FBDE1-A107-4B8F-84F5-CB0C51C3CF90}"/>
               </a:ext>
             </a:extLst>
           </p:cNvPr>
-          <p:cNvSpPr>
-            <a:spLocks noGrp="1"/>
-          </p:cNvSpPr>
-          <p:nvPr>
-            <p:ph idx="1"/>
-          </p:nvPr>
-        </p:nvSpPr>
-        <p:spPr/>
-        <p:txBody>
-          <a:bodyPr/>
-          <a:lstStyle/>
-          <a:p>
-            <a:endParaRPr lang="en-US"/>
-          </a:p>
-        </p:txBody>
-      </p:sp>
+          <p:cNvPicPr>
+            <a:picLocks noChangeAspect="1"/>
+          </p:cNvPicPr>
+          <p:nvPr/>
+        </p:nvPicPr>
+        <p:blipFill>
+          <a:blip r:embed="rId2"/>
+          <a:stretch>
+            <a:fillRect/>
+          </a:stretch>
+        </p:blipFill>
+        <p:spPr>
+          <a:xfrm>
+            <a:off x="2885656" y="947057"/>
+            <a:ext cx="4033780" cy="3820886"/>
+          </a:xfrm>
+          <a:prstGeom prst="rect">
+            <a:avLst/>
+          </a:prstGeom>
+        </p:spPr>
+      </p:pic>
     </p:spTree>
     <p:extLst>
       <p:ext uri="{BB962C8B-B14F-4D97-AF65-F5344CB8AC3E}">
@@ -8273,7 +8113,7 @@
 </p:sld>
 </file>
 
-<file path=ppt/slides/slide25.xml><?xml version="1.0" encoding="utf-8"?>
+<file path=ppt/slides/slide24.xml><?xml version="1.0" encoding="utf-8"?>
 <p:sld xmlns:a="http://schemas.openxmlformats.org/drawingml/2006/main" xmlns:r="http://schemas.openxmlformats.org/officeDocument/2006/relationships" xmlns:p="http://schemas.openxmlformats.org/presentationml/2006/main">
   <p:cSld>
     <p:spTree>
@@ -8374,7 +8214,7 @@
 </p:sld>
 </file>
 
-<file path=ppt/slides/slide26.xml><?xml version="1.0" encoding="utf-8"?>
+<file path=ppt/slides/slide25.xml><?xml version="1.0" encoding="utf-8"?>
 <p:sld xmlns:a="http://schemas.openxmlformats.org/drawingml/2006/main" xmlns:r="http://schemas.openxmlformats.org/officeDocument/2006/relationships" xmlns:p="http://schemas.openxmlformats.org/presentationml/2006/main">
   <p:cSld>
     <p:spTree>
@@ -8465,6 +8305,181 @@
     <p:extLst>
       <p:ext uri="{BB962C8B-B14F-4D97-AF65-F5344CB8AC3E}">
         <p14:creationId xmlns:p14="http://schemas.microsoft.com/office/powerpoint/2010/main" val="28210673"/>
+      </p:ext>
+    </p:extLst>
+  </p:cSld>
+  <p:clrMapOvr>
+    <a:masterClrMapping/>
+  </p:clrMapOvr>
+</p:sld>
+</file>
+
+<file path=ppt/slides/slide26.xml><?xml version="1.0" encoding="utf-8"?>
+<p:sld xmlns:a="http://schemas.openxmlformats.org/drawingml/2006/main" xmlns:r="http://schemas.openxmlformats.org/officeDocument/2006/relationships" xmlns:p="http://schemas.openxmlformats.org/presentationml/2006/main">
+  <p:cSld>
+    <p:spTree>
+      <p:nvGrpSpPr>
+        <p:cNvPr id="1" name=""/>
+        <p:cNvGrpSpPr/>
+        <p:nvPr/>
+      </p:nvGrpSpPr>
+      <p:grpSpPr>
+        <a:xfrm>
+          <a:off x="0" y="0"/>
+          <a:ext cx="0" cy="0"/>
+          <a:chOff x="0" y="0"/>
+          <a:chExt cx="0" cy="0"/>
+        </a:xfrm>
+      </p:grpSpPr>
+      <p:sp>
+        <p:nvSpPr>
+          <p:cNvPr id="2" name="Title 1">
+            <a:extLst>
+              <a:ext uri="{FF2B5EF4-FFF2-40B4-BE49-F238E27FC236}">
+                <a16:creationId xmlns:a16="http://schemas.microsoft.com/office/drawing/2014/main" id="{75242ED9-550F-4CFB-9C3E-FC559B6FDFB2}"/>
+              </a:ext>
+            </a:extLst>
+          </p:cNvPr>
+          <p:cNvSpPr>
+            <a:spLocks noGrp="1"/>
+          </p:cNvSpPr>
+          <p:nvPr>
+            <p:ph type="title"/>
+          </p:nvPr>
+        </p:nvSpPr>
+        <p:spPr/>
+        <p:txBody>
+          <a:bodyPr>
+            <a:normAutofit fontScale="90000"/>
+          </a:bodyPr>
+          <a:lstStyle/>
+          <a:p>
+            <a:r>
+              <a:rPr lang="en-US" sz="2200" dirty="0">
+                <a:solidFill>
+                  <a:srgbClr val="002060"/>
+                </a:solidFill>
+              </a:rPr>
+              <a:t>Inline Function</a:t>
+            </a:r>
+            <a:br>
+              <a:rPr lang="en-US" dirty="0"/>
+            </a:br>
+            <a:r>
+              <a:rPr lang="en-US" dirty="0"/>
+              <a:t>DEMO</a:t>
+            </a:r>
+          </a:p>
+        </p:txBody>
+      </p:sp>
+      <p:pic>
+        <p:nvPicPr>
+          <p:cNvPr id="4" name="Picture 3">
+            <a:extLst>
+              <a:ext uri="{FF2B5EF4-FFF2-40B4-BE49-F238E27FC236}">
+                <a16:creationId xmlns:a16="http://schemas.microsoft.com/office/drawing/2014/main" id="{70A433BC-1795-428B-AA3C-53DE7D3D47F1}"/>
+              </a:ext>
+            </a:extLst>
+          </p:cNvPr>
+          <p:cNvPicPr>
+            <a:picLocks noChangeAspect="1"/>
+          </p:cNvPicPr>
+          <p:nvPr/>
+        </p:nvPicPr>
+        <p:blipFill>
+          <a:blip r:embed="rId2"/>
+          <a:stretch>
+            <a:fillRect/>
+          </a:stretch>
+        </p:blipFill>
+        <p:spPr>
+          <a:xfrm>
+            <a:off x="1763106" y="1893511"/>
+            <a:ext cx="3040643" cy="1356478"/>
+          </a:xfrm>
+          <a:prstGeom prst="rect">
+            <a:avLst/>
+          </a:prstGeom>
+        </p:spPr>
+      </p:pic>
+      <p:sp>
+        <p:nvSpPr>
+          <p:cNvPr id="6" name="Arrow: Right 5">
+            <a:extLst>
+              <a:ext uri="{FF2B5EF4-FFF2-40B4-BE49-F238E27FC236}">
+                <a16:creationId xmlns:a16="http://schemas.microsoft.com/office/drawing/2014/main" id="{5419A342-5A6F-4669-BF51-43B61C78C221}"/>
+              </a:ext>
+            </a:extLst>
+          </p:cNvPr>
+          <p:cNvSpPr/>
+          <p:nvPr/>
+        </p:nvSpPr>
+        <p:spPr>
+          <a:xfrm>
+            <a:off x="4965150" y="2205015"/>
+            <a:ext cx="612322" cy="587829"/>
+          </a:xfrm>
+          <a:prstGeom prst="rightArrow">
+            <a:avLst/>
+          </a:prstGeom>
+        </p:spPr>
+        <p:style>
+          <a:lnRef idx="1">
+            <a:schemeClr val="accent4"/>
+          </a:lnRef>
+          <a:fillRef idx="3">
+            <a:schemeClr val="accent4"/>
+          </a:fillRef>
+          <a:effectRef idx="2">
+            <a:schemeClr val="accent4"/>
+          </a:effectRef>
+          <a:fontRef idx="minor">
+            <a:schemeClr val="lt1"/>
+          </a:fontRef>
+        </p:style>
+        <p:txBody>
+          <a:bodyPr rtlCol="0" anchor="ctr"/>
+          <a:lstStyle/>
+          <a:p>
+            <a:pPr algn="ctr"/>
+            <a:endParaRPr lang="en-US"/>
+          </a:p>
+        </p:txBody>
+      </p:sp>
+      <p:pic>
+        <p:nvPicPr>
+          <p:cNvPr id="3" name="Picture 2">
+            <a:extLst>
+              <a:ext uri="{FF2B5EF4-FFF2-40B4-BE49-F238E27FC236}">
+                <a16:creationId xmlns:a16="http://schemas.microsoft.com/office/drawing/2014/main" id="{168B4B13-901F-4C9B-8CD9-4698DDC5C4A7}"/>
+              </a:ext>
+            </a:extLst>
+          </p:cNvPr>
+          <p:cNvPicPr>
+            <a:picLocks noChangeAspect="1"/>
+          </p:cNvPicPr>
+          <p:nvPr/>
+        </p:nvPicPr>
+        <p:blipFill>
+          <a:blip r:embed="rId3"/>
+          <a:stretch>
+            <a:fillRect/>
+          </a:stretch>
+        </p:blipFill>
+        <p:spPr>
+          <a:xfrm>
+            <a:off x="5678876" y="1419883"/>
+            <a:ext cx="2908868" cy="2368345"/>
+          </a:xfrm>
+          <a:prstGeom prst="rect">
+            <a:avLst/>
+          </a:prstGeom>
+        </p:spPr>
+      </p:pic>
+    </p:spTree>
+    <p:extLst>
+      <p:ext uri="{BB962C8B-B14F-4D97-AF65-F5344CB8AC3E}">
+        <p14:creationId xmlns:p14="http://schemas.microsoft.com/office/powerpoint/2010/main" val="1164087496"/>
       </p:ext>
     </p:extLst>
   </p:cSld>
@@ -8645,7 +8660,7 @@
             <a:avLst/>
           </a:prstGeom>
           <a:solidFill>
-            <a:srgbClr val="FF0000"/>
+            <a:srgbClr val="FFC000"/>
           </a:solidFill>
         </p:spPr>
         <p:style>

</xml_diff>

<commit_message>
Add Slides on Testing
</commit_message>
<xml_diff>
--- a/presentation/Misteli_Refactoring_in_Spoofax.pptx
+++ b/presentation/Misteli_Refactoring_in_Spoofax.pptx
@@ -6,10 +6,10 @@
     <p:sldMasterId id="2147483660" r:id="rId2"/>
   </p:sldMasterIdLst>
   <p:notesMasterIdLst>
-    <p:notesMasterId r:id="rId30"/>
+    <p:notesMasterId r:id="rId41"/>
   </p:notesMasterIdLst>
   <p:handoutMasterIdLst>
-    <p:handoutMasterId r:id="rId31"/>
+    <p:handoutMasterId r:id="rId42"/>
   </p:handoutMasterIdLst>
   <p:sldIdLst>
     <p:sldId id="256" r:id="rId3"/>
@@ -38,7 +38,18 @@
     <p:sldId id="287" r:id="rId26"/>
     <p:sldId id="288" r:id="rId27"/>
     <p:sldId id="297" r:id="rId28"/>
-    <p:sldId id="289" r:id="rId29"/>
+    <p:sldId id="299" r:id="rId29"/>
+    <p:sldId id="300" r:id="rId30"/>
+    <p:sldId id="306" r:id="rId31"/>
+    <p:sldId id="303" r:id="rId32"/>
+    <p:sldId id="304" r:id="rId33"/>
+    <p:sldId id="307" r:id="rId34"/>
+    <p:sldId id="309" r:id="rId35"/>
+    <p:sldId id="310" r:id="rId36"/>
+    <p:sldId id="305" r:id="rId37"/>
+    <p:sldId id="311" r:id="rId38"/>
+    <p:sldId id="312" r:id="rId39"/>
+    <p:sldId id="289" r:id="rId40"/>
   </p:sldIdLst>
   <p:sldSz cx="9144000" cy="5143500" type="screen16x9"/>
   <p:notesSz cx="6858000" cy="9144000"/>
@@ -2871,7 +2882,7 @@
           <a:p>
             <a:fld id="{DBAE3B3E-782A-9745-8E84-372F7B6771BF}" type="datetimeFigureOut">
               <a:rPr lang="en-US" smtClean="0"/>
-              <a:t>6/27/2019</a:t>
+              <a:t>6/28/2019</a:t>
             </a:fld>
             <a:endParaRPr lang="en-US" dirty="0"/>
           </a:p>
@@ -3036,7 +3047,7 @@
           <a:p>
             <a:fld id="{C726C102-7355-4784-A102-F67F03D4410F}" type="datetimeFigureOut">
               <a:rPr lang="LID4096" smtClean="0"/>
-              <a:t>06/27/2019</a:t>
+              <a:t>06/28/2019</a:t>
             </a:fld>
             <a:endParaRPr lang="LID4096"/>
           </a:p>
@@ -3422,6 +3433,146 @@
 </p:notes>
 </file>
 
+<file path=ppt/notesSlides/notesSlide10.xml><?xml version="1.0" encoding="utf-8"?>
+<p:notes xmlns:a="http://schemas.openxmlformats.org/drawingml/2006/main" xmlns:r="http://schemas.openxmlformats.org/officeDocument/2006/relationships" xmlns:p="http://schemas.openxmlformats.org/presentationml/2006/main">
+  <p:cSld>
+    <p:spTree>
+      <p:nvGrpSpPr>
+        <p:cNvPr id="1" name=""/>
+        <p:cNvGrpSpPr/>
+        <p:nvPr/>
+      </p:nvGrpSpPr>
+      <p:grpSpPr>
+        <a:xfrm>
+          <a:off x="0" y="0"/>
+          <a:ext cx="0" cy="0"/>
+          <a:chOff x="0" y="0"/>
+          <a:chExt cx="0" cy="0"/>
+        </a:xfrm>
+      </p:grpSpPr>
+      <p:sp>
+        <p:nvSpPr>
+          <p:cNvPr id="2" name="Slide Image Placeholder 1"/>
+          <p:cNvSpPr>
+            <a:spLocks noGrp="1" noRot="1" noChangeAspect="1"/>
+          </p:cNvSpPr>
+          <p:nvPr>
+            <p:ph type="sldImg"/>
+          </p:nvPr>
+        </p:nvSpPr>
+        <p:spPr/>
+      </p:sp>
+      <p:sp>
+        <p:nvSpPr>
+          <p:cNvPr id="3" name="Notes Placeholder 2"/>
+          <p:cNvSpPr>
+            <a:spLocks noGrp="1"/>
+          </p:cNvSpPr>
+          <p:nvPr>
+            <p:ph type="body" idx="1"/>
+          </p:nvPr>
+        </p:nvSpPr>
+        <p:spPr/>
+        <p:txBody>
+          <a:bodyPr/>
+          <a:lstStyle/>
+          <a:p>
+            <a:pPr marL="228600" indent="-228600">
+              <a:buAutoNum type="arabicPeriod"/>
+            </a:pPr>
+            <a:r>
+              <a:rPr lang="en-US" dirty="0"/>
+              <a:t>Gather all Vars in expression</a:t>
+            </a:r>
+          </a:p>
+          <a:p>
+            <a:pPr marL="228600" indent="-228600">
+              <a:buAutoNum type="arabicPeriod"/>
+            </a:pPr>
+            <a:r>
+              <a:rPr lang="en-US" dirty="0"/>
+              <a:t>Filter out vars that are declared in the expression</a:t>
+            </a:r>
+          </a:p>
+          <a:p>
+            <a:pPr marL="228600" indent="-228600">
+              <a:buAutoNum type="arabicPeriod"/>
+            </a:pPr>
+            <a:r>
+              <a:rPr lang="en-US" dirty="0"/>
+              <a:t>Turn Vars to </a:t>
+            </a:r>
+            <a:r>
+              <a:rPr lang="en-US" dirty="0" err="1"/>
+              <a:t>Fargs</a:t>
+            </a:r>
+            <a:endParaRPr lang="en-US" dirty="0"/>
+          </a:p>
+          <a:p>
+            <a:pPr marL="228600" indent="-228600">
+              <a:buAutoNum type="arabicPeriod"/>
+            </a:pPr>
+            <a:r>
+              <a:rPr lang="en-US" dirty="0"/>
+              <a:t>Check if outside variable is written to</a:t>
+            </a:r>
+          </a:p>
+          <a:p>
+            <a:pPr marL="228600" indent="-228600">
+              <a:buAutoNum type="arabicPeriod"/>
+            </a:pPr>
+            <a:r>
+              <a:rPr lang="en-US" dirty="0"/>
+              <a:t>Determine return type</a:t>
+            </a:r>
+          </a:p>
+          <a:p>
+            <a:pPr marL="228600" indent="-228600">
+              <a:buAutoNum type="arabicPeriod"/>
+            </a:pPr>
+            <a:r>
+              <a:rPr lang="en-US" dirty="0"/>
+              <a:t>Copy body</a:t>
+            </a:r>
+          </a:p>
+        </p:txBody>
+      </p:sp>
+      <p:sp>
+        <p:nvSpPr>
+          <p:cNvPr id="4" name="Slide Number Placeholder 3"/>
+          <p:cNvSpPr>
+            <a:spLocks noGrp="1"/>
+          </p:cNvSpPr>
+          <p:nvPr>
+            <p:ph type="sldNum" sz="quarter" idx="5"/>
+          </p:nvPr>
+        </p:nvSpPr>
+        <p:spPr/>
+        <p:txBody>
+          <a:bodyPr/>
+          <a:lstStyle/>
+          <a:p>
+            <a:fld id="{57469752-A353-4215-9498-7371F7601A20}" type="slidenum">
+              <a:rPr lang="LID4096" smtClean="0"/>
+              <a:t>29</a:t>
+            </a:fld>
+            <a:endParaRPr lang="LID4096"/>
+          </a:p>
+        </p:txBody>
+      </p:sp>
+    </p:spTree>
+    <p:extLst>
+      <p:ext uri="{BB962C8B-B14F-4D97-AF65-F5344CB8AC3E}">
+        <p14:creationId xmlns:p14="http://schemas.microsoft.com/office/powerpoint/2010/main" val="2173146578"/>
+      </p:ext>
+    </p:extLst>
+  </p:cSld>
+  <p:clrMapOvr>
+    <a:masterClrMapping/>
+  </p:clrMapOvr>
+</p:notes>
+</file>
+
 <file path=ppt/notesSlides/notesSlide2.xml><?xml version="1.0" encoding="utf-8"?>
 <p:notes xmlns:a="http://schemas.openxmlformats.org/drawingml/2006/main" xmlns:r="http://schemas.openxmlformats.org/officeDocument/2006/relationships" xmlns:p="http://schemas.openxmlformats.org/presentationml/2006/main">
   <p:cSld>
@@ -5001,7 +5152,7 @@
           <a:p>
             <a:fld id="{462A2416-1570-3849-86F9-07F78746E1B2}" type="datetimeFigureOut">
               <a:rPr lang="en-US" smtClean="0"/>
-              <a:t>6/27/2019</a:t>
+              <a:t>6/28/2019</a:t>
             </a:fld>
             <a:endParaRPr lang="en-US" dirty="0"/>
           </a:p>
@@ -6374,7 +6525,7 @@
                 <a:latin typeface="Arial"/>
                 <a:cs typeface="Arial"/>
               </a:rPr>
-              <a:t>Philippe Misteli </a:t>
+              <a:t>Phil Misteli </a:t>
             </a:r>
             <a:r>
               <a:rPr lang="en-US" sz="2000" dirty="0"/>
@@ -7856,7 +8007,7 @@
                   <a:srgbClr val="002060"/>
                 </a:solidFill>
               </a:rPr>
-              <a:t>Inline</a:t>
+              <a:t>Inline Function</a:t>
             </a:r>
             <a:br>
               <a:rPr lang="en-US" dirty="0"/>
@@ -7957,7 +8108,7 @@
                   <a:srgbClr val="002060"/>
                 </a:solidFill>
               </a:rPr>
-              <a:t>Inline</a:t>
+              <a:t>Inline Function</a:t>
             </a:r>
             <a:br>
               <a:rPr lang="en-US" dirty="0"/>
@@ -8058,7 +8209,7 @@
                   <a:srgbClr val="002060"/>
                 </a:solidFill>
               </a:rPr>
-              <a:t>Inline</a:t>
+              <a:t>Inline Function</a:t>
             </a:r>
             <a:br>
               <a:rPr lang="en-US" dirty="0"/>
@@ -8159,7 +8310,7 @@
                   <a:srgbClr val="002060"/>
                 </a:solidFill>
               </a:rPr>
-              <a:t>Inline</a:t>
+              <a:t>Inline Function</a:t>
             </a:r>
             <a:br>
               <a:rPr lang="en-US" dirty="0"/>
@@ -8260,7 +8411,7 @@
                   <a:srgbClr val="002060"/>
                 </a:solidFill>
               </a:rPr>
-              <a:t>Inline</a:t>
+              <a:t>Inline Function</a:t>
             </a:r>
             <a:br>
               <a:rPr lang="en-US" dirty="0"/>
@@ -8511,7 +8662,7 @@
           <p:cNvPr id="2" name="Title 1">
             <a:extLst>
               <a:ext uri="{FF2B5EF4-FFF2-40B4-BE49-F238E27FC236}">
-                <a16:creationId xmlns:a16="http://schemas.microsoft.com/office/drawing/2014/main" id="{795A6E4F-00C5-4C1D-BA8D-FEB9CF1BB993}"/>
+                <a16:creationId xmlns:a16="http://schemas.microsoft.com/office/drawing/2014/main" id="{A6DA6033-48F0-470A-9805-9C029D3A858F}"/>
               </a:ext>
             </a:extLst>
           </p:cNvPr>
@@ -8529,17 +8680,47 @@
           <a:p>
             <a:r>
               <a:rPr lang="en-US" dirty="0"/>
-              <a:t>Conclusion</a:t>
+              <a:t>Extract Function</a:t>
             </a:r>
           </a:p>
         </p:txBody>
       </p:sp>
+      <p:pic>
+        <p:nvPicPr>
+          <p:cNvPr id="4" name="Picture 3">
+            <a:extLst>
+              <a:ext uri="{FF2B5EF4-FFF2-40B4-BE49-F238E27FC236}">
+                <a16:creationId xmlns:a16="http://schemas.microsoft.com/office/drawing/2014/main" id="{30986727-EC2B-42DE-BBF4-55F9C9314867}"/>
+              </a:ext>
+            </a:extLst>
+          </p:cNvPr>
+          <p:cNvPicPr>
+            <a:picLocks noChangeAspect="1"/>
+          </p:cNvPicPr>
+          <p:nvPr/>
+        </p:nvPicPr>
+        <p:blipFill>
+          <a:blip r:embed="rId2"/>
+          <a:stretch>
+            <a:fillRect/>
+          </a:stretch>
+        </p:blipFill>
+        <p:spPr>
+          <a:xfrm>
+            <a:off x="1763106" y="1872320"/>
+            <a:ext cx="2088299" cy="1398860"/>
+          </a:xfrm>
+          <a:prstGeom prst="rect">
+            <a:avLst/>
+          </a:prstGeom>
+        </p:spPr>
+      </p:pic>
       <p:sp>
         <p:nvSpPr>
-          <p:cNvPr id="5" name="Rectangle: Rounded Corners 4">
+          <p:cNvPr id="5" name="Arrow: Right 4">
             <a:extLst>
               <a:ext uri="{FF2B5EF4-FFF2-40B4-BE49-F238E27FC236}">
-                <a16:creationId xmlns:a16="http://schemas.microsoft.com/office/drawing/2014/main" id="{74522C98-12A9-46CA-8BD9-A5CD6FB86AA9}"/>
+                <a16:creationId xmlns:a16="http://schemas.microsoft.com/office/drawing/2014/main" id="{DFCAE3CD-9945-41AE-83C1-786FE88FD7FE}"/>
               </a:ext>
             </a:extLst>
           </p:cNvPr>
@@ -8548,120 +8729,12 @@
         </p:nvSpPr>
         <p:spPr>
           <a:xfrm>
-            <a:off x="1763104" y="2571749"/>
-            <a:ext cx="3078315" cy="980185"/>
+            <a:off x="4133920" y="2277835"/>
+            <a:ext cx="612322" cy="587829"/>
           </a:xfrm>
-          <a:prstGeom prst="roundRect">
+          <a:prstGeom prst="rightArrow">
             <a:avLst/>
           </a:prstGeom>
-          <a:solidFill>
-            <a:srgbClr val="00B050"/>
-          </a:solidFill>
-          <a:effectLst/>
-        </p:spPr>
-        <p:style>
-          <a:lnRef idx="1">
-            <a:schemeClr val="accent1"/>
-          </a:lnRef>
-          <a:fillRef idx="3">
-            <a:schemeClr val="accent1"/>
-          </a:fillRef>
-          <a:effectRef idx="2">
-            <a:schemeClr val="accent1"/>
-          </a:effectRef>
-          <a:fontRef idx="minor">
-            <a:schemeClr val="lt1"/>
-          </a:fontRef>
-        </p:style>
-        <p:txBody>
-          <a:bodyPr rtlCol="0" anchor="ctr"/>
-          <a:lstStyle/>
-          <a:p>
-            <a:pPr algn="ctr"/>
-            <a:r>
-              <a:rPr lang="en-US" sz="2400" dirty="0"/>
-              <a:t>Scope Graph</a:t>
-            </a:r>
-          </a:p>
-        </p:txBody>
-      </p:sp>
-      <p:sp>
-        <p:nvSpPr>
-          <p:cNvPr id="6" name="Rectangle: Rounded Corners 5">
-            <a:extLst>
-              <a:ext uri="{FF2B5EF4-FFF2-40B4-BE49-F238E27FC236}">
-                <a16:creationId xmlns:a16="http://schemas.microsoft.com/office/drawing/2014/main" id="{AE36B88C-19CA-4B3E-81B8-CB63057D4782}"/>
-              </a:ext>
-            </a:extLst>
-          </p:cNvPr>
-          <p:cNvSpPr/>
-          <p:nvPr/>
-        </p:nvSpPr>
-        <p:spPr>
-          <a:xfrm>
-            <a:off x="1763106" y="1195743"/>
-            <a:ext cx="3078315" cy="980185"/>
-          </a:xfrm>
-          <a:prstGeom prst="roundRect">
-            <a:avLst/>
-          </a:prstGeom>
-          <a:solidFill>
-            <a:srgbClr val="00B050"/>
-          </a:solidFill>
-        </p:spPr>
-        <p:style>
-          <a:lnRef idx="1">
-            <a:schemeClr val="accent1"/>
-          </a:lnRef>
-          <a:fillRef idx="3">
-            <a:schemeClr val="accent1"/>
-          </a:fillRef>
-          <a:effectRef idx="2">
-            <a:schemeClr val="accent1"/>
-          </a:effectRef>
-          <a:fontRef idx="minor">
-            <a:schemeClr val="lt1"/>
-          </a:fontRef>
-        </p:style>
-        <p:txBody>
-          <a:bodyPr rtlCol="0" anchor="ctr"/>
-          <a:lstStyle/>
-          <a:p>
-            <a:pPr algn="ctr"/>
-            <a:r>
-              <a:rPr lang="en-US" sz="2400" dirty="0" err="1"/>
-              <a:t>Stratego</a:t>
-            </a:r>
-            <a:r>
-              <a:rPr lang="en-US" sz="2400" dirty="0"/>
-              <a:t> Transformations</a:t>
-            </a:r>
-          </a:p>
-        </p:txBody>
-      </p:sp>
-      <p:sp>
-        <p:nvSpPr>
-          <p:cNvPr id="7" name="Rectangle: Rounded Corners 6">
-            <a:extLst>
-              <a:ext uri="{FF2B5EF4-FFF2-40B4-BE49-F238E27FC236}">
-                <a16:creationId xmlns:a16="http://schemas.microsoft.com/office/drawing/2014/main" id="{C6DE87A5-1A59-47A6-9042-E20849C2FA8D}"/>
-              </a:ext>
-            </a:extLst>
-          </p:cNvPr>
-          <p:cNvSpPr/>
-          <p:nvPr/>
-        </p:nvSpPr>
-        <p:spPr>
-          <a:xfrm>
-            <a:off x="5401656" y="1220236"/>
-            <a:ext cx="3078315" cy="980185"/>
-          </a:xfrm>
-          <a:prstGeom prst="roundRect">
-            <a:avLst/>
-          </a:prstGeom>
-          <a:solidFill>
-            <a:srgbClr val="FFC000"/>
-          </a:solidFill>
         </p:spPr>
         <p:style>
           <a:lnRef idx="1">
@@ -8682,117 +8755,246 @@
           <a:lstStyle/>
           <a:p>
             <a:pPr algn="ctr"/>
-            <a:r>
-              <a:rPr lang="en-US" sz="2400" dirty="0"/>
-              <a:t>Nabl2 API</a:t>
-            </a:r>
+            <a:endParaRPr lang="en-US"/>
           </a:p>
         </p:txBody>
       </p:sp>
-      <p:sp>
-        <p:nvSpPr>
-          <p:cNvPr id="8" name="Rectangle: Rounded Corners 7">
+      <p:pic>
+        <p:nvPicPr>
+          <p:cNvPr id="6" name="Picture 5">
             <a:extLst>
               <a:ext uri="{FF2B5EF4-FFF2-40B4-BE49-F238E27FC236}">
-                <a16:creationId xmlns:a16="http://schemas.microsoft.com/office/drawing/2014/main" id="{9702475F-C731-411E-A1AF-769623E3C8B7}"/>
+                <a16:creationId xmlns:a16="http://schemas.microsoft.com/office/drawing/2014/main" id="{7DF24EFD-C678-4BD6-8EAC-B4357551010B}"/>
               </a:ext>
             </a:extLst>
           </p:cNvPr>
-          <p:cNvSpPr/>
+          <p:cNvPicPr>
+            <a:picLocks noChangeAspect="1"/>
+          </p:cNvPicPr>
           <p:nvPr/>
-        </p:nvSpPr>
+        </p:nvPicPr>
+        <p:blipFill>
+          <a:blip r:embed="rId3"/>
+          <a:stretch>
+            <a:fillRect/>
+          </a:stretch>
+        </p:blipFill>
         <p:spPr>
           <a:xfrm>
-            <a:off x="5401655" y="2571750"/>
-            <a:ext cx="3078315" cy="980185"/>
+            <a:off x="5028757" y="1603925"/>
+            <a:ext cx="3840813" cy="1935648"/>
           </a:xfrm>
-          <a:prstGeom prst="roundRect">
+          <a:prstGeom prst="rect">
             <a:avLst/>
           </a:prstGeom>
-          <a:solidFill>
-            <a:srgbClr val="FF0000"/>
-          </a:solidFill>
         </p:spPr>
-        <p:style>
-          <a:lnRef idx="1">
-            <a:schemeClr val="accent4"/>
-          </a:lnRef>
-          <a:fillRef idx="3">
-            <a:schemeClr val="accent4"/>
-          </a:fillRef>
-          <a:effectRef idx="2">
-            <a:schemeClr val="accent4"/>
-          </a:effectRef>
-          <a:fontRef idx="minor">
-            <a:schemeClr val="lt1"/>
-          </a:fontRef>
-        </p:style>
-        <p:txBody>
-          <a:bodyPr rtlCol="0" anchor="ctr"/>
-          <a:lstStyle/>
-          <a:p>
-            <a:pPr algn="ctr"/>
-            <a:r>
-              <a:rPr lang="en-US" sz="2400" dirty="0"/>
-              <a:t>Eclipse UI Integration</a:t>
-            </a:r>
-          </a:p>
-        </p:txBody>
-      </p:sp>
+      </p:pic>
+    </p:spTree>
+    <p:extLst>
+      <p:ext uri="{BB962C8B-B14F-4D97-AF65-F5344CB8AC3E}">
+        <p14:creationId xmlns:p14="http://schemas.microsoft.com/office/powerpoint/2010/main" val="2396736113"/>
+      </p:ext>
+    </p:extLst>
+  </p:cSld>
+  <p:clrMapOvr>
+    <a:masterClrMapping/>
+  </p:clrMapOvr>
+</p:sld>
+</file>
+
+<file path=ppt/slides/slide28.xml><?xml version="1.0" encoding="utf-8"?>
+<p:sld xmlns:a="http://schemas.openxmlformats.org/drawingml/2006/main" xmlns:r="http://schemas.openxmlformats.org/officeDocument/2006/relationships" xmlns:p="http://schemas.openxmlformats.org/presentationml/2006/main">
+  <p:cSld>
+    <p:spTree>
+      <p:nvGrpSpPr>
+        <p:cNvPr id="1" name=""/>
+        <p:cNvGrpSpPr/>
+        <p:nvPr/>
+      </p:nvGrpSpPr>
+      <p:grpSpPr>
+        <a:xfrm>
+          <a:off x="0" y="0"/>
+          <a:ext cx="0" cy="0"/>
+          <a:chOff x="0" y="0"/>
+          <a:chExt cx="0" cy="0"/>
+        </a:xfrm>
+      </p:grpSpPr>
       <p:sp>
         <p:nvSpPr>
-          <p:cNvPr id="9" name="Rectangle: Rounded Corners 8">
+          <p:cNvPr id="2" name="Title 1">
             <a:extLst>
               <a:ext uri="{FF2B5EF4-FFF2-40B4-BE49-F238E27FC236}">
-                <a16:creationId xmlns:a16="http://schemas.microsoft.com/office/drawing/2014/main" id="{82E51E27-B576-4E0F-9A80-D9938E13E4D5}"/>
+                <a16:creationId xmlns:a16="http://schemas.microsoft.com/office/drawing/2014/main" id="{75242ED9-550F-4CFB-9C3E-FC559B6FDFB2}"/>
               </a:ext>
             </a:extLst>
           </p:cNvPr>
-          <p:cNvSpPr/>
+          <p:cNvSpPr>
+            <a:spLocks noGrp="1"/>
+          </p:cNvSpPr>
+          <p:nvPr>
+            <p:ph type="title"/>
+          </p:nvPr>
+        </p:nvSpPr>
+        <p:spPr/>
+        <p:txBody>
+          <a:bodyPr>
+            <a:normAutofit fontScale="90000"/>
+          </a:bodyPr>
+          <a:lstStyle/>
+          <a:p>
+            <a:r>
+              <a:rPr lang="en-US" sz="2200" dirty="0">
+                <a:solidFill>
+                  <a:srgbClr val="002060"/>
+                </a:solidFill>
+              </a:rPr>
+              <a:t>Extract Function</a:t>
+            </a:r>
+            <a:br>
+              <a:rPr lang="en-US" dirty="0"/>
+            </a:br>
+            <a:r>
+              <a:rPr lang="en-US" dirty="0"/>
+              <a:t>Step 1: Check Selected Term</a:t>
+            </a:r>
+          </a:p>
+        </p:txBody>
+      </p:sp>
+      <p:pic>
+        <p:nvPicPr>
+          <p:cNvPr id="4" name="Picture 3">
+            <a:extLst>
+              <a:ext uri="{FF2B5EF4-FFF2-40B4-BE49-F238E27FC236}">
+                <a16:creationId xmlns:a16="http://schemas.microsoft.com/office/drawing/2014/main" id="{AF04FF27-DCF5-42C3-9202-9BA1F983732D}"/>
+              </a:ext>
+            </a:extLst>
+          </p:cNvPr>
+          <p:cNvPicPr>
+            <a:picLocks noChangeAspect="1"/>
+          </p:cNvPicPr>
           <p:nvPr/>
-        </p:nvSpPr>
+        </p:nvPicPr>
+        <p:blipFill>
+          <a:blip r:embed="rId2"/>
+          <a:stretch>
+            <a:fillRect/>
+          </a:stretch>
+        </p:blipFill>
         <p:spPr>
           <a:xfrm>
-            <a:off x="5401654" y="3923264"/>
-            <a:ext cx="3078315" cy="980185"/>
+            <a:off x="3259091" y="1063229"/>
+            <a:ext cx="4114493" cy="3628529"/>
           </a:xfrm>
-          <a:prstGeom prst="roundRect">
+          <a:prstGeom prst="rect">
             <a:avLst/>
           </a:prstGeom>
-          <a:solidFill>
-            <a:srgbClr val="FF0000"/>
-          </a:solidFill>
         </p:spPr>
-        <p:style>
-          <a:lnRef idx="1">
-            <a:schemeClr val="accent4"/>
-          </a:lnRef>
-          <a:fillRef idx="3">
-            <a:schemeClr val="accent4"/>
-          </a:fillRef>
-          <a:effectRef idx="2">
-            <a:schemeClr val="accent4"/>
-          </a:effectRef>
-          <a:fontRef idx="minor">
-            <a:schemeClr val="lt1"/>
-          </a:fontRef>
-        </p:style>
-        <p:txBody>
-          <a:bodyPr rtlCol="0" anchor="ctr"/>
-          <a:lstStyle/>
-          <a:p>
-            <a:pPr algn="ctr"/>
-            <a:r>
-              <a:rPr lang="en-US" sz="2400" dirty="0"/>
-              <a:t>Transformations in SPT</a:t>
-            </a:r>
-          </a:p>
-        </p:txBody>
-      </p:sp>
+      </p:pic>
     </p:spTree>
     <p:extLst>
       <p:ext uri="{BB962C8B-B14F-4D97-AF65-F5344CB8AC3E}">
-        <p14:creationId xmlns:p14="http://schemas.microsoft.com/office/powerpoint/2010/main" val="1803745701"/>
+        <p14:creationId xmlns:p14="http://schemas.microsoft.com/office/powerpoint/2010/main" val="3482495086"/>
+      </p:ext>
+    </p:extLst>
+  </p:cSld>
+  <p:clrMapOvr>
+    <a:masterClrMapping/>
+  </p:clrMapOvr>
+</p:sld>
+</file>
+
+<file path=ppt/slides/slide29.xml><?xml version="1.0" encoding="utf-8"?>
+<p:sld xmlns:a="http://schemas.openxmlformats.org/drawingml/2006/main" xmlns:r="http://schemas.openxmlformats.org/officeDocument/2006/relationships" xmlns:p="http://schemas.openxmlformats.org/presentationml/2006/main">
+  <p:cSld>
+    <p:spTree>
+      <p:nvGrpSpPr>
+        <p:cNvPr id="1" name=""/>
+        <p:cNvGrpSpPr/>
+        <p:nvPr/>
+      </p:nvGrpSpPr>
+      <p:grpSpPr>
+        <a:xfrm>
+          <a:off x="0" y="0"/>
+          <a:ext cx="0" cy="0"/>
+          <a:chOff x="0" y="0"/>
+          <a:chExt cx="0" cy="0"/>
+        </a:xfrm>
+      </p:grpSpPr>
+      <p:sp>
+        <p:nvSpPr>
+          <p:cNvPr id="2" name="Title 1">
+            <a:extLst>
+              <a:ext uri="{FF2B5EF4-FFF2-40B4-BE49-F238E27FC236}">
+                <a16:creationId xmlns:a16="http://schemas.microsoft.com/office/drawing/2014/main" id="{75242ED9-550F-4CFB-9C3E-FC559B6FDFB2}"/>
+              </a:ext>
+            </a:extLst>
+          </p:cNvPr>
+          <p:cNvSpPr>
+            <a:spLocks noGrp="1"/>
+          </p:cNvSpPr>
+          <p:nvPr>
+            <p:ph type="title"/>
+          </p:nvPr>
+        </p:nvSpPr>
+        <p:spPr/>
+        <p:txBody>
+          <a:bodyPr>
+            <a:normAutofit fontScale="90000"/>
+          </a:bodyPr>
+          <a:lstStyle/>
+          <a:p>
+            <a:r>
+              <a:rPr lang="en-US" sz="2200" dirty="0">
+                <a:solidFill>
+                  <a:srgbClr val="002060"/>
+                </a:solidFill>
+              </a:rPr>
+              <a:t>Extract Function</a:t>
+            </a:r>
+            <a:br>
+              <a:rPr lang="en-US" dirty="0"/>
+            </a:br>
+            <a:r>
+              <a:rPr lang="en-US" dirty="0"/>
+              <a:t>Step 2: Create Function Definition</a:t>
+            </a:r>
+          </a:p>
+        </p:txBody>
+      </p:sp>
+      <p:pic>
+        <p:nvPicPr>
+          <p:cNvPr id="4" name="Picture 3">
+            <a:extLst>
+              <a:ext uri="{FF2B5EF4-FFF2-40B4-BE49-F238E27FC236}">
+                <a16:creationId xmlns:a16="http://schemas.microsoft.com/office/drawing/2014/main" id="{BDD433A6-2AB2-4BC6-BE0E-3949C31C5492}"/>
+              </a:ext>
+            </a:extLst>
+          </p:cNvPr>
+          <p:cNvPicPr>
+            <a:picLocks noChangeAspect="1"/>
+          </p:cNvPicPr>
+          <p:nvPr/>
+        </p:nvPicPr>
+        <p:blipFill>
+          <a:blip r:embed="rId3"/>
+          <a:stretch>
+            <a:fillRect/>
+          </a:stretch>
+        </p:blipFill>
+        <p:spPr>
+          <a:xfrm>
+            <a:off x="2545146" y="1063229"/>
+            <a:ext cx="5542384" cy="3233058"/>
+          </a:xfrm>
+          <a:prstGeom prst="rect">
+            <a:avLst/>
+          </a:prstGeom>
+        </p:spPr>
+      </p:pic>
+    </p:spTree>
+    <p:extLst>
+      <p:ext uri="{BB962C8B-B14F-4D97-AF65-F5344CB8AC3E}">
+        <p14:creationId xmlns:p14="http://schemas.microsoft.com/office/powerpoint/2010/main" val="1063808779"/>
       </p:ext>
     </p:extLst>
   </p:cSld>
@@ -8954,6 +9156,1225 @@
     <p:extLst>
       <p:ext uri="{BB962C8B-B14F-4D97-AF65-F5344CB8AC3E}">
         <p14:creationId xmlns:p14="http://schemas.microsoft.com/office/powerpoint/2010/main" val="2474223718"/>
+      </p:ext>
+    </p:extLst>
+  </p:cSld>
+  <p:clrMapOvr>
+    <a:masterClrMapping/>
+  </p:clrMapOvr>
+</p:sld>
+</file>
+
+<file path=ppt/slides/slide30.xml><?xml version="1.0" encoding="utf-8"?>
+<p:sld xmlns:a="http://schemas.openxmlformats.org/drawingml/2006/main" xmlns:r="http://schemas.openxmlformats.org/officeDocument/2006/relationships" xmlns:p="http://schemas.openxmlformats.org/presentationml/2006/main">
+  <p:cSld>
+    <p:spTree>
+      <p:nvGrpSpPr>
+        <p:cNvPr id="1" name=""/>
+        <p:cNvGrpSpPr/>
+        <p:nvPr/>
+      </p:nvGrpSpPr>
+      <p:grpSpPr>
+        <a:xfrm>
+          <a:off x="0" y="0"/>
+          <a:ext cx="0" cy="0"/>
+          <a:chOff x="0" y="0"/>
+          <a:chExt cx="0" cy="0"/>
+        </a:xfrm>
+      </p:grpSpPr>
+      <p:sp>
+        <p:nvSpPr>
+          <p:cNvPr id="2" name="Title 1">
+            <a:extLst>
+              <a:ext uri="{FF2B5EF4-FFF2-40B4-BE49-F238E27FC236}">
+                <a16:creationId xmlns:a16="http://schemas.microsoft.com/office/drawing/2014/main" id="{75242ED9-550F-4CFB-9C3E-FC559B6FDFB2}"/>
+              </a:ext>
+            </a:extLst>
+          </p:cNvPr>
+          <p:cNvSpPr>
+            <a:spLocks noGrp="1"/>
+          </p:cNvSpPr>
+          <p:nvPr>
+            <p:ph type="title"/>
+          </p:nvPr>
+        </p:nvSpPr>
+        <p:spPr/>
+        <p:txBody>
+          <a:bodyPr>
+            <a:normAutofit fontScale="90000"/>
+          </a:bodyPr>
+          <a:lstStyle/>
+          <a:p>
+            <a:r>
+              <a:rPr lang="en-US" sz="2200" dirty="0">
+                <a:solidFill>
+                  <a:srgbClr val="002060"/>
+                </a:solidFill>
+              </a:rPr>
+              <a:t>Extract Function</a:t>
+            </a:r>
+            <a:br>
+              <a:rPr lang="en-US" dirty="0"/>
+            </a:br>
+            <a:r>
+              <a:rPr lang="en-US" dirty="0"/>
+              <a:t>Step 3: Insert Call</a:t>
+            </a:r>
+          </a:p>
+        </p:txBody>
+      </p:sp>
+      <p:pic>
+        <p:nvPicPr>
+          <p:cNvPr id="4" name="Picture 3">
+            <a:extLst>
+              <a:ext uri="{FF2B5EF4-FFF2-40B4-BE49-F238E27FC236}">
+                <a16:creationId xmlns:a16="http://schemas.microsoft.com/office/drawing/2014/main" id="{136F974A-4FF8-456D-A42B-17FF07E27728}"/>
+              </a:ext>
+            </a:extLst>
+          </p:cNvPr>
+          <p:cNvPicPr>
+            <a:picLocks noChangeAspect="1"/>
+          </p:cNvPicPr>
+          <p:nvPr/>
+        </p:nvPicPr>
+        <p:blipFill>
+          <a:blip r:embed="rId2"/>
+          <a:stretch>
+            <a:fillRect/>
+          </a:stretch>
+        </p:blipFill>
+        <p:spPr>
+          <a:xfrm>
+            <a:off x="2679088" y="1063229"/>
+            <a:ext cx="5274499" cy="3804557"/>
+          </a:xfrm>
+          <a:prstGeom prst="rect">
+            <a:avLst/>
+          </a:prstGeom>
+        </p:spPr>
+      </p:pic>
+    </p:spTree>
+    <p:extLst>
+      <p:ext uri="{BB962C8B-B14F-4D97-AF65-F5344CB8AC3E}">
+        <p14:creationId xmlns:p14="http://schemas.microsoft.com/office/powerpoint/2010/main" val="4285645850"/>
+      </p:ext>
+    </p:extLst>
+  </p:cSld>
+  <p:clrMapOvr>
+    <a:masterClrMapping/>
+  </p:clrMapOvr>
+</p:sld>
+</file>
+
+<file path=ppt/slides/slide31.xml><?xml version="1.0" encoding="utf-8"?>
+<p:sld xmlns:a="http://schemas.openxmlformats.org/drawingml/2006/main" xmlns:r="http://schemas.openxmlformats.org/officeDocument/2006/relationships" xmlns:p="http://schemas.openxmlformats.org/presentationml/2006/main">
+  <p:cSld>
+    <p:spTree>
+      <p:nvGrpSpPr>
+        <p:cNvPr id="1" name=""/>
+        <p:cNvGrpSpPr/>
+        <p:nvPr/>
+      </p:nvGrpSpPr>
+      <p:grpSpPr>
+        <a:xfrm>
+          <a:off x="0" y="0"/>
+          <a:ext cx="0" cy="0"/>
+          <a:chOff x="0" y="0"/>
+          <a:chExt cx="0" cy="0"/>
+        </a:xfrm>
+      </p:grpSpPr>
+      <p:sp>
+        <p:nvSpPr>
+          <p:cNvPr id="2" name="Title 1">
+            <a:extLst>
+              <a:ext uri="{FF2B5EF4-FFF2-40B4-BE49-F238E27FC236}">
+                <a16:creationId xmlns:a16="http://schemas.microsoft.com/office/drawing/2014/main" id="{75242ED9-550F-4CFB-9C3E-FC559B6FDFB2}"/>
+              </a:ext>
+            </a:extLst>
+          </p:cNvPr>
+          <p:cNvSpPr>
+            <a:spLocks noGrp="1"/>
+          </p:cNvSpPr>
+          <p:nvPr>
+            <p:ph type="title"/>
+          </p:nvPr>
+        </p:nvSpPr>
+        <p:spPr/>
+        <p:txBody>
+          <a:bodyPr>
+            <a:normAutofit fontScale="90000"/>
+          </a:bodyPr>
+          <a:lstStyle/>
+          <a:p>
+            <a:r>
+              <a:rPr lang="en-US" sz="2200" dirty="0">
+                <a:solidFill>
+                  <a:srgbClr val="002060"/>
+                </a:solidFill>
+              </a:rPr>
+              <a:t>Extract Function</a:t>
+            </a:r>
+            <a:br>
+              <a:rPr lang="en-US" dirty="0"/>
+            </a:br>
+            <a:r>
+              <a:rPr lang="en-US" dirty="0"/>
+              <a:t>Step 4: Delete Extracted Expression</a:t>
+            </a:r>
+          </a:p>
+        </p:txBody>
+      </p:sp>
+      <p:pic>
+        <p:nvPicPr>
+          <p:cNvPr id="4" name="Picture 3">
+            <a:extLst>
+              <a:ext uri="{FF2B5EF4-FFF2-40B4-BE49-F238E27FC236}">
+                <a16:creationId xmlns:a16="http://schemas.microsoft.com/office/drawing/2014/main" id="{359D9299-8F0F-48E0-816E-22234D7352D5}"/>
+              </a:ext>
+            </a:extLst>
+          </p:cNvPr>
+          <p:cNvPicPr>
+            <a:picLocks noChangeAspect="1"/>
+          </p:cNvPicPr>
+          <p:nvPr/>
+        </p:nvPicPr>
+        <p:blipFill>
+          <a:blip r:embed="rId2"/>
+          <a:stretch>
+            <a:fillRect/>
+          </a:stretch>
+        </p:blipFill>
+        <p:spPr>
+          <a:xfrm>
+            <a:off x="2854528" y="1063229"/>
+            <a:ext cx="4923620" cy="3551464"/>
+          </a:xfrm>
+          <a:prstGeom prst="rect">
+            <a:avLst/>
+          </a:prstGeom>
+        </p:spPr>
+      </p:pic>
+    </p:spTree>
+    <p:extLst>
+      <p:ext uri="{BB962C8B-B14F-4D97-AF65-F5344CB8AC3E}">
+        <p14:creationId xmlns:p14="http://schemas.microsoft.com/office/powerpoint/2010/main" val="824120405"/>
+      </p:ext>
+    </p:extLst>
+  </p:cSld>
+  <p:clrMapOvr>
+    <a:masterClrMapping/>
+  </p:clrMapOvr>
+</p:sld>
+</file>
+
+<file path=ppt/slides/slide32.xml><?xml version="1.0" encoding="utf-8"?>
+<p:sld xmlns:a="http://schemas.openxmlformats.org/drawingml/2006/main" xmlns:r="http://schemas.openxmlformats.org/officeDocument/2006/relationships" xmlns:p="http://schemas.openxmlformats.org/presentationml/2006/main">
+  <p:cSld>
+    <p:spTree>
+      <p:nvGrpSpPr>
+        <p:cNvPr id="1" name=""/>
+        <p:cNvGrpSpPr/>
+        <p:nvPr/>
+      </p:nvGrpSpPr>
+      <p:grpSpPr>
+        <a:xfrm>
+          <a:off x="0" y="0"/>
+          <a:ext cx="0" cy="0"/>
+          <a:chOff x="0" y="0"/>
+          <a:chExt cx="0" cy="0"/>
+        </a:xfrm>
+      </p:grpSpPr>
+      <p:sp>
+        <p:nvSpPr>
+          <p:cNvPr id="2" name="Title 1">
+            <a:extLst>
+              <a:ext uri="{FF2B5EF4-FFF2-40B4-BE49-F238E27FC236}">
+                <a16:creationId xmlns:a16="http://schemas.microsoft.com/office/drawing/2014/main" id="{52E36FE6-81C8-4B2B-9E8D-2FD5E6C3AFDE}"/>
+              </a:ext>
+            </a:extLst>
+          </p:cNvPr>
+          <p:cNvSpPr>
+            <a:spLocks noGrp="1"/>
+          </p:cNvSpPr>
+          <p:nvPr>
+            <p:ph type="title"/>
+          </p:nvPr>
+        </p:nvSpPr>
+        <p:spPr/>
+        <p:txBody>
+          <a:bodyPr>
+            <a:normAutofit fontScale="90000"/>
+          </a:bodyPr>
+          <a:lstStyle/>
+          <a:p>
+            <a:r>
+              <a:rPr lang="en-US" sz="2200" dirty="0">
+                <a:solidFill>
+                  <a:srgbClr val="002060"/>
+                </a:solidFill>
+              </a:rPr>
+              <a:t>Extract Function</a:t>
+            </a:r>
+            <a:br>
+              <a:rPr lang="en-US" dirty="0"/>
+            </a:br>
+            <a:r>
+              <a:rPr lang="en-US" dirty="0"/>
+              <a:t>Problem: Partial List Selection</a:t>
+            </a:r>
+          </a:p>
+        </p:txBody>
+      </p:sp>
+      <p:pic>
+        <p:nvPicPr>
+          <p:cNvPr id="4" name="Picture 3">
+            <a:extLst>
+              <a:ext uri="{FF2B5EF4-FFF2-40B4-BE49-F238E27FC236}">
+                <a16:creationId xmlns:a16="http://schemas.microsoft.com/office/drawing/2014/main" id="{30A8C202-429C-4421-9BBC-0014194E3D77}"/>
+              </a:ext>
+            </a:extLst>
+          </p:cNvPr>
+          <p:cNvPicPr>
+            <a:picLocks noChangeAspect="1"/>
+          </p:cNvPicPr>
+          <p:nvPr/>
+        </p:nvPicPr>
+        <p:blipFill>
+          <a:blip r:embed="rId2"/>
+          <a:stretch>
+            <a:fillRect/>
+          </a:stretch>
+        </p:blipFill>
+        <p:spPr>
+          <a:xfrm>
+            <a:off x="2887656" y="1578361"/>
+            <a:ext cx="4857364" cy="2299675"/>
+          </a:xfrm>
+          <a:prstGeom prst="rect">
+            <a:avLst/>
+          </a:prstGeom>
+        </p:spPr>
+      </p:pic>
+    </p:spTree>
+    <p:extLst>
+      <p:ext uri="{BB962C8B-B14F-4D97-AF65-F5344CB8AC3E}">
+        <p14:creationId xmlns:p14="http://schemas.microsoft.com/office/powerpoint/2010/main" val="826746755"/>
+      </p:ext>
+    </p:extLst>
+  </p:cSld>
+  <p:clrMapOvr>
+    <a:masterClrMapping/>
+  </p:clrMapOvr>
+</p:sld>
+</file>
+
+<file path=ppt/slides/slide33.xml><?xml version="1.0" encoding="utf-8"?>
+<p:sld xmlns:a="http://schemas.openxmlformats.org/drawingml/2006/main" xmlns:r="http://schemas.openxmlformats.org/officeDocument/2006/relationships" xmlns:p="http://schemas.openxmlformats.org/presentationml/2006/main">
+  <p:cSld>
+    <p:spTree>
+      <p:nvGrpSpPr>
+        <p:cNvPr id="1" name=""/>
+        <p:cNvGrpSpPr/>
+        <p:nvPr/>
+      </p:nvGrpSpPr>
+      <p:grpSpPr>
+        <a:xfrm>
+          <a:off x="0" y="0"/>
+          <a:ext cx="0" cy="0"/>
+          <a:chOff x="0" y="0"/>
+          <a:chExt cx="0" cy="0"/>
+        </a:xfrm>
+      </p:grpSpPr>
+      <p:sp>
+        <p:nvSpPr>
+          <p:cNvPr id="2" name="Title 1">
+            <a:extLst>
+              <a:ext uri="{FF2B5EF4-FFF2-40B4-BE49-F238E27FC236}">
+                <a16:creationId xmlns:a16="http://schemas.microsoft.com/office/drawing/2014/main" id="{52E36FE6-81C8-4B2B-9E8D-2FD5E6C3AFDE}"/>
+              </a:ext>
+            </a:extLst>
+          </p:cNvPr>
+          <p:cNvSpPr>
+            <a:spLocks noGrp="1"/>
+          </p:cNvSpPr>
+          <p:nvPr>
+            <p:ph type="title"/>
+          </p:nvPr>
+        </p:nvSpPr>
+        <p:spPr/>
+        <p:txBody>
+          <a:bodyPr>
+            <a:normAutofit fontScale="90000"/>
+          </a:bodyPr>
+          <a:lstStyle/>
+          <a:p>
+            <a:r>
+              <a:rPr lang="en-US" sz="2200" dirty="0">
+                <a:solidFill>
+                  <a:srgbClr val="002060"/>
+                </a:solidFill>
+              </a:rPr>
+              <a:t>Extract Function</a:t>
+            </a:r>
+            <a:br>
+              <a:rPr lang="en-US" dirty="0"/>
+            </a:br>
+            <a:r>
+              <a:rPr lang="en-US" dirty="0"/>
+              <a:t>Problem: Multiple Writes</a:t>
+            </a:r>
+          </a:p>
+        </p:txBody>
+      </p:sp>
+      <p:pic>
+        <p:nvPicPr>
+          <p:cNvPr id="3" name="Picture 2">
+            <a:extLst>
+              <a:ext uri="{FF2B5EF4-FFF2-40B4-BE49-F238E27FC236}">
+                <a16:creationId xmlns:a16="http://schemas.microsoft.com/office/drawing/2014/main" id="{37BA64F1-93A8-491A-845E-F9FFEFE3A215}"/>
+              </a:ext>
+            </a:extLst>
+          </p:cNvPr>
+          <p:cNvPicPr>
+            <a:picLocks noChangeAspect="1"/>
+          </p:cNvPicPr>
+          <p:nvPr/>
+        </p:nvPicPr>
+        <p:blipFill>
+          <a:blip r:embed="rId2"/>
+          <a:stretch>
+            <a:fillRect/>
+          </a:stretch>
+        </p:blipFill>
+        <p:spPr>
+          <a:xfrm>
+            <a:off x="3996640" y="1458081"/>
+            <a:ext cx="2183724" cy="2646500"/>
+          </a:xfrm>
+          <a:prstGeom prst="rect">
+            <a:avLst/>
+          </a:prstGeom>
+        </p:spPr>
+      </p:pic>
+    </p:spTree>
+    <p:extLst>
+      <p:ext uri="{BB962C8B-B14F-4D97-AF65-F5344CB8AC3E}">
+        <p14:creationId xmlns:p14="http://schemas.microsoft.com/office/powerpoint/2010/main" val="28758341"/>
+      </p:ext>
+    </p:extLst>
+  </p:cSld>
+  <p:clrMapOvr>
+    <a:masterClrMapping/>
+  </p:clrMapOvr>
+</p:sld>
+</file>
+
+<file path=ppt/slides/slide34.xml><?xml version="1.0" encoding="utf-8"?>
+<p:sld xmlns:a="http://schemas.openxmlformats.org/drawingml/2006/main" xmlns:r="http://schemas.openxmlformats.org/officeDocument/2006/relationships" xmlns:p="http://schemas.openxmlformats.org/presentationml/2006/main">
+  <p:cSld>
+    <p:spTree>
+      <p:nvGrpSpPr>
+        <p:cNvPr id="1" name=""/>
+        <p:cNvGrpSpPr/>
+        <p:nvPr/>
+      </p:nvGrpSpPr>
+      <p:grpSpPr>
+        <a:xfrm>
+          <a:off x="0" y="0"/>
+          <a:ext cx="0" cy="0"/>
+          <a:chOff x="0" y="0"/>
+          <a:chExt cx="0" cy="0"/>
+        </a:xfrm>
+      </p:grpSpPr>
+      <p:sp>
+        <p:nvSpPr>
+          <p:cNvPr id="2" name="Title 1">
+            <a:extLst>
+              <a:ext uri="{FF2B5EF4-FFF2-40B4-BE49-F238E27FC236}">
+                <a16:creationId xmlns:a16="http://schemas.microsoft.com/office/drawing/2014/main" id="{52E36FE6-81C8-4B2B-9E8D-2FD5E6C3AFDE}"/>
+              </a:ext>
+            </a:extLst>
+          </p:cNvPr>
+          <p:cNvSpPr>
+            <a:spLocks noGrp="1"/>
+          </p:cNvSpPr>
+          <p:nvPr>
+            <p:ph type="title"/>
+          </p:nvPr>
+        </p:nvSpPr>
+        <p:spPr/>
+        <p:txBody>
+          <a:bodyPr>
+            <a:normAutofit fontScale="90000"/>
+          </a:bodyPr>
+          <a:lstStyle/>
+          <a:p>
+            <a:r>
+              <a:rPr lang="en-US" sz="2200" dirty="0">
+                <a:solidFill>
+                  <a:srgbClr val="002060"/>
+                </a:solidFill>
+              </a:rPr>
+              <a:t>Extract Function</a:t>
+            </a:r>
+            <a:br>
+              <a:rPr lang="en-US" dirty="0"/>
+            </a:br>
+            <a:r>
+              <a:rPr lang="en-US" dirty="0"/>
+              <a:t>Problem: Internal Variables</a:t>
+            </a:r>
+          </a:p>
+        </p:txBody>
+      </p:sp>
+      <p:pic>
+        <p:nvPicPr>
+          <p:cNvPr id="4" name="Picture 3">
+            <a:extLst>
+              <a:ext uri="{FF2B5EF4-FFF2-40B4-BE49-F238E27FC236}">
+                <a16:creationId xmlns:a16="http://schemas.microsoft.com/office/drawing/2014/main" id="{3E0AF6DA-A099-4030-9DA4-5AF33F795EF5}"/>
+              </a:ext>
+            </a:extLst>
+          </p:cNvPr>
+          <p:cNvPicPr>
+            <a:picLocks noChangeAspect="1"/>
+          </p:cNvPicPr>
+          <p:nvPr/>
+        </p:nvPicPr>
+        <p:blipFill>
+          <a:blip r:embed="rId2"/>
+          <a:stretch>
+            <a:fillRect/>
+          </a:stretch>
+        </p:blipFill>
+        <p:spPr>
+          <a:xfrm>
+            <a:off x="3915303" y="1596425"/>
+            <a:ext cx="2802070" cy="2133395"/>
+          </a:xfrm>
+          <a:prstGeom prst="rect">
+            <a:avLst/>
+          </a:prstGeom>
+        </p:spPr>
+      </p:pic>
+    </p:spTree>
+    <p:extLst>
+      <p:ext uri="{BB962C8B-B14F-4D97-AF65-F5344CB8AC3E}">
+        <p14:creationId xmlns:p14="http://schemas.microsoft.com/office/powerpoint/2010/main" val="2963644601"/>
+      </p:ext>
+    </p:extLst>
+  </p:cSld>
+  <p:clrMapOvr>
+    <a:masterClrMapping/>
+  </p:clrMapOvr>
+</p:sld>
+</file>
+
+<file path=ppt/slides/slide35.xml><?xml version="1.0" encoding="utf-8"?>
+<p:sld xmlns:a="http://schemas.openxmlformats.org/drawingml/2006/main" xmlns:r="http://schemas.openxmlformats.org/officeDocument/2006/relationships" xmlns:p="http://schemas.openxmlformats.org/presentationml/2006/main">
+  <p:cSld>
+    <p:spTree>
+      <p:nvGrpSpPr>
+        <p:cNvPr id="1" name=""/>
+        <p:cNvGrpSpPr/>
+        <p:nvPr/>
+      </p:nvGrpSpPr>
+      <p:grpSpPr>
+        <a:xfrm>
+          <a:off x="0" y="0"/>
+          <a:ext cx="0" cy="0"/>
+          <a:chOff x="0" y="0"/>
+          <a:chExt cx="0" cy="0"/>
+        </a:xfrm>
+      </p:grpSpPr>
+      <p:sp>
+        <p:nvSpPr>
+          <p:cNvPr id="2" name="Title 1">
+            <a:extLst>
+              <a:ext uri="{FF2B5EF4-FFF2-40B4-BE49-F238E27FC236}">
+                <a16:creationId xmlns:a16="http://schemas.microsoft.com/office/drawing/2014/main" id="{A6DA6033-48F0-470A-9805-9C029D3A858F}"/>
+              </a:ext>
+            </a:extLst>
+          </p:cNvPr>
+          <p:cNvSpPr>
+            <a:spLocks noGrp="1"/>
+          </p:cNvSpPr>
+          <p:nvPr>
+            <p:ph type="title"/>
+          </p:nvPr>
+        </p:nvSpPr>
+        <p:spPr/>
+        <p:txBody>
+          <a:bodyPr>
+            <a:normAutofit fontScale="90000"/>
+          </a:bodyPr>
+          <a:lstStyle/>
+          <a:p>
+            <a:r>
+              <a:rPr lang="en-US" sz="2200" dirty="0">
+                <a:solidFill>
+                  <a:srgbClr val="002060"/>
+                </a:solidFill>
+              </a:rPr>
+              <a:t>Extract Function</a:t>
+            </a:r>
+            <a:br>
+              <a:rPr lang="en-US" dirty="0"/>
+            </a:br>
+            <a:r>
+              <a:rPr lang="en-US" dirty="0"/>
+              <a:t>DEMO</a:t>
+            </a:r>
+          </a:p>
+        </p:txBody>
+      </p:sp>
+      <p:pic>
+        <p:nvPicPr>
+          <p:cNvPr id="4" name="Picture 3">
+            <a:extLst>
+              <a:ext uri="{FF2B5EF4-FFF2-40B4-BE49-F238E27FC236}">
+                <a16:creationId xmlns:a16="http://schemas.microsoft.com/office/drawing/2014/main" id="{30986727-EC2B-42DE-BBF4-55F9C9314867}"/>
+              </a:ext>
+            </a:extLst>
+          </p:cNvPr>
+          <p:cNvPicPr>
+            <a:picLocks noChangeAspect="1"/>
+          </p:cNvPicPr>
+          <p:nvPr/>
+        </p:nvPicPr>
+        <p:blipFill>
+          <a:blip r:embed="rId2"/>
+          <a:stretch>
+            <a:fillRect/>
+          </a:stretch>
+        </p:blipFill>
+        <p:spPr>
+          <a:xfrm>
+            <a:off x="1763106" y="1872320"/>
+            <a:ext cx="2088299" cy="1398860"/>
+          </a:xfrm>
+          <a:prstGeom prst="rect">
+            <a:avLst/>
+          </a:prstGeom>
+        </p:spPr>
+      </p:pic>
+      <p:sp>
+        <p:nvSpPr>
+          <p:cNvPr id="5" name="Arrow: Right 4">
+            <a:extLst>
+              <a:ext uri="{FF2B5EF4-FFF2-40B4-BE49-F238E27FC236}">
+                <a16:creationId xmlns:a16="http://schemas.microsoft.com/office/drawing/2014/main" id="{DFCAE3CD-9945-41AE-83C1-786FE88FD7FE}"/>
+              </a:ext>
+            </a:extLst>
+          </p:cNvPr>
+          <p:cNvSpPr/>
+          <p:nvPr/>
+        </p:nvSpPr>
+        <p:spPr>
+          <a:xfrm>
+            <a:off x="4133920" y="2277835"/>
+            <a:ext cx="612322" cy="587829"/>
+          </a:xfrm>
+          <a:prstGeom prst="rightArrow">
+            <a:avLst/>
+          </a:prstGeom>
+        </p:spPr>
+        <p:style>
+          <a:lnRef idx="1">
+            <a:schemeClr val="accent4"/>
+          </a:lnRef>
+          <a:fillRef idx="3">
+            <a:schemeClr val="accent4"/>
+          </a:fillRef>
+          <a:effectRef idx="2">
+            <a:schemeClr val="accent4"/>
+          </a:effectRef>
+          <a:fontRef idx="minor">
+            <a:schemeClr val="lt1"/>
+          </a:fontRef>
+        </p:style>
+        <p:txBody>
+          <a:bodyPr rtlCol="0" anchor="ctr"/>
+          <a:lstStyle/>
+          <a:p>
+            <a:pPr algn="ctr"/>
+            <a:endParaRPr lang="en-US"/>
+          </a:p>
+        </p:txBody>
+      </p:sp>
+      <p:pic>
+        <p:nvPicPr>
+          <p:cNvPr id="6" name="Picture 5">
+            <a:extLst>
+              <a:ext uri="{FF2B5EF4-FFF2-40B4-BE49-F238E27FC236}">
+                <a16:creationId xmlns:a16="http://schemas.microsoft.com/office/drawing/2014/main" id="{7DF24EFD-C678-4BD6-8EAC-B4357551010B}"/>
+              </a:ext>
+            </a:extLst>
+          </p:cNvPr>
+          <p:cNvPicPr>
+            <a:picLocks noChangeAspect="1"/>
+          </p:cNvPicPr>
+          <p:nvPr/>
+        </p:nvPicPr>
+        <p:blipFill>
+          <a:blip r:embed="rId3"/>
+          <a:stretch>
+            <a:fillRect/>
+          </a:stretch>
+        </p:blipFill>
+        <p:spPr>
+          <a:xfrm>
+            <a:off x="5028757" y="1603925"/>
+            <a:ext cx="3840813" cy="1935648"/>
+          </a:xfrm>
+          <a:prstGeom prst="rect">
+            <a:avLst/>
+          </a:prstGeom>
+        </p:spPr>
+      </p:pic>
+    </p:spTree>
+    <p:extLst>
+      <p:ext uri="{BB962C8B-B14F-4D97-AF65-F5344CB8AC3E}">
+        <p14:creationId xmlns:p14="http://schemas.microsoft.com/office/powerpoint/2010/main" val="251694704"/>
+      </p:ext>
+    </p:extLst>
+  </p:cSld>
+  <p:clrMapOvr>
+    <a:masterClrMapping/>
+  </p:clrMapOvr>
+</p:sld>
+</file>
+
+<file path=ppt/slides/slide36.xml><?xml version="1.0" encoding="utf-8"?>
+<p:sld xmlns:a="http://schemas.openxmlformats.org/drawingml/2006/main" xmlns:r="http://schemas.openxmlformats.org/officeDocument/2006/relationships" xmlns:p="http://schemas.openxmlformats.org/presentationml/2006/main">
+  <p:cSld>
+    <p:spTree>
+      <p:nvGrpSpPr>
+        <p:cNvPr id="1" name=""/>
+        <p:cNvGrpSpPr/>
+        <p:nvPr/>
+      </p:nvGrpSpPr>
+      <p:grpSpPr>
+        <a:xfrm>
+          <a:off x="0" y="0"/>
+          <a:ext cx="0" cy="0"/>
+          <a:chOff x="0" y="0"/>
+          <a:chExt cx="0" cy="0"/>
+        </a:xfrm>
+      </p:grpSpPr>
+      <p:sp>
+        <p:nvSpPr>
+          <p:cNvPr id="2" name="Title 1">
+            <a:extLst>
+              <a:ext uri="{FF2B5EF4-FFF2-40B4-BE49-F238E27FC236}">
+                <a16:creationId xmlns:a16="http://schemas.microsoft.com/office/drawing/2014/main" id="{B788C8A2-56C0-459C-A36F-C8A2DF4A1A25}"/>
+              </a:ext>
+            </a:extLst>
+          </p:cNvPr>
+          <p:cNvSpPr>
+            <a:spLocks noGrp="1"/>
+          </p:cNvSpPr>
+          <p:nvPr>
+            <p:ph type="title"/>
+          </p:nvPr>
+        </p:nvSpPr>
+        <p:spPr/>
+        <p:txBody>
+          <a:bodyPr/>
+          <a:lstStyle/>
+          <a:p>
+            <a:r>
+              <a:rPr lang="en-US" dirty="0"/>
+              <a:t>Testing in SPT</a:t>
+            </a:r>
+          </a:p>
+        </p:txBody>
+      </p:sp>
+      <p:pic>
+        <p:nvPicPr>
+          <p:cNvPr id="4" name="Picture 3">
+            <a:extLst>
+              <a:ext uri="{FF2B5EF4-FFF2-40B4-BE49-F238E27FC236}">
+                <a16:creationId xmlns:a16="http://schemas.microsoft.com/office/drawing/2014/main" id="{8176A819-F27D-4641-B457-77F3B69AC9D6}"/>
+              </a:ext>
+            </a:extLst>
+          </p:cNvPr>
+          <p:cNvPicPr>
+            <a:picLocks noChangeAspect="1"/>
+          </p:cNvPicPr>
+          <p:nvPr/>
+        </p:nvPicPr>
+        <p:blipFill>
+          <a:blip r:embed="rId2"/>
+          <a:stretch>
+            <a:fillRect/>
+          </a:stretch>
+        </p:blipFill>
+        <p:spPr>
+          <a:xfrm>
+            <a:off x="3385153" y="1147636"/>
+            <a:ext cx="3862369" cy="2848227"/>
+          </a:xfrm>
+          <a:prstGeom prst="rect">
+            <a:avLst/>
+          </a:prstGeom>
+        </p:spPr>
+      </p:pic>
+    </p:spTree>
+    <p:extLst>
+      <p:ext uri="{BB962C8B-B14F-4D97-AF65-F5344CB8AC3E}">
+        <p14:creationId xmlns:p14="http://schemas.microsoft.com/office/powerpoint/2010/main" val="3100379222"/>
+      </p:ext>
+    </p:extLst>
+  </p:cSld>
+  <p:clrMapOvr>
+    <a:masterClrMapping/>
+  </p:clrMapOvr>
+</p:sld>
+</file>
+
+<file path=ppt/slides/slide37.xml><?xml version="1.0" encoding="utf-8"?>
+<p:sld xmlns:a="http://schemas.openxmlformats.org/drawingml/2006/main" xmlns:r="http://schemas.openxmlformats.org/officeDocument/2006/relationships" xmlns:p="http://schemas.openxmlformats.org/presentationml/2006/main">
+  <p:cSld>
+    <p:spTree>
+      <p:nvGrpSpPr>
+        <p:cNvPr id="1" name=""/>
+        <p:cNvGrpSpPr/>
+        <p:nvPr/>
+      </p:nvGrpSpPr>
+      <p:grpSpPr>
+        <a:xfrm>
+          <a:off x="0" y="0"/>
+          <a:ext cx="0" cy="0"/>
+          <a:chOff x="0" y="0"/>
+          <a:chExt cx="0" cy="0"/>
+        </a:xfrm>
+      </p:grpSpPr>
+      <p:sp>
+        <p:nvSpPr>
+          <p:cNvPr id="2" name="Title 1">
+            <a:extLst>
+              <a:ext uri="{FF2B5EF4-FFF2-40B4-BE49-F238E27FC236}">
+                <a16:creationId xmlns:a16="http://schemas.microsoft.com/office/drawing/2014/main" id="{73BEF835-E17A-4F81-B8FA-1CC78DE15E8E}"/>
+              </a:ext>
+            </a:extLst>
+          </p:cNvPr>
+          <p:cNvSpPr>
+            <a:spLocks noGrp="1"/>
+          </p:cNvSpPr>
+          <p:nvPr>
+            <p:ph type="title"/>
+          </p:nvPr>
+        </p:nvSpPr>
+        <p:spPr/>
+        <p:txBody>
+          <a:bodyPr/>
+          <a:lstStyle/>
+          <a:p>
+            <a:r>
+              <a:rPr lang="en-US" dirty="0"/>
+              <a:t>Testing in SPT</a:t>
+            </a:r>
+          </a:p>
+        </p:txBody>
+      </p:sp>
+      <p:pic>
+        <p:nvPicPr>
+          <p:cNvPr id="4" name="Picture 3">
+            <a:extLst>
+              <a:ext uri="{FF2B5EF4-FFF2-40B4-BE49-F238E27FC236}">
+                <a16:creationId xmlns:a16="http://schemas.microsoft.com/office/drawing/2014/main" id="{88752EE0-AEBF-4681-89E4-A2489072DE0D}"/>
+              </a:ext>
+            </a:extLst>
+          </p:cNvPr>
+          <p:cNvPicPr>
+            <a:picLocks noChangeAspect="1"/>
+          </p:cNvPicPr>
+          <p:nvPr/>
+        </p:nvPicPr>
+        <p:blipFill>
+          <a:blip r:embed="rId2"/>
+          <a:stretch>
+            <a:fillRect/>
+          </a:stretch>
+        </p:blipFill>
+        <p:spPr>
+          <a:xfrm>
+            <a:off x="2092798" y="1984959"/>
+            <a:ext cx="6447079" cy="1173582"/>
+          </a:xfrm>
+          <a:prstGeom prst="rect">
+            <a:avLst/>
+          </a:prstGeom>
+        </p:spPr>
+      </p:pic>
+    </p:spTree>
+    <p:extLst>
+      <p:ext uri="{BB962C8B-B14F-4D97-AF65-F5344CB8AC3E}">
+        <p14:creationId xmlns:p14="http://schemas.microsoft.com/office/powerpoint/2010/main" val="4225078288"/>
+      </p:ext>
+    </p:extLst>
+  </p:cSld>
+  <p:clrMapOvr>
+    <a:masterClrMapping/>
+  </p:clrMapOvr>
+</p:sld>
+</file>
+
+<file path=ppt/slides/slide38.xml><?xml version="1.0" encoding="utf-8"?>
+<p:sld xmlns:a="http://schemas.openxmlformats.org/drawingml/2006/main" xmlns:r="http://schemas.openxmlformats.org/officeDocument/2006/relationships" xmlns:p="http://schemas.openxmlformats.org/presentationml/2006/main">
+  <p:cSld>
+    <p:spTree>
+      <p:nvGrpSpPr>
+        <p:cNvPr id="1" name=""/>
+        <p:cNvGrpSpPr/>
+        <p:nvPr/>
+      </p:nvGrpSpPr>
+      <p:grpSpPr>
+        <a:xfrm>
+          <a:off x="0" y="0"/>
+          <a:ext cx="0" cy="0"/>
+          <a:chOff x="0" y="0"/>
+          <a:chExt cx="0" cy="0"/>
+        </a:xfrm>
+      </p:grpSpPr>
+      <p:sp>
+        <p:nvSpPr>
+          <p:cNvPr id="2" name="Title 1">
+            <a:extLst>
+              <a:ext uri="{FF2B5EF4-FFF2-40B4-BE49-F238E27FC236}">
+                <a16:creationId xmlns:a16="http://schemas.microsoft.com/office/drawing/2014/main" id="{795A6E4F-00C5-4C1D-BA8D-FEB9CF1BB993}"/>
+              </a:ext>
+            </a:extLst>
+          </p:cNvPr>
+          <p:cNvSpPr>
+            <a:spLocks noGrp="1"/>
+          </p:cNvSpPr>
+          <p:nvPr>
+            <p:ph type="title"/>
+          </p:nvPr>
+        </p:nvSpPr>
+        <p:spPr/>
+        <p:txBody>
+          <a:bodyPr/>
+          <a:lstStyle/>
+          <a:p>
+            <a:r>
+              <a:rPr lang="en-US" dirty="0"/>
+              <a:t>Conclusion</a:t>
+            </a:r>
+          </a:p>
+        </p:txBody>
+      </p:sp>
+      <p:sp>
+        <p:nvSpPr>
+          <p:cNvPr id="5" name="Rectangle: Rounded Corners 4">
+            <a:extLst>
+              <a:ext uri="{FF2B5EF4-FFF2-40B4-BE49-F238E27FC236}">
+                <a16:creationId xmlns:a16="http://schemas.microsoft.com/office/drawing/2014/main" id="{74522C98-12A9-46CA-8BD9-A5CD6FB86AA9}"/>
+              </a:ext>
+            </a:extLst>
+          </p:cNvPr>
+          <p:cNvSpPr/>
+          <p:nvPr/>
+        </p:nvSpPr>
+        <p:spPr>
+          <a:xfrm>
+            <a:off x="1763104" y="2571749"/>
+            <a:ext cx="3078315" cy="980185"/>
+          </a:xfrm>
+          <a:prstGeom prst="roundRect">
+            <a:avLst/>
+          </a:prstGeom>
+          <a:solidFill>
+            <a:srgbClr val="00B050"/>
+          </a:solidFill>
+          <a:effectLst/>
+        </p:spPr>
+        <p:style>
+          <a:lnRef idx="1">
+            <a:schemeClr val="accent1"/>
+          </a:lnRef>
+          <a:fillRef idx="3">
+            <a:schemeClr val="accent1"/>
+          </a:fillRef>
+          <a:effectRef idx="2">
+            <a:schemeClr val="accent1"/>
+          </a:effectRef>
+          <a:fontRef idx="minor">
+            <a:schemeClr val="lt1"/>
+          </a:fontRef>
+        </p:style>
+        <p:txBody>
+          <a:bodyPr rtlCol="0" anchor="ctr"/>
+          <a:lstStyle/>
+          <a:p>
+            <a:pPr algn="ctr"/>
+            <a:r>
+              <a:rPr lang="en-US" sz="2400" dirty="0"/>
+              <a:t>Scope Graph</a:t>
+            </a:r>
+          </a:p>
+        </p:txBody>
+      </p:sp>
+      <p:sp>
+        <p:nvSpPr>
+          <p:cNvPr id="6" name="Rectangle: Rounded Corners 5">
+            <a:extLst>
+              <a:ext uri="{FF2B5EF4-FFF2-40B4-BE49-F238E27FC236}">
+                <a16:creationId xmlns:a16="http://schemas.microsoft.com/office/drawing/2014/main" id="{AE36B88C-19CA-4B3E-81B8-CB63057D4782}"/>
+              </a:ext>
+            </a:extLst>
+          </p:cNvPr>
+          <p:cNvSpPr/>
+          <p:nvPr/>
+        </p:nvSpPr>
+        <p:spPr>
+          <a:xfrm>
+            <a:off x="1763106" y="1195743"/>
+            <a:ext cx="3078315" cy="980185"/>
+          </a:xfrm>
+          <a:prstGeom prst="roundRect">
+            <a:avLst/>
+          </a:prstGeom>
+          <a:solidFill>
+            <a:srgbClr val="00B050"/>
+          </a:solidFill>
+        </p:spPr>
+        <p:style>
+          <a:lnRef idx="1">
+            <a:schemeClr val="accent1"/>
+          </a:lnRef>
+          <a:fillRef idx="3">
+            <a:schemeClr val="accent1"/>
+          </a:fillRef>
+          <a:effectRef idx="2">
+            <a:schemeClr val="accent1"/>
+          </a:effectRef>
+          <a:fontRef idx="minor">
+            <a:schemeClr val="lt1"/>
+          </a:fontRef>
+        </p:style>
+        <p:txBody>
+          <a:bodyPr rtlCol="0" anchor="ctr"/>
+          <a:lstStyle/>
+          <a:p>
+            <a:pPr algn="ctr"/>
+            <a:r>
+              <a:rPr lang="en-US" sz="2400" dirty="0" err="1"/>
+              <a:t>Stratego</a:t>
+            </a:r>
+            <a:r>
+              <a:rPr lang="en-US" sz="2400" dirty="0"/>
+              <a:t> Transformations</a:t>
+            </a:r>
+          </a:p>
+        </p:txBody>
+      </p:sp>
+      <p:sp>
+        <p:nvSpPr>
+          <p:cNvPr id="7" name="Rectangle: Rounded Corners 6">
+            <a:extLst>
+              <a:ext uri="{FF2B5EF4-FFF2-40B4-BE49-F238E27FC236}">
+                <a16:creationId xmlns:a16="http://schemas.microsoft.com/office/drawing/2014/main" id="{C6DE87A5-1A59-47A6-9042-E20849C2FA8D}"/>
+              </a:ext>
+            </a:extLst>
+          </p:cNvPr>
+          <p:cNvSpPr/>
+          <p:nvPr/>
+        </p:nvSpPr>
+        <p:spPr>
+          <a:xfrm>
+            <a:off x="5401656" y="1220236"/>
+            <a:ext cx="3078315" cy="980185"/>
+          </a:xfrm>
+          <a:prstGeom prst="roundRect">
+            <a:avLst/>
+          </a:prstGeom>
+          <a:solidFill>
+            <a:srgbClr val="FFC000"/>
+          </a:solidFill>
+        </p:spPr>
+        <p:style>
+          <a:lnRef idx="1">
+            <a:schemeClr val="accent4"/>
+          </a:lnRef>
+          <a:fillRef idx="3">
+            <a:schemeClr val="accent4"/>
+          </a:fillRef>
+          <a:effectRef idx="2">
+            <a:schemeClr val="accent4"/>
+          </a:effectRef>
+          <a:fontRef idx="minor">
+            <a:schemeClr val="lt1"/>
+          </a:fontRef>
+        </p:style>
+        <p:txBody>
+          <a:bodyPr rtlCol="0" anchor="ctr"/>
+          <a:lstStyle/>
+          <a:p>
+            <a:pPr algn="ctr"/>
+            <a:r>
+              <a:rPr lang="en-US" sz="2400" dirty="0"/>
+              <a:t>Nabl2 API</a:t>
+            </a:r>
+          </a:p>
+        </p:txBody>
+      </p:sp>
+      <p:sp>
+        <p:nvSpPr>
+          <p:cNvPr id="8" name="Rectangle: Rounded Corners 7">
+            <a:extLst>
+              <a:ext uri="{FF2B5EF4-FFF2-40B4-BE49-F238E27FC236}">
+                <a16:creationId xmlns:a16="http://schemas.microsoft.com/office/drawing/2014/main" id="{9702475F-C731-411E-A1AF-769623E3C8B7}"/>
+              </a:ext>
+            </a:extLst>
+          </p:cNvPr>
+          <p:cNvSpPr/>
+          <p:nvPr/>
+        </p:nvSpPr>
+        <p:spPr>
+          <a:xfrm>
+            <a:off x="5401655" y="2571750"/>
+            <a:ext cx="3078315" cy="980185"/>
+          </a:xfrm>
+          <a:prstGeom prst="roundRect">
+            <a:avLst/>
+          </a:prstGeom>
+          <a:solidFill>
+            <a:srgbClr val="FF0000"/>
+          </a:solidFill>
+        </p:spPr>
+        <p:style>
+          <a:lnRef idx="1">
+            <a:schemeClr val="accent4"/>
+          </a:lnRef>
+          <a:fillRef idx="3">
+            <a:schemeClr val="accent4"/>
+          </a:fillRef>
+          <a:effectRef idx="2">
+            <a:schemeClr val="accent4"/>
+          </a:effectRef>
+          <a:fontRef idx="minor">
+            <a:schemeClr val="lt1"/>
+          </a:fontRef>
+        </p:style>
+        <p:txBody>
+          <a:bodyPr rtlCol="0" anchor="ctr"/>
+          <a:lstStyle/>
+          <a:p>
+            <a:pPr algn="ctr"/>
+            <a:r>
+              <a:rPr lang="en-US" sz="2400" dirty="0"/>
+              <a:t>Eclipse UI Integration</a:t>
+            </a:r>
+          </a:p>
+        </p:txBody>
+      </p:sp>
+      <p:sp>
+        <p:nvSpPr>
+          <p:cNvPr id="9" name="Rectangle: Rounded Corners 8">
+            <a:extLst>
+              <a:ext uri="{FF2B5EF4-FFF2-40B4-BE49-F238E27FC236}">
+                <a16:creationId xmlns:a16="http://schemas.microsoft.com/office/drawing/2014/main" id="{82E51E27-B576-4E0F-9A80-D9938E13E4D5}"/>
+              </a:ext>
+            </a:extLst>
+          </p:cNvPr>
+          <p:cNvSpPr/>
+          <p:nvPr/>
+        </p:nvSpPr>
+        <p:spPr>
+          <a:xfrm>
+            <a:off x="5401654" y="3923264"/>
+            <a:ext cx="3078315" cy="980185"/>
+          </a:xfrm>
+          <a:prstGeom prst="roundRect">
+            <a:avLst/>
+          </a:prstGeom>
+          <a:solidFill>
+            <a:srgbClr val="FF0000"/>
+          </a:solidFill>
+        </p:spPr>
+        <p:style>
+          <a:lnRef idx="1">
+            <a:schemeClr val="accent4"/>
+          </a:lnRef>
+          <a:fillRef idx="3">
+            <a:schemeClr val="accent4"/>
+          </a:fillRef>
+          <a:effectRef idx="2">
+            <a:schemeClr val="accent4"/>
+          </a:effectRef>
+          <a:fontRef idx="minor">
+            <a:schemeClr val="lt1"/>
+          </a:fontRef>
+        </p:style>
+        <p:txBody>
+          <a:bodyPr rtlCol="0" anchor="ctr"/>
+          <a:lstStyle/>
+          <a:p>
+            <a:pPr algn="ctr"/>
+            <a:r>
+              <a:rPr lang="en-US" sz="2400" dirty="0"/>
+              <a:t>Transformations in SPT</a:t>
+            </a:r>
+          </a:p>
+        </p:txBody>
+      </p:sp>
+      <p:sp>
+        <p:nvSpPr>
+          <p:cNvPr id="10" name="Rectangle: Rounded Corners 9">
+            <a:extLst>
+              <a:ext uri="{FF2B5EF4-FFF2-40B4-BE49-F238E27FC236}">
+                <a16:creationId xmlns:a16="http://schemas.microsoft.com/office/drawing/2014/main" id="{C24F81BD-9DCD-4C9A-A518-2AD910B18716}"/>
+              </a:ext>
+            </a:extLst>
+          </p:cNvPr>
+          <p:cNvSpPr/>
+          <p:nvPr/>
+        </p:nvSpPr>
+        <p:spPr>
+          <a:xfrm>
+            <a:off x="1763103" y="3923263"/>
+            <a:ext cx="3078315" cy="980185"/>
+          </a:xfrm>
+          <a:prstGeom prst="roundRect">
+            <a:avLst/>
+          </a:prstGeom>
+          <a:solidFill>
+            <a:srgbClr val="FFC000"/>
+          </a:solidFill>
+        </p:spPr>
+        <p:style>
+          <a:lnRef idx="1">
+            <a:schemeClr val="accent4"/>
+          </a:lnRef>
+          <a:fillRef idx="3">
+            <a:schemeClr val="accent4"/>
+          </a:fillRef>
+          <a:effectRef idx="2">
+            <a:schemeClr val="accent4"/>
+          </a:effectRef>
+          <a:fontRef idx="minor">
+            <a:schemeClr val="lt1"/>
+          </a:fontRef>
+        </p:style>
+        <p:txBody>
+          <a:bodyPr rtlCol="0" anchor="ctr"/>
+          <a:lstStyle/>
+          <a:p>
+            <a:pPr algn="ctr"/>
+            <a:r>
+              <a:rPr lang="en-US" sz="2400" dirty="0"/>
+              <a:t>Tricky</a:t>
+            </a:r>
+          </a:p>
+        </p:txBody>
+      </p:sp>
+    </p:spTree>
+    <p:extLst>
+      <p:ext uri="{BB962C8B-B14F-4D97-AF65-F5344CB8AC3E}">
+        <p14:creationId xmlns:p14="http://schemas.microsoft.com/office/powerpoint/2010/main" val="1803745701"/>
       </p:ext>
     </p:extLst>
   </p:cSld>

</xml_diff>